<commit_message>
update coding approach ppt
</commit_message>
<xml_diff>
--- a/ETL PROJECT POWERPOINT.pptx
+++ b/ETL PROJECT POWERPOINT.pptx
@@ -204,7 +204,7 @@
           <a:p>
             <a:fld id="{482027EF-67BE-5A46-860B-6F29508315F9}" type="datetimeFigureOut">
               <a:rPr lang="en-US" smtClean="0"/>
-              <a:t>8/27/2020</a:t>
+              <a:t>8/27/20</a:t>
             </a:fld>
             <a:endParaRPr lang="en-US"/>
           </a:p>
@@ -798,7 +798,7 @@
           <a:p>
             <a:fld id="{02AC24A9-CCB6-4F8D-B8DB-C2F3692CFA5A}" type="datetimeFigureOut">
               <a:rPr lang="en-US" smtClean="0"/>
-              <a:t>8/27/2020</a:t>
+              <a:t>8/27/20</a:t>
             </a:fld>
             <a:endParaRPr lang="en-US" dirty="0"/>
           </a:p>
@@ -1168,7 +1168,7 @@
           <a:p>
             <a:fld id="{02AC24A9-CCB6-4F8D-B8DB-C2F3692CFA5A}" type="datetimeFigureOut">
               <a:rPr lang="en-US" smtClean="0"/>
-              <a:t>8/27/2020</a:t>
+              <a:t>8/27/20</a:t>
             </a:fld>
             <a:endParaRPr lang="en-US"/>
           </a:p>
@@ -1377,7 +1377,7 @@
           <a:p>
             <a:fld id="{02AC24A9-CCB6-4F8D-B8DB-C2F3692CFA5A}" type="datetimeFigureOut">
               <a:rPr lang="en-US" smtClean="0"/>
-              <a:t>8/27/2020</a:t>
+              <a:t>8/27/20</a:t>
             </a:fld>
             <a:endParaRPr lang="en-US"/>
           </a:p>
@@ -1847,7 +1847,7 @@
           <a:p>
             <a:fld id="{02AC24A9-CCB6-4F8D-B8DB-C2F3692CFA5A}" type="datetimeFigureOut">
               <a:rPr lang="en-US" smtClean="0"/>
-              <a:t>8/27/2020</a:t>
+              <a:t>8/27/20</a:t>
             </a:fld>
             <a:endParaRPr lang="en-US"/>
           </a:p>
@@ -2301,7 +2301,7 @@
           <a:p>
             <a:fld id="{02AC24A9-CCB6-4F8D-B8DB-C2F3692CFA5A}" type="datetimeFigureOut">
               <a:rPr lang="en-US" smtClean="0"/>
-              <a:t>8/27/2020</a:t>
+              <a:t>8/27/20</a:t>
             </a:fld>
             <a:endParaRPr lang="en-US"/>
           </a:p>
@@ -2833,7 +2833,7 @@
           <a:p>
             <a:fld id="{02AC24A9-CCB6-4F8D-B8DB-C2F3692CFA5A}" type="datetimeFigureOut">
               <a:rPr lang="en-US" smtClean="0"/>
-              <a:t>8/27/2020</a:t>
+              <a:t>8/27/20</a:t>
             </a:fld>
             <a:endParaRPr lang="en-US"/>
           </a:p>
@@ -3532,7 +3532,7 @@
           <a:p>
             <a:fld id="{02AC24A9-CCB6-4F8D-B8DB-C2F3692CFA5A}" type="datetimeFigureOut">
               <a:rPr lang="en-US" smtClean="0"/>
-              <a:t>8/27/2020</a:t>
+              <a:t>8/27/20</a:t>
             </a:fld>
             <a:endParaRPr lang="en-US"/>
           </a:p>
@@ -3861,7 +3861,7 @@
           <a:p>
             <a:fld id="{02AC24A9-CCB6-4F8D-B8DB-C2F3692CFA5A}" type="datetimeFigureOut">
               <a:rPr lang="en-US" smtClean="0"/>
-              <a:t>8/27/2020</a:t>
+              <a:t>8/27/20</a:t>
             </a:fld>
             <a:endParaRPr lang="en-US"/>
           </a:p>
@@ -3974,7 +3974,7 @@
           <a:p>
             <a:fld id="{02AC24A9-CCB6-4F8D-B8DB-C2F3692CFA5A}" type="datetimeFigureOut">
               <a:rPr lang="en-US" smtClean="0"/>
-              <a:t>8/27/2020</a:t>
+              <a:t>8/27/20</a:t>
             </a:fld>
             <a:endParaRPr lang="en-US"/>
           </a:p>
@@ -4469,7 +4469,7 @@
           <a:p>
             <a:fld id="{02AC24A9-CCB6-4F8D-B8DB-C2F3692CFA5A}" type="datetimeFigureOut">
               <a:rPr lang="en-US" smtClean="0"/>
-              <a:t>8/27/2020</a:t>
+              <a:t>8/27/20</a:t>
             </a:fld>
             <a:endParaRPr lang="en-US" dirty="0"/>
           </a:p>
@@ -4946,7 +4946,7 @@
           <a:p>
             <a:fld id="{02AC24A9-CCB6-4F8D-B8DB-C2F3692CFA5A}" type="datetimeFigureOut">
               <a:rPr lang="en-US" smtClean="0"/>
-              <a:t>8/27/2020</a:t>
+              <a:t>8/27/20</a:t>
             </a:fld>
             <a:endParaRPr lang="en-US"/>
           </a:p>
@@ -5189,7 +5189,7 @@
           <a:p>
             <a:fld id="{02AC24A9-CCB6-4F8D-B8DB-C2F3692CFA5A}" type="datetimeFigureOut">
               <a:rPr lang="en-US" smtClean="0"/>
-              <a:t>8/27/2020</a:t>
+              <a:t>8/27/20</a:t>
             </a:fld>
             <a:endParaRPr lang="en-US"/>
           </a:p>
@@ -8061,6 +8061,30 @@
               <a:rPr lang="en-US" sz="2000" dirty="0"/>
               <a:t>Flask app </a:t>
             </a:r>
+          </a:p>
+          <a:p>
+            <a:r>
+              <a:rPr lang="en-US" sz="2000" dirty="0"/>
+              <a:t>Leaflet</a:t>
+            </a:r>
+          </a:p>
+          <a:p>
+            <a:r>
+              <a:rPr lang="en-US" sz="2000" dirty="0" err="1"/>
+              <a:t>Plotly</a:t>
+            </a:r>
+            <a:endParaRPr lang="en-US" sz="2000" dirty="0"/>
+          </a:p>
+          <a:p>
+            <a:r>
+              <a:rPr lang="en-US" sz="2000" dirty="0"/>
+              <a:t>.</a:t>
+            </a:r>
+            <a:r>
+              <a:rPr lang="en-US" sz="2000" dirty="0" err="1"/>
+              <a:t>GeoJSON</a:t>
+            </a:r>
+            <a:endParaRPr lang="en-US" sz="2000" dirty="0"/>
           </a:p>
           <a:p>
             <a:endParaRPr lang="en-US" sz="2000" dirty="0"/>

</xml_diff>

<commit_message>
fix zipvscovid png and update ppt
</commit_message>
<xml_diff>
--- a/ETL PROJECT POWERPOINT.pptx
+++ b/ETL PROJECT POWERPOINT.pptx
@@ -5,7 +5,7 @@
     <p:sldMasterId id="2147484131" r:id="rId1"/>
   </p:sldMasterIdLst>
   <p:notesMasterIdLst>
-    <p:notesMasterId r:id="rId10"/>
+    <p:notesMasterId r:id="rId12"/>
   </p:notesMasterIdLst>
   <p:sldIdLst>
     <p:sldId id="256" r:id="rId2"/>
@@ -13,9 +13,11 @@
     <p:sldId id="261" r:id="rId4"/>
     <p:sldId id="263" r:id="rId5"/>
     <p:sldId id="258" r:id="rId6"/>
-    <p:sldId id="259" r:id="rId7"/>
-    <p:sldId id="262" r:id="rId8"/>
-    <p:sldId id="260" r:id="rId9"/>
+    <p:sldId id="264" r:id="rId7"/>
+    <p:sldId id="265" r:id="rId8"/>
+    <p:sldId id="259" r:id="rId9"/>
+    <p:sldId id="262" r:id="rId10"/>
+    <p:sldId id="260" r:id="rId11"/>
   </p:sldIdLst>
   <p:sldSz cx="12192000" cy="6858000"/>
   <p:notesSz cx="6858000" cy="9144000"/>
@@ -623,7 +625,7 @@
           <a:p>
             <a:fld id="{0E2084AF-775F-644F-A6A8-8F68198F063E}" type="slidenum">
               <a:rPr lang="en-US" smtClean="0"/>
-              <a:t>7</a:t>
+              <a:t>9</a:t>
             </a:fld>
             <a:endParaRPr lang="en-US"/>
           </a:p>
@@ -6072,6 +6074,495 @@
 </p:sld>
 </file>
 
+<file path=ppt/slides/slide10.xml><?xml version="1.0" encoding="utf-8"?>
+<p:sld xmlns:a="http://schemas.openxmlformats.org/drawingml/2006/main" xmlns:r="http://schemas.openxmlformats.org/officeDocument/2006/relationships" xmlns:p="http://schemas.openxmlformats.org/presentationml/2006/main">
+  <p:cSld>
+    <p:bg>
+      <p:bgPr>
+        <a:solidFill>
+          <a:schemeClr val="bg1"/>
+        </a:solidFill>
+        <a:effectLst/>
+      </p:bgPr>
+    </p:bg>
+    <p:spTree>
+      <p:nvGrpSpPr>
+        <p:cNvPr id="1" name=""/>
+        <p:cNvGrpSpPr/>
+        <p:nvPr/>
+      </p:nvGrpSpPr>
+      <p:grpSpPr>
+        <a:xfrm>
+          <a:off x="0" y="0"/>
+          <a:ext cx="0" cy="0"/>
+          <a:chOff x="0" y="0"/>
+          <a:chExt cx="0" cy="0"/>
+        </a:xfrm>
+      </p:grpSpPr>
+      <p:sp>
+        <p:nvSpPr>
+          <p:cNvPr id="8" name="Rectangle 7">
+            <a:extLst>
+              <a:ext uri="{FF2B5EF4-FFF2-40B4-BE49-F238E27FC236}">
+                <a16:creationId xmlns:a16="http://schemas.microsoft.com/office/drawing/2014/main" id="{8D06CE56-3881-4ADA-8CEF-D18B02C242A3}"/>
+              </a:ext>
+              <a:ext uri="{C183D7F6-B498-43B3-948B-1728B52AA6E4}">
+                <adec:decorative xmlns:adec="http://schemas.microsoft.com/office/drawing/2017/decorative" val="1"/>
+              </a:ext>
+            </a:extLst>
+          </p:cNvPr>
+          <p:cNvSpPr>
+            <a:spLocks noGrp="1" noRot="1" noChangeAspect="1" noMove="1" noResize="1" noEditPoints="1" noAdjustHandles="1" noChangeArrowheads="1" noChangeShapeType="1" noTextEdit="1"/>
+          </p:cNvSpPr>
+          <p:nvPr>
+            <p:extLst>
+              <p:ext uri="{386F3935-93C4-4BCD-93E2-E3B085C9AB24}">
+                <p16:designElem xmlns:p16="http://schemas.microsoft.com/office/powerpoint/2015/main" val="1"/>
+              </p:ext>
+            </p:extLst>
+          </p:nvPr>
+        </p:nvSpPr>
+        <p:spPr>
+          <a:xfrm rot="5400000">
+            <a:off x="857544" y="346791"/>
+            <a:ext cx="146304" cy="704088"/>
+          </a:xfrm>
+          <a:prstGeom prst="rect">
+            <a:avLst/>
+          </a:prstGeom>
+          <a:solidFill>
+            <a:schemeClr val="accent1"/>
+          </a:solidFill>
+          <a:ln>
+            <a:noFill/>
+          </a:ln>
+        </p:spPr>
+        <p:style>
+          <a:lnRef idx="2">
+            <a:schemeClr val="accent1">
+              <a:shade val="50000"/>
+            </a:schemeClr>
+          </a:lnRef>
+          <a:fillRef idx="1">
+            <a:schemeClr val="accent1"/>
+          </a:fillRef>
+          <a:effectRef idx="0">
+            <a:schemeClr val="accent1"/>
+          </a:effectRef>
+          <a:fontRef idx="minor">
+            <a:schemeClr val="lt1"/>
+          </a:fontRef>
+        </p:style>
+        <p:txBody>
+          <a:bodyPr rtlCol="0" anchor="ctr"/>
+          <a:lstStyle/>
+          <a:p>
+            <a:pPr marL="0" marR="0" lvl="0" indent="0" algn="ctr" defTabSz="914400" rtl="0" eaLnBrk="1" fontAlgn="auto" latinLnBrk="0" hangingPunct="1">
+              <a:lnSpc>
+                <a:spcPct val="100000"/>
+              </a:lnSpc>
+              <a:spcBef>
+                <a:spcPts val="0"/>
+              </a:spcBef>
+              <a:spcAft>
+                <a:spcPts val="0"/>
+              </a:spcAft>
+              <a:buClrTx/>
+              <a:buSzTx/>
+              <a:buFontTx/>
+              <a:buNone/>
+              <a:tabLst/>
+              <a:defRPr/>
+            </a:pPr>
+            <a:endParaRPr kumimoji="0" lang="en-US" sz="1800" b="0" i="0" u="none" strike="noStrike" kern="1200" cap="none" spc="0" normalizeH="0" baseline="0" noProof="0">
+              <a:ln>
+                <a:noFill/>
+              </a:ln>
+              <a:solidFill>
+                <a:prstClr val="white"/>
+              </a:solidFill>
+              <a:effectLst/>
+              <a:uLnTx/>
+              <a:uFillTx/>
+              <a:latin typeface="Calibri" panose="020F0502020204030204"/>
+              <a:ea typeface="+mn-ea"/>
+              <a:cs typeface="+mn-cs"/>
+            </a:endParaRPr>
+          </a:p>
+        </p:txBody>
+      </p:sp>
+      <p:sp>
+        <p:nvSpPr>
+          <p:cNvPr id="10" name="Rectangle 9">
+            <a:extLst>
+              <a:ext uri="{FF2B5EF4-FFF2-40B4-BE49-F238E27FC236}">
+                <a16:creationId xmlns:a16="http://schemas.microsoft.com/office/drawing/2014/main" id="{79F3C543-62EC-4433-9C93-A2CD8764E9B4}"/>
+              </a:ext>
+              <a:ext uri="{C183D7F6-B498-43B3-948B-1728B52AA6E4}">
+                <adec:decorative xmlns:adec="http://schemas.microsoft.com/office/drawing/2017/decorative" val="1"/>
+              </a:ext>
+            </a:extLst>
+          </p:cNvPr>
+          <p:cNvSpPr>
+            <a:spLocks noGrp="1" noRot="1" noChangeAspect="1" noMove="1" noResize="1" noEditPoints="1" noAdjustHandles="1" noChangeArrowheads="1" noChangeShapeType="1" noTextEdit="1"/>
+          </p:cNvSpPr>
+          <p:nvPr>
+            <p:extLst>
+              <p:ext uri="{386F3935-93C4-4BCD-93E2-E3B085C9AB24}">
+                <p16:designElem xmlns:p16="http://schemas.microsoft.com/office/powerpoint/2015/main" val="1"/>
+              </p:ext>
+            </p:extLst>
+          </p:nvPr>
+        </p:nvSpPr>
+        <p:spPr>
+          <a:xfrm flipV="1">
+            <a:off x="578652" y="4501201"/>
+            <a:ext cx="11034696" cy="18288"/>
+          </a:xfrm>
+          <a:prstGeom prst="rect">
+            <a:avLst/>
+          </a:prstGeom>
+          <a:solidFill>
+            <a:schemeClr val="tx2">
+              <a:lumMod val="25000"/>
+              <a:lumOff val="75000"/>
+            </a:schemeClr>
+          </a:solidFill>
+          <a:ln w="3175">
+            <a:noFill/>
+          </a:ln>
+          <a:effectLst/>
+        </p:spPr>
+        <p:style>
+          <a:lnRef idx="2">
+            <a:schemeClr val="accent1">
+              <a:shade val="50000"/>
+            </a:schemeClr>
+          </a:lnRef>
+          <a:fillRef idx="1">
+            <a:schemeClr val="accent1"/>
+          </a:fillRef>
+          <a:effectRef idx="0">
+            <a:schemeClr val="accent1"/>
+          </a:effectRef>
+          <a:fontRef idx="minor">
+            <a:schemeClr val="lt1"/>
+          </a:fontRef>
+        </p:style>
+        <p:txBody>
+          <a:bodyPr rtlCol="0" anchor="ctr"/>
+          <a:lstStyle/>
+          <a:p>
+            <a:pPr marL="0" marR="0" lvl="0" indent="0" algn="ctr" defTabSz="914400" rtl="0" eaLnBrk="1" fontAlgn="auto" latinLnBrk="0" hangingPunct="1">
+              <a:lnSpc>
+                <a:spcPct val="100000"/>
+              </a:lnSpc>
+              <a:spcBef>
+                <a:spcPts val="0"/>
+              </a:spcBef>
+              <a:spcAft>
+                <a:spcPts val="0"/>
+              </a:spcAft>
+              <a:buClrTx/>
+              <a:buSzTx/>
+              <a:buFontTx/>
+              <a:buNone/>
+              <a:tabLst/>
+              <a:defRPr/>
+            </a:pPr>
+            <a:endParaRPr kumimoji="0" lang="en-US" sz="1800" b="0" i="0" u="none" strike="noStrike" kern="1200" cap="none" spc="0" normalizeH="0" baseline="0" noProof="0">
+              <a:ln>
+                <a:noFill/>
+              </a:ln>
+              <a:solidFill>
+                <a:prstClr val="white"/>
+              </a:solidFill>
+              <a:effectLst/>
+              <a:uLnTx/>
+              <a:uFillTx/>
+              <a:latin typeface="Calibri" panose="020F0502020204030204"/>
+              <a:ea typeface="+mn-ea"/>
+              <a:cs typeface="+mn-cs"/>
+            </a:endParaRPr>
+          </a:p>
+        </p:txBody>
+      </p:sp>
+      <p:sp useBgFill="1">
+        <p:nvSpPr>
+          <p:cNvPr id="12" name="Rectangle 11">
+            <a:extLst>
+              <a:ext uri="{FF2B5EF4-FFF2-40B4-BE49-F238E27FC236}">
+                <a16:creationId xmlns:a16="http://schemas.microsoft.com/office/drawing/2014/main" id="{1ACA2EA0-FFD3-42EC-9406-B595015ED96E}"/>
+              </a:ext>
+              <a:ext uri="{C183D7F6-B498-43B3-948B-1728B52AA6E4}">
+                <adec:decorative xmlns:adec="http://schemas.microsoft.com/office/drawing/2017/decorative" val="1"/>
+              </a:ext>
+            </a:extLst>
+          </p:cNvPr>
+          <p:cNvSpPr>
+            <a:spLocks noGrp="1" noRot="1" noChangeAspect="1" noMove="1" noResize="1" noEditPoints="1" noAdjustHandles="1" noChangeArrowheads="1" noChangeShapeType="1" noTextEdit="1"/>
+          </p:cNvSpPr>
+          <p:nvPr>
+            <p:extLst>
+              <p:ext uri="{386F3935-93C4-4BCD-93E2-E3B085C9AB24}">
+                <p16:designElem xmlns:p16="http://schemas.microsoft.com/office/powerpoint/2015/main" val="1"/>
+              </p:ext>
+            </p:extLst>
+          </p:nvPr>
+        </p:nvSpPr>
+        <p:spPr>
+          <a:xfrm>
+            <a:off x="0" y="0"/>
+            <a:ext cx="12192000" cy="6858000"/>
+          </a:xfrm>
+          <a:prstGeom prst="rect">
+            <a:avLst/>
+          </a:prstGeom>
+          <a:ln>
+            <a:noFill/>
+          </a:ln>
+        </p:spPr>
+        <p:style>
+          <a:lnRef idx="2">
+            <a:schemeClr val="accent1">
+              <a:shade val="50000"/>
+            </a:schemeClr>
+          </a:lnRef>
+          <a:fillRef idx="1">
+            <a:schemeClr val="accent1"/>
+          </a:fillRef>
+          <a:effectRef idx="0">
+            <a:schemeClr val="accent1"/>
+          </a:effectRef>
+          <a:fontRef idx="minor">
+            <a:schemeClr val="lt1"/>
+          </a:fontRef>
+        </p:style>
+        <p:txBody>
+          <a:bodyPr rtlCol="0" anchor="ctr"/>
+          <a:lstStyle/>
+          <a:p>
+            <a:pPr algn="ctr"/>
+            <a:endParaRPr lang="en-US"/>
+          </a:p>
+        </p:txBody>
+      </p:sp>
+      <p:sp useBgFill="1">
+        <p:nvSpPr>
+          <p:cNvPr id="14" name="Rectangle 13">
+            <a:extLst>
+              <a:ext uri="{FF2B5EF4-FFF2-40B4-BE49-F238E27FC236}">
+                <a16:creationId xmlns:a16="http://schemas.microsoft.com/office/drawing/2014/main" id="{D5288BCE-665C-472A-8C43-664BCFA31E43}"/>
+              </a:ext>
+              <a:ext uri="{C183D7F6-B498-43B3-948B-1728B52AA6E4}">
+                <adec:decorative xmlns:adec="http://schemas.microsoft.com/office/drawing/2017/decorative" val="1"/>
+              </a:ext>
+            </a:extLst>
+          </p:cNvPr>
+          <p:cNvSpPr>
+            <a:spLocks noGrp="1" noRot="1" noChangeAspect="1" noMove="1" noResize="1" noEditPoints="1" noAdjustHandles="1" noChangeArrowheads="1" noChangeShapeType="1" noTextEdit="1"/>
+          </p:cNvSpPr>
+          <p:nvPr>
+            <p:extLst>
+              <p:ext uri="{386F3935-93C4-4BCD-93E2-E3B085C9AB24}">
+                <p16:designElem xmlns:p16="http://schemas.microsoft.com/office/powerpoint/2015/main" val="1"/>
+              </p:ext>
+            </p:extLst>
+          </p:nvPr>
+        </p:nvSpPr>
+        <p:spPr>
+          <a:xfrm>
+            <a:off x="1528762" y="1247775"/>
+            <a:ext cx="9144000" cy="3007447"/>
+          </a:xfrm>
+          <a:prstGeom prst="rect">
+            <a:avLst/>
+          </a:prstGeom>
+          <a:ln w="12700">
+            <a:solidFill>
+              <a:schemeClr val="tx2">
+                <a:lumMod val="10000"/>
+                <a:lumOff val="90000"/>
+              </a:schemeClr>
+            </a:solidFill>
+          </a:ln>
+          <a:effectLst>
+            <a:outerShdw blurRad="50800" dist="38100" dir="2700000" algn="tl" rotWithShape="0">
+              <a:schemeClr val="bg2">
+                <a:lumMod val="85000"/>
+                <a:alpha val="30000"/>
+              </a:schemeClr>
+            </a:outerShdw>
+          </a:effectLst>
+        </p:spPr>
+        <p:style>
+          <a:lnRef idx="2">
+            <a:schemeClr val="accent1">
+              <a:shade val="50000"/>
+            </a:schemeClr>
+          </a:lnRef>
+          <a:fillRef idx="1">
+            <a:schemeClr val="accent1"/>
+          </a:fillRef>
+          <a:effectRef idx="0">
+            <a:schemeClr val="accent1"/>
+          </a:effectRef>
+          <a:fontRef idx="minor">
+            <a:schemeClr val="lt1"/>
+          </a:fontRef>
+        </p:style>
+        <p:txBody>
+          <a:bodyPr rtlCol="0" anchor="ctr"/>
+          <a:lstStyle/>
+          <a:p>
+            <a:pPr marL="0" marR="0" lvl="0" indent="0" algn="ctr" defTabSz="914400" rtl="0" eaLnBrk="1" fontAlgn="auto" latinLnBrk="0" hangingPunct="1">
+              <a:lnSpc>
+                <a:spcPct val="100000"/>
+              </a:lnSpc>
+              <a:spcBef>
+                <a:spcPts val="0"/>
+              </a:spcBef>
+              <a:spcAft>
+                <a:spcPts val="0"/>
+              </a:spcAft>
+              <a:buClrTx/>
+              <a:buSzTx/>
+              <a:buFontTx/>
+              <a:buNone/>
+              <a:tabLst/>
+              <a:defRPr/>
+            </a:pPr>
+            <a:endParaRPr kumimoji="0" lang="en-US" sz="1800" b="0" i="0" u="none" strike="noStrike" kern="1200" cap="none" spc="0" normalizeH="0" baseline="0" noProof="0">
+              <a:ln>
+                <a:noFill/>
+              </a:ln>
+              <a:solidFill>
+                <a:prstClr val="white"/>
+              </a:solidFill>
+              <a:effectLst/>
+              <a:uLnTx/>
+              <a:uFillTx/>
+              <a:latin typeface="Calibri" panose="020F0502020204030204"/>
+              <a:ea typeface="+mn-ea"/>
+              <a:cs typeface="+mn-cs"/>
+            </a:endParaRPr>
+          </a:p>
+        </p:txBody>
+      </p:sp>
+      <p:sp>
+        <p:nvSpPr>
+          <p:cNvPr id="2" name="Title 1">
+            <a:extLst>
+              <a:ext uri="{FF2B5EF4-FFF2-40B4-BE49-F238E27FC236}">
+                <a16:creationId xmlns:a16="http://schemas.microsoft.com/office/drawing/2014/main" id="{9261304E-6204-8E44-A343-DCFEABC60BBA}"/>
+              </a:ext>
+            </a:extLst>
+          </p:cNvPr>
+          <p:cNvSpPr>
+            <a:spLocks noGrp="1"/>
+          </p:cNvSpPr>
+          <p:nvPr>
+            <p:ph type="title"/>
+          </p:nvPr>
+        </p:nvSpPr>
+        <p:spPr>
+          <a:xfrm>
+            <a:off x="1804988" y="1442172"/>
+            <a:ext cx="8582025" cy="2177328"/>
+          </a:xfrm>
+        </p:spPr>
+        <p:txBody>
+          <a:bodyPr vert="horz" lIns="91440" tIns="45720" rIns="91440" bIns="45720" rtlCol="0" anchor="ctr">
+            <a:normAutofit/>
+          </a:bodyPr>
+          <a:lstStyle/>
+          <a:p>
+            <a:pPr algn="ctr"/>
+            <a:r>
+              <a:rPr lang="en-US" sz="7200" dirty="0"/>
+              <a:t>Final Conclusions</a:t>
+            </a:r>
+          </a:p>
+        </p:txBody>
+      </p:sp>
+      <p:sp>
+        <p:nvSpPr>
+          <p:cNvPr id="16" name="Rectangle: Rounded Corners 15">
+            <a:extLst>
+              <a:ext uri="{FF2B5EF4-FFF2-40B4-BE49-F238E27FC236}">
+                <a16:creationId xmlns:a16="http://schemas.microsoft.com/office/drawing/2014/main" id="{46C57131-53A7-4C1A-BEA8-25F06A06AD29}"/>
+              </a:ext>
+              <a:ext uri="{C183D7F6-B498-43B3-948B-1728B52AA6E4}">
+                <adec:decorative xmlns:adec="http://schemas.microsoft.com/office/drawing/2017/decorative" val="1"/>
+              </a:ext>
+            </a:extLst>
+          </p:cNvPr>
+          <p:cNvSpPr>
+            <a:spLocks noGrp="1" noRot="1" noChangeAspect="1" noMove="1" noResize="1" noEditPoints="1" noAdjustHandles="1" noChangeArrowheads="1" noChangeShapeType="1" noTextEdit="1"/>
+          </p:cNvSpPr>
+          <p:nvPr>
+            <p:extLst>
+              <p:ext uri="{386F3935-93C4-4BCD-93E2-E3B085C9AB24}">
+                <p16:designElem xmlns:p16="http://schemas.microsoft.com/office/powerpoint/2015/main" val="1"/>
+              </p:ext>
+            </p:extLst>
+          </p:nvPr>
+        </p:nvSpPr>
+        <p:spPr>
+          <a:xfrm>
+            <a:off x="2487872" y="3912322"/>
+            <a:ext cx="7225780" cy="685800"/>
+          </a:xfrm>
+          <a:prstGeom prst="roundRect">
+            <a:avLst>
+              <a:gd name="adj" fmla="val 0"/>
+            </a:avLst>
+          </a:prstGeom>
+          <a:solidFill>
+            <a:schemeClr val="accent1"/>
+          </a:solidFill>
+          <a:ln>
+            <a:noFill/>
+          </a:ln>
+        </p:spPr>
+        <p:style>
+          <a:lnRef idx="2">
+            <a:schemeClr val="accent1">
+              <a:shade val="50000"/>
+            </a:schemeClr>
+          </a:lnRef>
+          <a:fillRef idx="1">
+            <a:schemeClr val="accent1"/>
+          </a:fillRef>
+          <a:effectRef idx="0">
+            <a:schemeClr val="accent1"/>
+          </a:effectRef>
+          <a:fontRef idx="minor">
+            <a:schemeClr val="lt1"/>
+          </a:fontRef>
+        </p:style>
+        <p:txBody>
+          <a:bodyPr rtlCol="0" anchor="ctr"/>
+          <a:lstStyle/>
+          <a:p>
+            <a:pPr algn="ctr"/>
+            <a:endParaRPr lang="en-US"/>
+          </a:p>
+        </p:txBody>
+      </p:sp>
+    </p:spTree>
+    <p:extLst>
+      <p:ext uri="{BB962C8B-B14F-4D97-AF65-F5344CB8AC3E}">
+        <p14:creationId xmlns:p14="http://schemas.microsoft.com/office/powerpoint/2010/main" val="3197243115"/>
+      </p:ext>
+    </p:extLst>
+  </p:cSld>
+  <p:clrMapOvr>
+    <a:masterClrMapping/>
+  </p:clrMapOvr>
+</p:sld>
+</file>
+
 <file path=ppt/slides/slide2.xml><?xml version="1.0" encoding="utf-8"?>
 <p:sld xmlns:a="http://schemas.openxmlformats.org/drawingml/2006/main" xmlns:r="http://schemas.openxmlformats.org/officeDocument/2006/relationships" xmlns:p="http://schemas.openxmlformats.org/presentationml/2006/main">
   <p:cSld>
@@ -6661,7 +7152,7 @@
           <a:p>
             <a:r>
               <a:rPr lang="en-US" sz="2000" dirty="0"/>
-              <a:t>Operation Legend – federal law enforcement operation named after 4 year old Legend </a:t>
+              <a:t>Operation Legend – federal law enforcement operation named after 4-year-old Legend </a:t>
             </a:r>
             <a:r>
               <a:rPr lang="en-US" sz="2000" dirty="0" err="1"/>
@@ -7271,6 +7762,14 @@
 <file path=ppt/slides/slide4.xml><?xml version="1.0" encoding="utf-8"?>
 <p:sld xmlns:a="http://schemas.openxmlformats.org/drawingml/2006/main" xmlns:r="http://schemas.openxmlformats.org/officeDocument/2006/relationships" xmlns:p="http://schemas.openxmlformats.org/presentationml/2006/main">
   <p:cSld>
+    <p:bg>
+      <p:bgPr>
+        <a:solidFill>
+          <a:schemeClr val="bg1"/>
+        </a:solidFill>
+        <a:effectLst/>
+      </p:bgPr>
+    </p:bg>
     <p:spTree>
       <p:nvGrpSpPr>
         <p:cNvPr id="1" name=""/>
@@ -7285,6 +7784,66 @@
           <a:chExt cx="0" cy="0"/>
         </a:xfrm>
       </p:grpSpPr>
+      <p:sp useBgFill="1">
+        <p:nvSpPr>
+          <p:cNvPr id="8" name="Rectangle 7">
+            <a:extLst>
+              <a:ext uri="{FF2B5EF4-FFF2-40B4-BE49-F238E27FC236}">
+                <a16:creationId xmlns:a16="http://schemas.microsoft.com/office/drawing/2014/main" id="{E777E57D-6A88-4B5B-A068-2BA7FF4E8CCA}"/>
+              </a:ext>
+              <a:ext uri="{C183D7F6-B498-43B3-948B-1728B52AA6E4}">
+                <adec:decorative xmlns:adec="http://schemas.microsoft.com/office/drawing/2017/decorative" val="1"/>
+              </a:ext>
+            </a:extLst>
+          </p:cNvPr>
+          <p:cNvSpPr>
+            <a:spLocks noGrp="1" noRot="1" noChangeAspect="1" noMove="1" noResize="1" noEditPoints="1" noAdjustHandles="1" noChangeArrowheads="1" noChangeShapeType="1" noTextEdit="1"/>
+          </p:cNvSpPr>
+          <p:nvPr>
+            <p:extLst>
+              <p:ext uri="{386F3935-93C4-4BCD-93E2-E3B085C9AB24}">
+                <p16:designElem xmlns:p16="http://schemas.microsoft.com/office/powerpoint/2015/main" val="1"/>
+              </p:ext>
+            </p:extLst>
+          </p:nvPr>
+        </p:nvSpPr>
+        <p:spPr>
+          <a:xfrm>
+            <a:off x="0" y="0"/>
+            <a:ext cx="12192000" cy="6858000"/>
+          </a:xfrm>
+          <a:prstGeom prst="rect">
+            <a:avLst/>
+          </a:prstGeom>
+          <a:ln>
+            <a:noFill/>
+          </a:ln>
+        </p:spPr>
+        <p:style>
+          <a:lnRef idx="2">
+            <a:schemeClr val="accent1">
+              <a:shade val="50000"/>
+            </a:schemeClr>
+          </a:lnRef>
+          <a:fillRef idx="1">
+            <a:schemeClr val="accent1"/>
+          </a:fillRef>
+          <a:effectRef idx="0">
+            <a:schemeClr val="accent1"/>
+          </a:effectRef>
+          <a:fontRef idx="minor">
+            <a:schemeClr val="lt1"/>
+          </a:fontRef>
+        </p:style>
+        <p:txBody>
+          <a:bodyPr rtlCol="0" anchor="ctr"/>
+          <a:lstStyle/>
+          <a:p>
+            <a:pPr algn="ctr"/>
+            <a:endParaRPr lang="en-US"/>
+          </a:p>
+        </p:txBody>
+      </p:sp>
       <p:sp>
         <p:nvSpPr>
           <p:cNvPr id="2" name="Title 1">
@@ -7301,14 +7860,20 @@
             <p:ph type="title"/>
           </p:nvPr>
         </p:nvSpPr>
-        <p:spPr/>
-        <p:txBody>
-          <a:bodyPr/>
-          <a:lstStyle/>
-          <a:p>
-            <a:pPr algn="ctr"/>
+        <p:spPr>
+          <a:xfrm>
+            <a:off x="841248" y="503132"/>
+            <a:ext cx="10509504" cy="1974892"/>
+          </a:xfrm>
+        </p:spPr>
+        <p:txBody>
+          <a:bodyPr anchor="b">
+            <a:normAutofit/>
+          </a:bodyPr>
+          <a:lstStyle/>
+          <a:p>
             <a:r>
-              <a:rPr lang="en-US" dirty="0"/>
+              <a:rPr lang="en-US" sz="5400"/>
               <a:t>Cleaning Data</a:t>
             </a:r>
           </a:p>
@@ -7316,6 +7881,194 @@
       </p:sp>
       <p:sp>
         <p:nvSpPr>
+          <p:cNvPr id="10" name="Rectangle 9">
+            <a:extLst>
+              <a:ext uri="{FF2B5EF4-FFF2-40B4-BE49-F238E27FC236}">
+                <a16:creationId xmlns:a16="http://schemas.microsoft.com/office/drawing/2014/main" id="{F7117410-A2A4-4085-9ADC-46744551DBDE}"/>
+              </a:ext>
+              <a:ext uri="{C183D7F6-B498-43B3-948B-1728B52AA6E4}">
+                <adec:decorative xmlns:adec="http://schemas.microsoft.com/office/drawing/2017/decorative" val="1"/>
+              </a:ext>
+            </a:extLst>
+          </p:cNvPr>
+          <p:cNvSpPr>
+            <a:spLocks noGrp="1" noRot="1" noChangeAspect="1" noMove="1" noResize="1" noEditPoints="1" noAdjustHandles="1" noChangeArrowheads="1" noChangeShapeType="1" noTextEdit="1"/>
+          </p:cNvSpPr>
+          <p:nvPr>
+            <p:extLst>
+              <p:ext uri="{386F3935-93C4-4BCD-93E2-E3B085C9AB24}">
+                <p16:designElem xmlns:p16="http://schemas.microsoft.com/office/powerpoint/2015/main" val="1"/>
+              </p:ext>
+            </p:extLst>
+          </p:nvPr>
+        </p:nvSpPr>
+        <p:spPr>
+          <a:xfrm>
+            <a:off x="842772" y="0"/>
+            <a:ext cx="10506456" cy="191386"/>
+          </a:xfrm>
+          <a:prstGeom prst="rect">
+            <a:avLst/>
+          </a:prstGeom>
+          <a:solidFill>
+            <a:schemeClr val="accent1"/>
+          </a:solidFill>
+          <a:ln>
+            <a:noFill/>
+          </a:ln>
+        </p:spPr>
+        <p:style>
+          <a:lnRef idx="2">
+            <a:schemeClr val="accent1">
+              <a:shade val="50000"/>
+            </a:schemeClr>
+          </a:lnRef>
+          <a:fillRef idx="1">
+            <a:schemeClr val="accent1"/>
+          </a:fillRef>
+          <a:effectRef idx="0">
+            <a:schemeClr val="accent1"/>
+          </a:effectRef>
+          <a:fontRef idx="minor">
+            <a:schemeClr val="lt1"/>
+          </a:fontRef>
+        </p:style>
+        <p:txBody>
+          <a:bodyPr rtlCol="0" anchor="ctr"/>
+          <a:lstStyle/>
+          <a:p>
+            <a:pPr marL="0" marR="0" lvl="0" indent="0" algn="ctr" defTabSz="914400" rtl="0" eaLnBrk="1" fontAlgn="auto" latinLnBrk="0" hangingPunct="1">
+              <a:lnSpc>
+                <a:spcPct val="100000"/>
+              </a:lnSpc>
+              <a:spcBef>
+                <a:spcPts val="0"/>
+              </a:spcBef>
+              <a:spcAft>
+                <a:spcPts val="0"/>
+              </a:spcAft>
+              <a:buClrTx/>
+              <a:buSzTx/>
+              <a:buFontTx/>
+              <a:buNone/>
+              <a:tabLst/>
+              <a:defRPr/>
+            </a:pPr>
+            <a:endParaRPr kumimoji="0" lang="en-US" sz="1800" b="0" i="0" u="none" strike="noStrike" kern="1200" cap="none" spc="0" normalizeH="0" baseline="0" noProof="0">
+              <a:ln>
+                <a:noFill/>
+              </a:ln>
+              <a:solidFill>
+                <a:prstClr val="white"/>
+              </a:solidFill>
+              <a:effectLst/>
+              <a:uLnTx/>
+              <a:uFillTx/>
+              <a:latin typeface="Calibri" panose="020F0502020204030204"/>
+              <a:ea typeface="+mn-ea"/>
+              <a:cs typeface="+mn-cs"/>
+            </a:endParaRPr>
+          </a:p>
+        </p:txBody>
+      </p:sp>
+      <p:sp>
+        <p:nvSpPr>
+          <p:cNvPr id="12" name="Rectangle 11">
+            <a:extLst>
+              <a:ext uri="{FF2B5EF4-FFF2-40B4-BE49-F238E27FC236}">
+                <a16:creationId xmlns:a16="http://schemas.microsoft.com/office/drawing/2014/main" id="{99F74EB5-E547-4FB4-95F5-BCC788F3C4A0}"/>
+              </a:ext>
+              <a:ext uri="{C183D7F6-B498-43B3-948B-1728B52AA6E4}">
+                <adec:decorative xmlns:adec="http://schemas.microsoft.com/office/drawing/2017/decorative" val="1"/>
+              </a:ext>
+            </a:extLst>
+          </p:cNvPr>
+          <p:cNvSpPr>
+            <a:spLocks noGrp="1" noRot="1" noChangeAspect="1" noMove="1" noResize="1" noEditPoints="1" noAdjustHandles="1" noChangeArrowheads="1" noChangeShapeType="1" noTextEdit="1"/>
+          </p:cNvSpPr>
+          <p:nvPr>
+            <p:extLst>
+              <p:ext uri="{386F3935-93C4-4BCD-93E2-E3B085C9AB24}">
+                <p16:designElem xmlns:p16="http://schemas.microsoft.com/office/powerpoint/2015/main" val="1"/>
+              </p:ext>
+            </p:extLst>
+          </p:nvPr>
+        </p:nvSpPr>
+        <p:spPr>
+          <a:xfrm>
+            <a:off x="841248" y="2894076"/>
+            <a:ext cx="10506456" cy="18288"/>
+          </a:xfrm>
+          <a:prstGeom prst="rect">
+            <a:avLst/>
+          </a:prstGeom>
+          <a:solidFill>
+            <a:schemeClr val="tx2">
+              <a:lumMod val="25000"/>
+              <a:lumOff val="75000"/>
+            </a:schemeClr>
+          </a:solidFill>
+          <a:ln w="3175">
+            <a:noFill/>
+          </a:ln>
+          <a:effectLst/>
+        </p:spPr>
+        <p:style>
+          <a:lnRef idx="2">
+            <a:schemeClr val="accent1">
+              <a:shade val="50000"/>
+            </a:schemeClr>
+          </a:lnRef>
+          <a:fillRef idx="1">
+            <a:schemeClr val="accent1"/>
+          </a:fillRef>
+          <a:effectRef idx="0">
+            <a:schemeClr val="accent1"/>
+          </a:effectRef>
+          <a:fontRef idx="minor">
+            <a:schemeClr val="lt1"/>
+          </a:fontRef>
+        </p:style>
+        <p:txBody>
+          <a:bodyPr rtlCol="0" anchor="ctr"/>
+          <a:lstStyle/>
+          <a:p>
+            <a:pPr marL="0" marR="0" lvl="0" indent="0" algn="ctr" defTabSz="914400" rtl="0" eaLnBrk="1" fontAlgn="auto" latinLnBrk="0" hangingPunct="1">
+              <a:lnSpc>
+                <a:spcPct val="100000"/>
+              </a:lnSpc>
+              <a:spcBef>
+                <a:spcPts val="0"/>
+              </a:spcBef>
+              <a:spcAft>
+                <a:spcPts val="0"/>
+              </a:spcAft>
+              <a:buClrTx/>
+              <a:buSzTx/>
+              <a:buFontTx/>
+              <a:buNone/>
+              <a:tabLst/>
+              <a:defRPr/>
+            </a:pPr>
+            <a:endParaRPr kumimoji="0" lang="en-US" sz="1800" b="0" i="0" u="none" strike="noStrike" kern="1200" cap="none" spc="0" normalizeH="0" baseline="0" noProof="0">
+              <a:ln>
+                <a:noFill/>
+              </a:ln>
+              <a:solidFill>
+                <a:prstClr val="white"/>
+              </a:solidFill>
+              <a:effectLst/>
+              <a:uLnTx/>
+              <a:uFillTx/>
+              <a:latin typeface="Calibri" panose="020F0502020204030204"/>
+              <a:ea typeface="+mn-ea"/>
+              <a:cs typeface="+mn-cs"/>
+            </a:endParaRPr>
+          </a:p>
+        </p:txBody>
+      </p:sp>
+      <p:sp>
+        <p:nvSpPr>
           <p:cNvPr id="3" name="Content Placeholder 2">
             <a:extLst>
               <a:ext uri="{FF2B5EF4-FFF2-40B4-BE49-F238E27FC236}">
@@ -7330,7 +8083,12 @@
             <p:ph idx="1"/>
           </p:nvPr>
         </p:nvSpPr>
-        <p:spPr/>
+        <p:spPr>
+          <a:xfrm>
+            <a:off x="841248" y="3328416"/>
+            <a:ext cx="10509504" cy="2715768"/>
+          </a:xfrm>
+        </p:spPr>
         <p:txBody>
           <a:bodyPr>
             <a:normAutofit/>
@@ -7338,27 +8096,19 @@
           <a:lstStyle/>
           <a:p>
             <a:r>
-              <a:rPr lang="en-US" dirty="0"/>
-              <a:t>Our data was from </a:t>
+              <a:rPr lang="en-US" sz="2000"/>
+              <a:t>Our data was from OpenDataKC as CSVs, we first needed to narrow down the columns in the crime dataset, we went from 27 columns to 8 columns. </a:t>
             </a:r>
+          </a:p>
+          <a:p>
             <a:r>
-              <a:rPr lang="en-US" dirty="0" err="1"/>
-              <a:t>OpenDataKC</a:t>
-            </a:r>
-            <a:r>
-              <a:rPr lang="en-US" dirty="0"/>
-              <a:t> as CSVs, we first needed to narrow down the columns in the crime dataset, we went from 27 columns to 8 columns. </a:t>
-            </a:r>
-          </a:p>
-          <a:p>
-            <a:r>
-              <a:rPr lang="en-US" dirty="0"/>
+              <a:rPr lang="en-US" sz="2000"/>
               <a:t>Then, we dropped all null columns from both datasets. </a:t>
             </a:r>
           </a:p>
           <a:p>
             <a:r>
-              <a:rPr lang="en-US" dirty="0"/>
+              <a:rPr lang="en-US" sz="2000"/>
               <a:t>The biggest task was finding the latitude and longitude for the datasets. The crime dataset had it hidden within the address field but the COVID data only had the zip code***</a:t>
             </a:r>
           </a:p>
@@ -7461,6 +8211,1362 @@
 </file>
 
 <file path=ppt/slides/slide6.xml><?xml version="1.0" encoding="utf-8"?>
+<p:sld xmlns:a="http://schemas.openxmlformats.org/drawingml/2006/main" xmlns:r="http://schemas.openxmlformats.org/officeDocument/2006/relationships" xmlns:p="http://schemas.openxmlformats.org/presentationml/2006/main">
+  <p:cSld>
+    <p:bg>
+      <p:bgPr>
+        <a:solidFill>
+          <a:schemeClr val="bg1"/>
+        </a:solidFill>
+        <a:effectLst/>
+      </p:bgPr>
+    </p:bg>
+    <p:spTree>
+      <p:nvGrpSpPr>
+        <p:cNvPr id="1" name=""/>
+        <p:cNvGrpSpPr/>
+        <p:nvPr/>
+      </p:nvGrpSpPr>
+      <p:grpSpPr>
+        <a:xfrm>
+          <a:off x="0" y="0"/>
+          <a:ext cx="0" cy="0"/>
+          <a:chOff x="0" y="0"/>
+          <a:chExt cx="0" cy="0"/>
+        </a:xfrm>
+      </p:grpSpPr>
+      <p:sp useBgFill="1">
+        <p:nvSpPr>
+          <p:cNvPr id="32" name="Rectangle 31">
+            <a:extLst>
+              <a:ext uri="{FF2B5EF4-FFF2-40B4-BE49-F238E27FC236}">
+                <a16:creationId xmlns:a16="http://schemas.microsoft.com/office/drawing/2014/main" id="{63F5877B-98C7-49DD-83AB-0F6F57CB6543}"/>
+              </a:ext>
+              <a:ext uri="{C183D7F6-B498-43B3-948B-1728B52AA6E4}">
+                <adec:decorative xmlns:adec="http://schemas.microsoft.com/office/drawing/2017/decorative" val="1"/>
+              </a:ext>
+            </a:extLst>
+          </p:cNvPr>
+          <p:cNvSpPr>
+            <a:spLocks noGrp="1" noRot="1" noChangeAspect="1" noMove="1" noResize="1" noEditPoints="1" noAdjustHandles="1" noChangeArrowheads="1" noChangeShapeType="1" noTextEdit="1"/>
+          </p:cNvSpPr>
+          <p:nvPr>
+            <p:extLst>
+              <p:ext uri="{386F3935-93C4-4BCD-93E2-E3B085C9AB24}">
+                <p16:designElem xmlns:p16="http://schemas.microsoft.com/office/powerpoint/2015/main" val="1"/>
+              </p:ext>
+            </p:extLst>
+          </p:nvPr>
+        </p:nvSpPr>
+        <p:spPr>
+          <a:xfrm>
+            <a:off x="0" y="0"/>
+            <a:ext cx="12192000" cy="6858000"/>
+          </a:xfrm>
+          <a:prstGeom prst="rect">
+            <a:avLst/>
+          </a:prstGeom>
+          <a:ln>
+            <a:noFill/>
+          </a:ln>
+        </p:spPr>
+        <p:style>
+          <a:lnRef idx="2">
+            <a:schemeClr val="accent1">
+              <a:shade val="50000"/>
+            </a:schemeClr>
+          </a:lnRef>
+          <a:fillRef idx="1">
+            <a:schemeClr val="accent1"/>
+          </a:fillRef>
+          <a:effectRef idx="0">
+            <a:schemeClr val="accent1"/>
+          </a:effectRef>
+          <a:fontRef idx="minor">
+            <a:schemeClr val="lt1"/>
+          </a:fontRef>
+        </p:style>
+        <p:txBody>
+          <a:bodyPr rtlCol="0" anchor="ctr"/>
+          <a:lstStyle/>
+          <a:p>
+            <a:pPr algn="ctr"/>
+            <a:endParaRPr lang="en-US"/>
+          </a:p>
+        </p:txBody>
+      </p:sp>
+      <p:pic>
+        <p:nvPicPr>
+          <p:cNvPr id="5" name="Content Placeholder 4">
+            <a:extLst>
+              <a:ext uri="{FF2B5EF4-FFF2-40B4-BE49-F238E27FC236}">
+                <a16:creationId xmlns:a16="http://schemas.microsoft.com/office/drawing/2014/main" id="{69F7A8CA-DFD2-0243-B2DC-8817C6509E22}"/>
+              </a:ext>
+              <a:ext uri="{C183D7F6-B498-43B3-948B-1728B52AA6E4}">
+                <adec:decorative xmlns:adec="http://schemas.microsoft.com/office/drawing/2017/decorative" val="1"/>
+              </a:ext>
+            </a:extLst>
+          </p:cNvPr>
+          <p:cNvPicPr>
+            <a:picLocks noChangeAspect="1"/>
+          </p:cNvPicPr>
+          <p:nvPr/>
+        </p:nvPicPr>
+        <p:blipFill rotWithShape="1">
+          <a:blip r:embed="rId2"/>
+          <a:srcRect l="15361" r="14241"/>
+          <a:stretch/>
+        </p:blipFill>
+        <p:spPr>
+          <a:xfrm>
+            <a:off x="7364078" y="-18"/>
+            <a:ext cx="4827922" cy="6857999"/>
+          </a:xfrm>
+          <a:custGeom>
+            <a:avLst/>
+            <a:gdLst/>
+            <a:ahLst/>
+            <a:cxnLst/>
+            <a:rect l="l" t="t" r="r" b="b"/>
+            <a:pathLst>
+              <a:path w="4827922" h="6858000">
+                <a:moveTo>
+                  <a:pt x="4441" y="0"/>
+                </a:moveTo>
+                <a:lnTo>
+                  <a:pt x="4827922" y="0"/>
+                </a:lnTo>
+                <a:lnTo>
+                  <a:pt x="4827922" y="6858000"/>
+                </a:lnTo>
+                <a:lnTo>
+                  <a:pt x="0" y="6858000"/>
+                </a:lnTo>
+                <a:lnTo>
+                  <a:pt x="106674" y="6638378"/>
+                </a:lnTo>
+                <a:cubicBezTo>
+                  <a:pt x="530028" y="5720938"/>
+                  <a:pt x="777229" y="4614948"/>
+                  <a:pt x="777229" y="3424428"/>
+                </a:cubicBezTo>
+                <a:cubicBezTo>
+                  <a:pt x="777229" y="2233909"/>
+                  <a:pt x="530028" y="1127919"/>
+                  <a:pt x="106674" y="210478"/>
+                </a:cubicBezTo>
+                <a:close/>
+              </a:path>
+            </a:pathLst>
+          </a:custGeom>
+        </p:spPr>
+      </p:pic>
+      <p:pic>
+        <p:nvPicPr>
+          <p:cNvPr id="10" name="Content Placeholder 9">
+            <a:extLst>
+              <a:ext uri="{FF2B5EF4-FFF2-40B4-BE49-F238E27FC236}">
+                <a16:creationId xmlns:a16="http://schemas.microsoft.com/office/drawing/2014/main" id="{D738CDC6-9D58-1A4B-938D-E1EE52CEA648}"/>
+              </a:ext>
+            </a:extLst>
+          </p:cNvPr>
+          <p:cNvPicPr>
+            <a:picLocks noChangeAspect="1"/>
+          </p:cNvPicPr>
+          <p:nvPr/>
+        </p:nvPicPr>
+        <p:blipFill rotWithShape="1">
+          <a:blip r:embed="rId3"/>
+          <a:srcRect l="11608" r="9465"/>
+          <a:stretch/>
+        </p:blipFill>
+        <p:spPr>
+          <a:xfrm>
+            <a:off x="3119360" y="18"/>
+            <a:ext cx="4966290" cy="6857999"/>
+          </a:xfrm>
+          <a:custGeom>
+            <a:avLst/>
+            <a:gdLst/>
+            <a:ahLst/>
+            <a:cxnLst/>
+            <a:rect l="l" t="t" r="r" b="b"/>
+            <a:pathLst>
+              <a:path w="4966290" h="6857999">
+                <a:moveTo>
+                  <a:pt x="0" y="0"/>
+                </a:moveTo>
+                <a:lnTo>
+                  <a:pt x="4188230" y="0"/>
+                </a:lnTo>
+                <a:lnTo>
+                  <a:pt x="4295735" y="210478"/>
+                </a:lnTo>
+                <a:cubicBezTo>
+                  <a:pt x="4719089" y="1127919"/>
+                  <a:pt x="4966290" y="2233909"/>
+                  <a:pt x="4966290" y="3424428"/>
+                </a:cubicBezTo>
+                <a:cubicBezTo>
+                  <a:pt x="4966290" y="4614948"/>
+                  <a:pt x="4719089" y="5720938"/>
+                  <a:pt x="4295735" y="6638378"/>
+                </a:cubicBezTo>
+                <a:lnTo>
+                  <a:pt x="4183560" y="6857999"/>
+                </a:lnTo>
+                <a:lnTo>
+                  <a:pt x="53039" y="6857999"/>
+                </a:lnTo>
+                <a:lnTo>
+                  <a:pt x="132047" y="6695338"/>
+                </a:lnTo>
+                <a:cubicBezTo>
+                  <a:pt x="555401" y="5777898"/>
+                  <a:pt x="802602" y="4671908"/>
+                  <a:pt x="802602" y="3481388"/>
+                </a:cubicBezTo>
+                <a:cubicBezTo>
+                  <a:pt x="802602" y="2191659"/>
+                  <a:pt x="512484" y="1001134"/>
+                  <a:pt x="22579" y="42066"/>
+                </a:cubicBezTo>
+                <a:close/>
+              </a:path>
+            </a:pathLst>
+          </a:custGeom>
+        </p:spPr>
+      </p:pic>
+      <p:sp useBgFill="1">
+        <p:nvSpPr>
+          <p:cNvPr id="34" name="Freeform: Shape 33">
+            <a:extLst>
+              <a:ext uri="{FF2B5EF4-FFF2-40B4-BE49-F238E27FC236}">
+                <a16:creationId xmlns:a16="http://schemas.microsoft.com/office/drawing/2014/main" id="{4EA91930-66BC-4C41-B4F5-C31EB216F64B}"/>
+              </a:ext>
+              <a:ext uri="{C183D7F6-B498-43B3-948B-1728B52AA6E4}">
+                <adec:decorative xmlns:adec="http://schemas.microsoft.com/office/drawing/2017/decorative" val="1"/>
+              </a:ext>
+            </a:extLst>
+          </p:cNvPr>
+          <p:cNvSpPr>
+            <a:spLocks noGrp="1" noRot="1" noChangeAspect="1" noMove="1" noResize="1" noEditPoints="1" noAdjustHandles="1" noChangeArrowheads="1" noChangeShapeType="1" noTextEdit="1"/>
+          </p:cNvSpPr>
+          <p:nvPr>
+            <p:extLst>
+              <p:ext uri="{386F3935-93C4-4BCD-93E2-E3B085C9AB24}">
+                <p16:designElem xmlns:p16="http://schemas.microsoft.com/office/powerpoint/2015/main" val="1"/>
+              </p:ext>
+            </p:extLst>
+          </p:nvPr>
+        </p:nvSpPr>
+        <p:spPr>
+          <a:xfrm>
+            <a:off x="0" y="0"/>
+            <a:ext cx="3945815" cy="6858000"/>
+          </a:xfrm>
+          <a:custGeom>
+            <a:avLst/>
+            <a:gdLst>
+              <a:gd name="connsiteX0" fmla="*/ 0 w 3945815"/>
+              <a:gd name="connsiteY0" fmla="*/ 0 h 6858000"/>
+              <a:gd name="connsiteX1" fmla="*/ 3138662 w 3945815"/>
+              <a:gd name="connsiteY1" fmla="*/ 0 h 6858000"/>
+              <a:gd name="connsiteX2" fmla="*/ 3275260 w 3945815"/>
+              <a:gd name="connsiteY2" fmla="*/ 267438 h 6858000"/>
+              <a:gd name="connsiteX3" fmla="*/ 3945815 w 3945815"/>
+              <a:gd name="connsiteY3" fmla="*/ 3481388 h 6858000"/>
+              <a:gd name="connsiteX4" fmla="*/ 3275260 w 3945815"/>
+              <a:gd name="connsiteY4" fmla="*/ 6695338 h 6858000"/>
+              <a:gd name="connsiteX5" fmla="*/ 3192177 w 3945815"/>
+              <a:gd name="connsiteY5" fmla="*/ 6858000 h 6858000"/>
+              <a:gd name="connsiteX6" fmla="*/ 0 w 3945815"/>
+              <a:gd name="connsiteY6" fmla="*/ 6858000 h 6858000"/>
+            </a:gdLst>
+            <a:ahLst/>
+            <a:cxnLst>
+              <a:cxn ang="0">
+                <a:pos x="connsiteX0" y="connsiteY0"/>
+              </a:cxn>
+              <a:cxn ang="0">
+                <a:pos x="connsiteX1" y="connsiteY1"/>
+              </a:cxn>
+              <a:cxn ang="0">
+                <a:pos x="connsiteX2" y="connsiteY2"/>
+              </a:cxn>
+              <a:cxn ang="0">
+                <a:pos x="connsiteX3" y="connsiteY3"/>
+              </a:cxn>
+              <a:cxn ang="0">
+                <a:pos x="connsiteX4" y="connsiteY4"/>
+              </a:cxn>
+              <a:cxn ang="0">
+                <a:pos x="connsiteX5" y="connsiteY5"/>
+              </a:cxn>
+              <a:cxn ang="0">
+                <a:pos x="connsiteX6" y="connsiteY6"/>
+              </a:cxn>
+            </a:cxnLst>
+            <a:rect l="l" t="t" r="r" b="b"/>
+            <a:pathLst>
+              <a:path w="3945815" h="6858000">
+                <a:moveTo>
+                  <a:pt x="0" y="0"/>
+                </a:moveTo>
+                <a:lnTo>
+                  <a:pt x="3138662" y="0"/>
+                </a:lnTo>
+                <a:lnTo>
+                  <a:pt x="3275260" y="267438"/>
+                </a:lnTo>
+                <a:cubicBezTo>
+                  <a:pt x="3698614" y="1184879"/>
+                  <a:pt x="3945815" y="2290869"/>
+                  <a:pt x="3945815" y="3481388"/>
+                </a:cubicBezTo>
+                <a:cubicBezTo>
+                  <a:pt x="3945815" y="4671908"/>
+                  <a:pt x="3698614" y="5777898"/>
+                  <a:pt x="3275260" y="6695338"/>
+                </a:cubicBezTo>
+                <a:lnTo>
+                  <a:pt x="3192177" y="6858000"/>
+                </a:lnTo>
+                <a:lnTo>
+                  <a:pt x="0" y="6858000"/>
+                </a:lnTo>
+                <a:close/>
+              </a:path>
+            </a:pathLst>
+          </a:custGeom>
+          <a:ln w="9525">
+            <a:solidFill>
+              <a:schemeClr val="tx2">
+                <a:lumMod val="10000"/>
+                <a:lumOff val="90000"/>
+              </a:schemeClr>
+            </a:solidFill>
+          </a:ln>
+          <a:effectLst>
+            <a:outerShdw blurRad="50800" dist="38100" algn="l" rotWithShape="0">
+              <a:schemeClr val="bg1">
+                <a:lumMod val="85000"/>
+                <a:alpha val="30000"/>
+              </a:schemeClr>
+            </a:outerShdw>
+          </a:effectLst>
+        </p:spPr>
+        <p:style>
+          <a:lnRef idx="2">
+            <a:schemeClr val="accent1">
+              <a:shade val="50000"/>
+            </a:schemeClr>
+          </a:lnRef>
+          <a:fillRef idx="1">
+            <a:schemeClr val="accent1"/>
+          </a:fillRef>
+          <a:effectRef idx="0">
+            <a:schemeClr val="accent1"/>
+          </a:effectRef>
+          <a:fontRef idx="minor">
+            <a:schemeClr val="lt1"/>
+          </a:fontRef>
+        </p:style>
+        <p:txBody>
+          <a:bodyPr wrap="square" rtlCol="0" anchor="ctr">
+            <a:noAutofit/>
+          </a:bodyPr>
+          <a:lstStyle/>
+          <a:p>
+            <a:pPr marL="0" marR="0" lvl="0" indent="0" algn="ctr" defTabSz="914400" rtl="0" eaLnBrk="1" fontAlgn="auto" latinLnBrk="0" hangingPunct="1">
+              <a:lnSpc>
+                <a:spcPct val="100000"/>
+              </a:lnSpc>
+              <a:spcBef>
+                <a:spcPts val="0"/>
+              </a:spcBef>
+              <a:spcAft>
+                <a:spcPts val="0"/>
+              </a:spcAft>
+              <a:buClrTx/>
+              <a:buSzTx/>
+              <a:buFontTx/>
+              <a:buNone/>
+              <a:tabLst/>
+              <a:defRPr/>
+            </a:pPr>
+            <a:endParaRPr kumimoji="0" lang="en-US" sz="1800" b="0" i="0" u="none" strike="noStrike" kern="1200" cap="none" spc="0" normalizeH="0" baseline="0" noProof="0">
+              <a:ln>
+                <a:noFill/>
+              </a:ln>
+              <a:solidFill>
+                <a:prstClr val="white"/>
+              </a:solidFill>
+              <a:effectLst/>
+              <a:uLnTx/>
+              <a:uFillTx/>
+              <a:latin typeface="Calibri" panose="020F0502020204030204"/>
+              <a:ea typeface="+mn-ea"/>
+              <a:cs typeface="+mn-cs"/>
+            </a:endParaRPr>
+          </a:p>
+        </p:txBody>
+      </p:sp>
+      <p:sp useBgFill="1">
+        <p:nvSpPr>
+          <p:cNvPr id="36" name="Freeform: Shape 35">
+            <a:extLst>
+              <a:ext uri="{FF2B5EF4-FFF2-40B4-BE49-F238E27FC236}">
+                <a16:creationId xmlns:a16="http://schemas.microsoft.com/office/drawing/2014/main" id="{6313CF8F-B436-401E-9575-DE0F8E8B5B17}"/>
+              </a:ext>
+              <a:ext uri="{C183D7F6-B498-43B3-948B-1728B52AA6E4}">
+                <adec:decorative xmlns:adec="http://schemas.microsoft.com/office/drawing/2017/decorative" val="1"/>
+              </a:ext>
+            </a:extLst>
+          </p:cNvPr>
+          <p:cNvSpPr>
+            <a:spLocks noGrp="1" noRot="1" noChangeAspect="1" noMove="1" noResize="1" noEditPoints="1" noAdjustHandles="1" noChangeArrowheads="1" noChangeShapeType="1" noTextEdit="1"/>
+          </p:cNvSpPr>
+          <p:nvPr>
+            <p:extLst>
+              <p:ext uri="{386F3935-93C4-4BCD-93E2-E3B085C9AB24}">
+                <p16:designElem xmlns:p16="http://schemas.microsoft.com/office/powerpoint/2015/main" val="1"/>
+              </p:ext>
+            </p:extLst>
+          </p:nvPr>
+        </p:nvSpPr>
+        <p:spPr>
+          <a:xfrm>
+            <a:off x="0" y="0"/>
+            <a:ext cx="3936670" cy="6858000"/>
+          </a:xfrm>
+          <a:custGeom>
+            <a:avLst/>
+            <a:gdLst>
+              <a:gd name="connsiteX0" fmla="*/ 0 w 3936670"/>
+              <a:gd name="connsiteY0" fmla="*/ 0 h 6858000"/>
+              <a:gd name="connsiteX1" fmla="*/ 3129517 w 3936670"/>
+              <a:gd name="connsiteY1" fmla="*/ 0 h 6858000"/>
+              <a:gd name="connsiteX2" fmla="*/ 3266115 w 3936670"/>
+              <a:gd name="connsiteY2" fmla="*/ 267438 h 6858000"/>
+              <a:gd name="connsiteX3" fmla="*/ 3936670 w 3936670"/>
+              <a:gd name="connsiteY3" fmla="*/ 3481388 h 6858000"/>
+              <a:gd name="connsiteX4" fmla="*/ 3266115 w 3936670"/>
+              <a:gd name="connsiteY4" fmla="*/ 6695338 h 6858000"/>
+              <a:gd name="connsiteX5" fmla="*/ 3183032 w 3936670"/>
+              <a:gd name="connsiteY5" fmla="*/ 6858000 h 6858000"/>
+              <a:gd name="connsiteX6" fmla="*/ 0 w 3936670"/>
+              <a:gd name="connsiteY6" fmla="*/ 6858000 h 6858000"/>
+            </a:gdLst>
+            <a:ahLst/>
+            <a:cxnLst>
+              <a:cxn ang="0">
+                <a:pos x="connsiteX0" y="connsiteY0"/>
+              </a:cxn>
+              <a:cxn ang="0">
+                <a:pos x="connsiteX1" y="connsiteY1"/>
+              </a:cxn>
+              <a:cxn ang="0">
+                <a:pos x="connsiteX2" y="connsiteY2"/>
+              </a:cxn>
+              <a:cxn ang="0">
+                <a:pos x="connsiteX3" y="connsiteY3"/>
+              </a:cxn>
+              <a:cxn ang="0">
+                <a:pos x="connsiteX4" y="connsiteY4"/>
+              </a:cxn>
+              <a:cxn ang="0">
+                <a:pos x="connsiteX5" y="connsiteY5"/>
+              </a:cxn>
+              <a:cxn ang="0">
+                <a:pos x="connsiteX6" y="connsiteY6"/>
+              </a:cxn>
+            </a:cxnLst>
+            <a:rect l="l" t="t" r="r" b="b"/>
+            <a:pathLst>
+              <a:path w="3936670" h="6858000">
+                <a:moveTo>
+                  <a:pt x="0" y="0"/>
+                </a:moveTo>
+                <a:lnTo>
+                  <a:pt x="3129517" y="0"/>
+                </a:lnTo>
+                <a:lnTo>
+                  <a:pt x="3266115" y="267438"/>
+                </a:lnTo>
+                <a:cubicBezTo>
+                  <a:pt x="3689469" y="1184879"/>
+                  <a:pt x="3936670" y="2290869"/>
+                  <a:pt x="3936670" y="3481388"/>
+                </a:cubicBezTo>
+                <a:cubicBezTo>
+                  <a:pt x="3936670" y="4671908"/>
+                  <a:pt x="3689469" y="5777898"/>
+                  <a:pt x="3266115" y="6695338"/>
+                </a:cubicBezTo>
+                <a:lnTo>
+                  <a:pt x="3183032" y="6858000"/>
+                </a:lnTo>
+                <a:lnTo>
+                  <a:pt x="0" y="6858000"/>
+                </a:lnTo>
+                <a:close/>
+              </a:path>
+            </a:pathLst>
+          </a:custGeom>
+          <a:ln w="9525">
+            <a:noFill/>
+          </a:ln>
+          <a:effectLst/>
+        </p:spPr>
+        <p:style>
+          <a:lnRef idx="2">
+            <a:schemeClr val="accent1">
+              <a:shade val="50000"/>
+            </a:schemeClr>
+          </a:lnRef>
+          <a:fillRef idx="1">
+            <a:schemeClr val="accent1"/>
+          </a:fillRef>
+          <a:effectRef idx="0">
+            <a:schemeClr val="accent1"/>
+          </a:effectRef>
+          <a:fontRef idx="minor">
+            <a:schemeClr val="lt1"/>
+          </a:fontRef>
+        </p:style>
+        <p:txBody>
+          <a:bodyPr wrap="square" rtlCol="0" anchor="ctr">
+            <a:noAutofit/>
+          </a:bodyPr>
+          <a:lstStyle/>
+          <a:p>
+            <a:pPr marL="0" marR="0" lvl="0" indent="0" algn="ctr" defTabSz="914400" rtl="0" eaLnBrk="1" fontAlgn="auto" latinLnBrk="0" hangingPunct="1">
+              <a:lnSpc>
+                <a:spcPct val="100000"/>
+              </a:lnSpc>
+              <a:spcBef>
+                <a:spcPts val="0"/>
+              </a:spcBef>
+              <a:spcAft>
+                <a:spcPts val="0"/>
+              </a:spcAft>
+              <a:buClrTx/>
+              <a:buSzTx/>
+              <a:buFontTx/>
+              <a:buNone/>
+              <a:tabLst/>
+              <a:defRPr/>
+            </a:pPr>
+            <a:endParaRPr kumimoji="0" lang="en-US" sz="1800" b="0" i="0" u="none" strike="noStrike" kern="1200" cap="none" spc="0" normalizeH="0" baseline="0" noProof="0">
+              <a:ln>
+                <a:noFill/>
+              </a:ln>
+              <a:solidFill>
+                <a:prstClr val="white"/>
+              </a:solidFill>
+              <a:effectLst/>
+              <a:uLnTx/>
+              <a:uFillTx/>
+              <a:latin typeface="Calibri" panose="020F0502020204030204"/>
+              <a:ea typeface="+mn-ea"/>
+              <a:cs typeface="+mn-cs"/>
+            </a:endParaRPr>
+          </a:p>
+        </p:txBody>
+      </p:sp>
+      <p:sp>
+        <p:nvSpPr>
+          <p:cNvPr id="2" name="Title 1">
+            <a:extLst>
+              <a:ext uri="{FF2B5EF4-FFF2-40B4-BE49-F238E27FC236}">
+                <a16:creationId xmlns:a16="http://schemas.microsoft.com/office/drawing/2014/main" id="{D22BC9F0-495B-E640-BC32-12185CDE5BF0}"/>
+              </a:ext>
+            </a:extLst>
+          </p:cNvPr>
+          <p:cNvSpPr>
+            <a:spLocks noGrp="1"/>
+          </p:cNvSpPr>
+          <p:nvPr>
+            <p:ph type="title"/>
+          </p:nvPr>
+        </p:nvSpPr>
+        <p:spPr>
+          <a:xfrm>
+            <a:off x="445274" y="681038"/>
+            <a:ext cx="2804504" cy="1325563"/>
+          </a:xfrm>
+        </p:spPr>
+        <p:txBody>
+          <a:bodyPr anchor="ctr">
+            <a:normAutofit/>
+          </a:bodyPr>
+          <a:lstStyle/>
+          <a:p>
+            <a:r>
+              <a:rPr lang="en-US" sz="2800"/>
+              <a:t>KC Crime Data </a:t>
+            </a:r>
+            <a:br>
+              <a:rPr lang="en-US" sz="2800"/>
+            </a:br>
+            <a:r>
+              <a:rPr lang="en-US" sz="2800"/>
+              <a:t>COVID Data </a:t>
+            </a:r>
+          </a:p>
+        </p:txBody>
+      </p:sp>
+      <p:sp>
+        <p:nvSpPr>
+          <p:cNvPr id="38" name="Rectangle 37">
+            <a:extLst>
+              <a:ext uri="{FF2B5EF4-FFF2-40B4-BE49-F238E27FC236}">
+                <a16:creationId xmlns:a16="http://schemas.microsoft.com/office/drawing/2014/main" id="{2A38CFE9-C30A-4551-ACCB-D5808FBC39CD}"/>
+              </a:ext>
+              <a:ext uri="{C183D7F6-B498-43B3-948B-1728B52AA6E4}">
+                <adec:decorative xmlns:adec="http://schemas.microsoft.com/office/drawing/2017/decorative" val="1"/>
+              </a:ext>
+            </a:extLst>
+          </p:cNvPr>
+          <p:cNvSpPr>
+            <a:spLocks noGrp="1" noRot="1" noChangeAspect="1" noMove="1" noResize="1" noEditPoints="1" noAdjustHandles="1" noChangeArrowheads="1" noChangeShapeType="1" noTextEdit="1"/>
+          </p:cNvSpPr>
+          <p:nvPr>
+            <p:extLst>
+              <p:ext uri="{386F3935-93C4-4BCD-93E2-E3B085C9AB24}">
+                <p16:designElem xmlns:p16="http://schemas.microsoft.com/office/powerpoint/2015/main" val="1"/>
+              </p:ext>
+            </p:extLst>
+          </p:nvPr>
+        </p:nvSpPr>
+        <p:spPr>
+          <a:xfrm>
+            <a:off x="0" y="1016867"/>
+            <a:ext cx="128016" cy="653903"/>
+          </a:xfrm>
+          <a:prstGeom prst="rect">
+            <a:avLst/>
+          </a:prstGeom>
+          <a:solidFill>
+            <a:schemeClr val="accent1"/>
+          </a:solidFill>
+          <a:ln>
+            <a:noFill/>
+          </a:ln>
+        </p:spPr>
+        <p:style>
+          <a:lnRef idx="2">
+            <a:schemeClr val="accent1">
+              <a:shade val="50000"/>
+            </a:schemeClr>
+          </a:lnRef>
+          <a:fillRef idx="1">
+            <a:schemeClr val="accent1"/>
+          </a:fillRef>
+          <a:effectRef idx="0">
+            <a:schemeClr val="accent1"/>
+          </a:effectRef>
+          <a:fontRef idx="minor">
+            <a:schemeClr val="lt1"/>
+          </a:fontRef>
+        </p:style>
+        <p:txBody>
+          <a:bodyPr rtlCol="0" anchor="ctr"/>
+          <a:lstStyle/>
+          <a:p>
+            <a:pPr marL="0" marR="0" lvl="0" indent="0" algn="ctr" defTabSz="914400" rtl="0" eaLnBrk="1" fontAlgn="auto" latinLnBrk="0" hangingPunct="1">
+              <a:lnSpc>
+                <a:spcPct val="100000"/>
+              </a:lnSpc>
+              <a:spcBef>
+                <a:spcPts val="0"/>
+              </a:spcBef>
+              <a:spcAft>
+                <a:spcPts val="0"/>
+              </a:spcAft>
+              <a:buClrTx/>
+              <a:buSzTx/>
+              <a:buFontTx/>
+              <a:buNone/>
+              <a:tabLst/>
+              <a:defRPr/>
+            </a:pPr>
+            <a:endParaRPr kumimoji="0" lang="en-US" sz="1800" b="0" i="0" u="none" strike="noStrike" kern="1200" cap="none" spc="0" normalizeH="0" baseline="0" noProof="0">
+              <a:ln>
+                <a:noFill/>
+              </a:ln>
+              <a:solidFill>
+                <a:prstClr val="white"/>
+              </a:solidFill>
+              <a:effectLst/>
+              <a:uLnTx/>
+              <a:uFillTx/>
+              <a:latin typeface="Calibri" panose="020F0502020204030204"/>
+              <a:ea typeface="+mn-ea"/>
+              <a:cs typeface="+mn-cs"/>
+            </a:endParaRPr>
+          </a:p>
+        </p:txBody>
+      </p:sp>
+      <p:sp>
+        <p:nvSpPr>
+          <p:cNvPr id="40" name="Rectangle 39">
+            <a:extLst>
+              <a:ext uri="{FF2B5EF4-FFF2-40B4-BE49-F238E27FC236}">
+                <a16:creationId xmlns:a16="http://schemas.microsoft.com/office/drawing/2014/main" id="{67EF550F-47CE-4FB2-9DAC-12AD835C833D}"/>
+              </a:ext>
+              <a:ext uri="{C183D7F6-B498-43B3-948B-1728B52AA6E4}">
+                <adec:decorative xmlns:adec="http://schemas.microsoft.com/office/drawing/2017/decorative" val="1"/>
+              </a:ext>
+            </a:extLst>
+          </p:cNvPr>
+          <p:cNvSpPr>
+            <a:spLocks noGrp="1" noRot="1" noChangeAspect="1" noMove="1" noResize="1" noEditPoints="1" noAdjustHandles="1" noChangeArrowheads="1" noChangeShapeType="1" noTextEdit="1"/>
+          </p:cNvSpPr>
+          <p:nvPr>
+            <p:extLst>
+              <p:ext uri="{386F3935-93C4-4BCD-93E2-E3B085C9AB24}">
+                <p16:designElem xmlns:p16="http://schemas.microsoft.com/office/powerpoint/2015/main" val="1"/>
+              </p:ext>
+            </p:extLst>
+          </p:nvPr>
+        </p:nvSpPr>
+        <p:spPr>
+          <a:xfrm>
+            <a:off x="438912" y="2089941"/>
+            <a:ext cx="2834640" cy="18288"/>
+          </a:xfrm>
+          <a:prstGeom prst="rect">
+            <a:avLst/>
+          </a:prstGeom>
+          <a:solidFill>
+            <a:schemeClr val="tx2">
+              <a:lumMod val="25000"/>
+              <a:lumOff val="75000"/>
+            </a:schemeClr>
+          </a:solidFill>
+          <a:ln w="3175">
+            <a:noFill/>
+          </a:ln>
+          <a:effectLst/>
+        </p:spPr>
+        <p:style>
+          <a:lnRef idx="2">
+            <a:schemeClr val="accent1">
+              <a:shade val="50000"/>
+            </a:schemeClr>
+          </a:lnRef>
+          <a:fillRef idx="1">
+            <a:schemeClr val="accent1"/>
+          </a:fillRef>
+          <a:effectRef idx="0">
+            <a:schemeClr val="accent1"/>
+          </a:effectRef>
+          <a:fontRef idx="minor">
+            <a:schemeClr val="lt1"/>
+          </a:fontRef>
+        </p:style>
+        <p:txBody>
+          <a:bodyPr rtlCol="0" anchor="ctr"/>
+          <a:lstStyle/>
+          <a:p>
+            <a:pPr marL="0" marR="0" lvl="0" indent="0" algn="ctr" defTabSz="914400" rtl="0" eaLnBrk="1" fontAlgn="auto" latinLnBrk="0" hangingPunct="1">
+              <a:lnSpc>
+                <a:spcPct val="100000"/>
+              </a:lnSpc>
+              <a:spcBef>
+                <a:spcPts val="0"/>
+              </a:spcBef>
+              <a:spcAft>
+                <a:spcPts val="0"/>
+              </a:spcAft>
+              <a:buClrTx/>
+              <a:buSzTx/>
+              <a:buFontTx/>
+              <a:buNone/>
+              <a:tabLst/>
+              <a:defRPr/>
+            </a:pPr>
+            <a:endParaRPr kumimoji="0" lang="en-US" sz="1800" b="0" i="0" u="none" strike="noStrike" kern="1200" cap="none" spc="0" normalizeH="0" baseline="0" noProof="0">
+              <a:ln>
+                <a:noFill/>
+              </a:ln>
+              <a:solidFill>
+                <a:prstClr val="white"/>
+              </a:solidFill>
+              <a:effectLst/>
+              <a:uLnTx/>
+              <a:uFillTx/>
+              <a:latin typeface="Calibri" panose="020F0502020204030204"/>
+              <a:ea typeface="+mn-ea"/>
+              <a:cs typeface="+mn-cs"/>
+            </a:endParaRPr>
+          </a:p>
+        </p:txBody>
+      </p:sp>
+      <p:sp>
+        <p:nvSpPr>
+          <p:cNvPr id="29" name="Content Placeholder 28">
+            <a:extLst>
+              <a:ext uri="{FF2B5EF4-FFF2-40B4-BE49-F238E27FC236}">
+                <a16:creationId xmlns:a16="http://schemas.microsoft.com/office/drawing/2014/main" id="{79255222-5F05-4B02-974A-36F88B261388}"/>
+              </a:ext>
+            </a:extLst>
+          </p:cNvPr>
+          <p:cNvSpPr>
+            <a:spLocks noGrp="1"/>
+          </p:cNvSpPr>
+          <p:nvPr>
+            <p:ph idx="1"/>
+          </p:nvPr>
+        </p:nvSpPr>
+        <p:spPr>
+          <a:xfrm>
+            <a:off x="445274" y="2258171"/>
+            <a:ext cx="2804504" cy="3918792"/>
+          </a:xfrm>
+        </p:spPr>
+        <p:txBody>
+          <a:bodyPr>
+            <a:normAutofit/>
+          </a:bodyPr>
+          <a:lstStyle/>
+          <a:p>
+            <a:endParaRPr lang="en-US" sz="1800"/>
+          </a:p>
+        </p:txBody>
+      </p:sp>
+      <p:sp>
+        <p:nvSpPr>
+          <p:cNvPr id="9" name="Right Arrow 8">
+            <a:extLst>
+              <a:ext uri="{FF2B5EF4-FFF2-40B4-BE49-F238E27FC236}">
+                <a16:creationId xmlns:a16="http://schemas.microsoft.com/office/drawing/2014/main" id="{4D0DCA35-0AEB-7D41-945E-6E626E2C8B9B}"/>
+              </a:ext>
+            </a:extLst>
+          </p:cNvPr>
+          <p:cNvSpPr/>
+          <p:nvPr/>
+        </p:nvSpPr>
+        <p:spPr>
+          <a:xfrm>
+            <a:off x="4114800" y="727164"/>
+            <a:ext cx="478971" cy="365223"/>
+          </a:xfrm>
+          <a:prstGeom prst="rightArrow">
+            <a:avLst>
+              <a:gd name="adj1" fmla="val 44039"/>
+              <a:gd name="adj2" fmla="val 50000"/>
+            </a:avLst>
+          </a:prstGeom>
+        </p:spPr>
+        <p:style>
+          <a:lnRef idx="2">
+            <a:schemeClr val="accent2">
+              <a:shade val="50000"/>
+            </a:schemeClr>
+          </a:lnRef>
+          <a:fillRef idx="1">
+            <a:schemeClr val="accent2"/>
+          </a:fillRef>
+          <a:effectRef idx="0">
+            <a:schemeClr val="accent2"/>
+          </a:effectRef>
+          <a:fontRef idx="minor">
+            <a:schemeClr val="lt1"/>
+          </a:fontRef>
+        </p:style>
+        <p:txBody>
+          <a:bodyPr rtlCol="0" anchor="ctr"/>
+          <a:lstStyle/>
+          <a:p>
+            <a:pPr algn="ctr"/>
+            <a:endParaRPr lang="en-US"/>
+          </a:p>
+        </p:txBody>
+      </p:sp>
+      <p:sp>
+        <p:nvSpPr>
+          <p:cNvPr id="11" name="Down Arrow 10">
+            <a:extLst>
+              <a:ext uri="{FF2B5EF4-FFF2-40B4-BE49-F238E27FC236}">
+                <a16:creationId xmlns:a16="http://schemas.microsoft.com/office/drawing/2014/main" id="{5A0D3D0E-2535-3944-AC1E-6DD4FB3EF000}"/>
+              </a:ext>
+            </a:extLst>
+          </p:cNvPr>
+          <p:cNvSpPr/>
+          <p:nvPr/>
+        </p:nvSpPr>
+        <p:spPr>
+          <a:xfrm>
+            <a:off x="3537857" y="1219701"/>
+            <a:ext cx="359229" cy="420831"/>
+          </a:xfrm>
+          <a:prstGeom prst="downArrow">
+            <a:avLst/>
+          </a:prstGeom>
+        </p:spPr>
+        <p:style>
+          <a:lnRef idx="2">
+            <a:schemeClr val="accent2">
+              <a:shade val="50000"/>
+            </a:schemeClr>
+          </a:lnRef>
+          <a:fillRef idx="1">
+            <a:schemeClr val="accent2"/>
+          </a:fillRef>
+          <a:effectRef idx="0">
+            <a:schemeClr val="accent2"/>
+          </a:effectRef>
+          <a:fontRef idx="minor">
+            <a:schemeClr val="lt1"/>
+          </a:fontRef>
+        </p:style>
+        <p:txBody>
+          <a:bodyPr rtlCol="0" anchor="ctr"/>
+          <a:lstStyle/>
+          <a:p>
+            <a:pPr algn="ctr"/>
+            <a:endParaRPr lang="en-US"/>
+          </a:p>
+        </p:txBody>
+      </p:sp>
+    </p:spTree>
+    <p:extLst>
+      <p:ext uri="{BB962C8B-B14F-4D97-AF65-F5344CB8AC3E}">
+        <p14:creationId xmlns:p14="http://schemas.microsoft.com/office/powerpoint/2010/main" val="948131687"/>
+      </p:ext>
+    </p:extLst>
+  </p:cSld>
+  <p:clrMapOvr>
+    <a:masterClrMapping/>
+  </p:clrMapOvr>
+</p:sld>
+</file>
+
+<file path=ppt/slides/slide7.xml><?xml version="1.0" encoding="utf-8"?>
+<p:sld xmlns:a="http://schemas.openxmlformats.org/drawingml/2006/main" xmlns:r="http://schemas.openxmlformats.org/officeDocument/2006/relationships" xmlns:p="http://schemas.openxmlformats.org/presentationml/2006/main">
+  <p:cSld>
+    <p:bg>
+      <p:bgPr>
+        <a:solidFill>
+          <a:schemeClr val="bg1"/>
+        </a:solidFill>
+        <a:effectLst/>
+      </p:bgPr>
+    </p:bg>
+    <p:spTree>
+      <p:nvGrpSpPr>
+        <p:cNvPr id="1" name=""/>
+        <p:cNvGrpSpPr/>
+        <p:nvPr/>
+      </p:nvGrpSpPr>
+      <p:grpSpPr>
+        <a:xfrm>
+          <a:off x="0" y="0"/>
+          <a:ext cx="0" cy="0"/>
+          <a:chOff x="0" y="0"/>
+          <a:chExt cx="0" cy="0"/>
+        </a:xfrm>
+      </p:grpSpPr>
+      <p:sp useBgFill="1">
+        <p:nvSpPr>
+          <p:cNvPr id="73" name="Rectangle 72">
+            <a:extLst>
+              <a:ext uri="{FF2B5EF4-FFF2-40B4-BE49-F238E27FC236}">
+                <a16:creationId xmlns:a16="http://schemas.microsoft.com/office/drawing/2014/main" id="{E45CA849-654C-4173-AD99-B3A2528275F5}"/>
+              </a:ext>
+              <a:ext uri="{C183D7F6-B498-43B3-948B-1728B52AA6E4}">
+                <adec:decorative xmlns:adec="http://schemas.microsoft.com/office/drawing/2017/decorative" val="1"/>
+              </a:ext>
+            </a:extLst>
+          </p:cNvPr>
+          <p:cNvSpPr>
+            <a:spLocks noGrp="1" noRot="1" noChangeAspect="1" noMove="1" noResize="1" noEditPoints="1" noAdjustHandles="1" noChangeArrowheads="1" noChangeShapeType="1" noTextEdit="1"/>
+          </p:cNvSpPr>
+          <p:nvPr>
+            <p:extLst>
+              <p:ext uri="{386F3935-93C4-4BCD-93E2-E3B085C9AB24}">
+                <p16:designElem xmlns:p16="http://schemas.microsoft.com/office/powerpoint/2015/main" val="1"/>
+              </p:ext>
+            </p:extLst>
+          </p:nvPr>
+        </p:nvSpPr>
+        <p:spPr>
+          <a:xfrm>
+            <a:off x="0" y="0"/>
+            <a:ext cx="12192000" cy="6858000"/>
+          </a:xfrm>
+          <a:prstGeom prst="rect">
+            <a:avLst/>
+          </a:prstGeom>
+          <a:ln>
+            <a:noFill/>
+          </a:ln>
+        </p:spPr>
+        <p:style>
+          <a:lnRef idx="2">
+            <a:schemeClr val="accent1">
+              <a:shade val="50000"/>
+            </a:schemeClr>
+          </a:lnRef>
+          <a:fillRef idx="1">
+            <a:schemeClr val="accent1"/>
+          </a:fillRef>
+          <a:effectRef idx="0">
+            <a:schemeClr val="accent1"/>
+          </a:effectRef>
+          <a:fontRef idx="minor">
+            <a:schemeClr val="lt1"/>
+          </a:fontRef>
+        </p:style>
+        <p:txBody>
+          <a:bodyPr rtlCol="0" anchor="ctr"/>
+          <a:lstStyle/>
+          <a:p>
+            <a:pPr algn="ctr"/>
+            <a:endParaRPr lang="en-US"/>
+          </a:p>
+        </p:txBody>
+      </p:sp>
+      <p:sp>
+        <p:nvSpPr>
+          <p:cNvPr id="2" name="Title 1">
+            <a:extLst>
+              <a:ext uri="{FF2B5EF4-FFF2-40B4-BE49-F238E27FC236}">
+                <a16:creationId xmlns:a16="http://schemas.microsoft.com/office/drawing/2014/main" id="{7107BC43-B322-2F47-952F-C78D18132E21}"/>
+              </a:ext>
+            </a:extLst>
+          </p:cNvPr>
+          <p:cNvSpPr>
+            <a:spLocks noGrp="1"/>
+          </p:cNvSpPr>
+          <p:nvPr>
+            <p:ph type="title"/>
+          </p:nvPr>
+        </p:nvSpPr>
+        <p:spPr>
+          <a:xfrm>
+            <a:off x="429768" y="411480"/>
+            <a:ext cx="11201400" cy="1106424"/>
+          </a:xfrm>
+        </p:spPr>
+        <p:txBody>
+          <a:bodyPr>
+            <a:normAutofit/>
+          </a:bodyPr>
+          <a:lstStyle/>
+          <a:p>
+            <a:r>
+              <a:rPr lang="en-US" sz="3600" dirty="0"/>
+              <a:t>Interesting Findings</a:t>
+            </a:r>
+          </a:p>
+        </p:txBody>
+      </p:sp>
+      <p:sp>
+        <p:nvSpPr>
+          <p:cNvPr id="75" name="Rectangle 74">
+            <a:extLst>
+              <a:ext uri="{FF2B5EF4-FFF2-40B4-BE49-F238E27FC236}">
+                <a16:creationId xmlns:a16="http://schemas.microsoft.com/office/drawing/2014/main" id="{3E23A947-2D45-4208-AE2B-64948C87A3EB}"/>
+              </a:ext>
+              <a:ext uri="{C183D7F6-B498-43B3-948B-1728B52AA6E4}">
+                <adec:decorative xmlns:adec="http://schemas.microsoft.com/office/drawing/2017/decorative" val="1"/>
+              </a:ext>
+            </a:extLst>
+          </p:cNvPr>
+          <p:cNvSpPr>
+            <a:spLocks noGrp="1" noRot="1" noChangeAspect="1" noMove="1" noResize="1" noEditPoints="1" noAdjustHandles="1" noChangeArrowheads="1" noChangeShapeType="1" noTextEdit="1"/>
+          </p:cNvSpPr>
+          <p:nvPr>
+            <p:extLst>
+              <p:ext uri="{386F3935-93C4-4BCD-93E2-E3B085C9AB24}">
+                <p16:designElem xmlns:p16="http://schemas.microsoft.com/office/powerpoint/2015/main" val="1"/>
+              </p:ext>
+            </p:extLst>
+          </p:nvPr>
+        </p:nvSpPr>
+        <p:spPr>
+          <a:xfrm>
+            <a:off x="0" y="587931"/>
+            <a:ext cx="128016" cy="704088"/>
+          </a:xfrm>
+          <a:prstGeom prst="rect">
+            <a:avLst/>
+          </a:prstGeom>
+          <a:solidFill>
+            <a:schemeClr val="accent1"/>
+          </a:solidFill>
+          <a:ln>
+            <a:noFill/>
+          </a:ln>
+        </p:spPr>
+        <p:style>
+          <a:lnRef idx="2">
+            <a:schemeClr val="accent1">
+              <a:shade val="50000"/>
+            </a:schemeClr>
+          </a:lnRef>
+          <a:fillRef idx="1">
+            <a:schemeClr val="accent1"/>
+          </a:fillRef>
+          <a:effectRef idx="0">
+            <a:schemeClr val="accent1"/>
+          </a:effectRef>
+          <a:fontRef idx="minor">
+            <a:schemeClr val="lt1"/>
+          </a:fontRef>
+        </p:style>
+        <p:txBody>
+          <a:bodyPr rtlCol="0" anchor="ctr"/>
+          <a:lstStyle/>
+          <a:p>
+            <a:pPr marL="0" marR="0" lvl="0" indent="0" algn="ctr" defTabSz="914400" rtl="0" eaLnBrk="1" fontAlgn="auto" latinLnBrk="0" hangingPunct="1">
+              <a:lnSpc>
+                <a:spcPct val="100000"/>
+              </a:lnSpc>
+              <a:spcBef>
+                <a:spcPts val="0"/>
+              </a:spcBef>
+              <a:spcAft>
+                <a:spcPts val="0"/>
+              </a:spcAft>
+              <a:buClrTx/>
+              <a:buSzTx/>
+              <a:buFontTx/>
+              <a:buNone/>
+              <a:tabLst/>
+              <a:defRPr/>
+            </a:pPr>
+            <a:endParaRPr kumimoji="0" lang="en-US" sz="1800" b="0" i="0" u="none" strike="noStrike" kern="1200" cap="none" spc="0" normalizeH="0" baseline="0" noProof="0">
+              <a:ln>
+                <a:noFill/>
+              </a:ln>
+              <a:solidFill>
+                <a:prstClr val="white"/>
+              </a:solidFill>
+              <a:effectLst/>
+              <a:uLnTx/>
+              <a:uFillTx/>
+              <a:latin typeface="Calibri" panose="020F0502020204030204"/>
+              <a:ea typeface="+mn-ea"/>
+              <a:cs typeface="+mn-cs"/>
+            </a:endParaRPr>
+          </a:p>
+        </p:txBody>
+      </p:sp>
+      <p:pic>
+        <p:nvPicPr>
+          <p:cNvPr id="1026" name="Picture 2">
+            <a:extLst>
+              <a:ext uri="{FF2B5EF4-FFF2-40B4-BE49-F238E27FC236}">
+                <a16:creationId xmlns:a16="http://schemas.microsoft.com/office/drawing/2014/main" id="{BAF8153F-9722-9D40-B2DE-3752E7A596DD}"/>
+              </a:ext>
+            </a:extLst>
+          </p:cNvPr>
+          <p:cNvPicPr>
+            <a:picLocks noChangeAspect="1" noChangeArrowheads="1"/>
+          </p:cNvPicPr>
+          <p:nvPr/>
+        </p:nvPicPr>
+        <p:blipFill rotWithShape="1">
+          <a:blip r:embed="rId2">
+            <a:extLst>
+              <a:ext uri="{28A0092B-C50C-407E-A947-70E740481C1C}">
+                <a14:useLocalDpi xmlns:a14="http://schemas.microsoft.com/office/drawing/2010/main" val="0"/>
+              </a:ext>
+            </a:extLst>
+          </a:blip>
+          <a:srcRect r="-3" b="6675"/>
+          <a:stretch/>
+        </p:blipFill>
+        <p:spPr bwMode="auto">
+          <a:xfrm>
+            <a:off x="429768" y="1721922"/>
+            <a:ext cx="6071045" cy="4520559"/>
+          </a:xfrm>
+          <a:prstGeom prst="rect">
+            <a:avLst/>
+          </a:prstGeom>
+          <a:noFill/>
+          <a:extLst>
+            <a:ext uri="{909E8E84-426E-40DD-AFC4-6F175D3DCCD1}">
+              <a14:hiddenFill xmlns:a14="http://schemas.microsoft.com/office/drawing/2010/main">
+                <a:solidFill>
+                  <a:srgbClr val="FFFFFF"/>
+                </a:solidFill>
+              </a14:hiddenFill>
+            </a:ext>
+          </a:extLst>
+        </p:spPr>
+      </p:pic>
+      <p:sp useBgFill="1">
+        <p:nvSpPr>
+          <p:cNvPr id="77" name="Rectangle 76">
+            <a:extLst>
+              <a:ext uri="{FF2B5EF4-FFF2-40B4-BE49-F238E27FC236}">
+                <a16:creationId xmlns:a16="http://schemas.microsoft.com/office/drawing/2014/main" id="{E5BBB0F9-6A59-4D02-A9C7-A2D6516684CE}"/>
+              </a:ext>
+              <a:ext uri="{C183D7F6-B498-43B3-948B-1728B52AA6E4}">
+                <adec:decorative xmlns:adec="http://schemas.microsoft.com/office/drawing/2017/decorative" val="1"/>
+              </a:ext>
+            </a:extLst>
+          </p:cNvPr>
+          <p:cNvSpPr>
+            <a:spLocks noGrp="1" noRot="1" noChangeAspect="1" noMove="1" noResize="1" noEditPoints="1" noAdjustHandles="1" noChangeArrowheads="1" noChangeShapeType="1" noTextEdit="1"/>
+          </p:cNvSpPr>
+          <p:nvPr>
+            <p:extLst>
+              <p:ext uri="{386F3935-93C4-4BCD-93E2-E3B085C9AB24}">
+                <p16:designElem xmlns:p16="http://schemas.microsoft.com/office/powerpoint/2015/main" val="1"/>
+              </p:ext>
+            </p:extLst>
+          </p:nvPr>
+        </p:nvSpPr>
+        <p:spPr>
+          <a:xfrm>
+            <a:off x="7543801" y="1721922"/>
+            <a:ext cx="4218432" cy="4520560"/>
+          </a:xfrm>
+          <a:prstGeom prst="rect">
+            <a:avLst/>
+          </a:prstGeom>
+          <a:ln w="9525">
+            <a:solidFill>
+              <a:schemeClr val="tx2">
+                <a:lumMod val="10000"/>
+                <a:lumOff val="90000"/>
+              </a:schemeClr>
+            </a:solidFill>
+          </a:ln>
+          <a:effectLst>
+            <a:outerShdw blurRad="50800" dist="38100" dir="2700000" algn="tl" rotWithShape="0">
+              <a:schemeClr val="bg1">
+                <a:lumMod val="85000"/>
+                <a:alpha val="30000"/>
+              </a:schemeClr>
+            </a:outerShdw>
+          </a:effectLst>
+        </p:spPr>
+        <p:style>
+          <a:lnRef idx="2">
+            <a:schemeClr val="accent1">
+              <a:shade val="50000"/>
+            </a:schemeClr>
+          </a:lnRef>
+          <a:fillRef idx="1">
+            <a:schemeClr val="accent1"/>
+          </a:fillRef>
+          <a:effectRef idx="0">
+            <a:schemeClr val="accent1"/>
+          </a:effectRef>
+          <a:fontRef idx="minor">
+            <a:schemeClr val="lt1"/>
+          </a:fontRef>
+        </p:style>
+        <p:txBody>
+          <a:bodyPr rtlCol="0" anchor="ctr"/>
+          <a:lstStyle/>
+          <a:p>
+            <a:pPr marL="0" marR="0" lvl="0" indent="0" algn="ctr" defTabSz="914400" rtl="0" eaLnBrk="1" fontAlgn="auto" latinLnBrk="0" hangingPunct="1">
+              <a:lnSpc>
+                <a:spcPct val="100000"/>
+              </a:lnSpc>
+              <a:spcBef>
+                <a:spcPts val="0"/>
+              </a:spcBef>
+              <a:spcAft>
+                <a:spcPts val="0"/>
+              </a:spcAft>
+              <a:buClrTx/>
+              <a:buSzTx/>
+              <a:buFontTx/>
+              <a:buNone/>
+              <a:tabLst/>
+              <a:defRPr/>
+            </a:pPr>
+            <a:endParaRPr kumimoji="0" lang="en-US" sz="1800" b="0" i="0" u="none" strike="noStrike" kern="1200" cap="none" spc="0" normalizeH="0" baseline="0" noProof="0">
+              <a:ln>
+                <a:noFill/>
+              </a:ln>
+              <a:solidFill>
+                <a:prstClr val="white"/>
+              </a:solidFill>
+              <a:effectLst/>
+              <a:uLnTx/>
+              <a:uFillTx/>
+              <a:latin typeface="Calibri" panose="020F0502020204030204"/>
+              <a:ea typeface="+mn-ea"/>
+              <a:cs typeface="+mn-cs"/>
+            </a:endParaRPr>
+          </a:p>
+        </p:txBody>
+      </p:sp>
+      <p:pic>
+        <p:nvPicPr>
+          <p:cNvPr id="1028" name="Picture 4">
+            <a:extLst>
+              <a:ext uri="{FF2B5EF4-FFF2-40B4-BE49-F238E27FC236}">
+                <a16:creationId xmlns:a16="http://schemas.microsoft.com/office/drawing/2014/main" id="{8EDC7C2B-80F2-CD4C-B045-D9ECF1EADE9D}"/>
+              </a:ext>
+            </a:extLst>
+          </p:cNvPr>
+          <p:cNvPicPr>
+            <a:picLocks noGrp="1" noChangeAspect="1" noChangeArrowheads="1"/>
+          </p:cNvPicPr>
+          <p:nvPr>
+            <p:ph idx="1"/>
+          </p:nvPr>
+        </p:nvPicPr>
+        <p:blipFill>
+          <a:blip r:embed="rId3">
+            <a:extLst>
+              <a:ext uri="{28A0092B-C50C-407E-A947-70E740481C1C}">
+                <a14:useLocalDpi xmlns:a14="http://schemas.microsoft.com/office/drawing/2010/main" val="0"/>
+              </a:ext>
+            </a:extLst>
+          </a:blip>
+          <a:srcRect/>
+          <a:stretch>
+            <a:fillRect/>
+          </a:stretch>
+        </p:blipFill>
+        <p:spPr bwMode="auto">
+          <a:xfrm>
+            <a:off x="7723569" y="2285391"/>
+            <a:ext cx="3858896" cy="3253579"/>
+          </a:xfrm>
+          <a:prstGeom prst="rect">
+            <a:avLst/>
+          </a:prstGeom>
+          <a:noFill/>
+          <a:extLst>
+            <a:ext uri="{909E8E84-426E-40DD-AFC4-6F175D3DCCD1}">
+              <a14:hiddenFill xmlns:a14="http://schemas.microsoft.com/office/drawing/2010/main">
+                <a:solidFill>
+                  <a:srgbClr val="FFFFFF"/>
+                </a:solidFill>
+              </a14:hiddenFill>
+            </a:ext>
+          </a:extLst>
+        </p:spPr>
+      </p:pic>
+    </p:spTree>
+    <p:extLst>
+      <p:ext uri="{BB962C8B-B14F-4D97-AF65-F5344CB8AC3E}">
+        <p14:creationId xmlns:p14="http://schemas.microsoft.com/office/powerpoint/2010/main" val="1942722450"/>
+      </p:ext>
+    </p:extLst>
+  </p:cSld>
+  <p:clrMapOvr>
+    <a:masterClrMapping/>
+  </p:clrMapOvr>
+</p:sld>
+</file>
+
+<file path=ppt/slides/slide8.xml><?xml version="1.0" encoding="utf-8"?>
 <p:sld xmlns:a="http://schemas.openxmlformats.org/drawingml/2006/main" xmlns:r="http://schemas.openxmlformats.org/officeDocument/2006/relationships" xmlns:p="http://schemas.openxmlformats.org/presentationml/2006/main">
   <p:cSld>
     <p:bg>
@@ -8104,7 +10210,7 @@
 </p:sld>
 </file>
 
-<file path=ppt/slides/slide7.xml><?xml version="1.0" encoding="utf-8"?>
+<file path=ppt/slides/slide9.xml><?xml version="1.0" encoding="utf-8"?>
 <p:sld xmlns:a="http://schemas.openxmlformats.org/drawingml/2006/main" xmlns:r="http://schemas.openxmlformats.org/officeDocument/2006/relationships" xmlns:p="http://schemas.openxmlformats.org/presentationml/2006/main">
   <p:cSld>
     <p:bg>
@@ -8691,495 +10797,6 @@
     <p:extLst>
       <p:ext uri="{BB962C8B-B14F-4D97-AF65-F5344CB8AC3E}">
         <p14:creationId xmlns:p14="http://schemas.microsoft.com/office/powerpoint/2010/main" val="1750294061"/>
-      </p:ext>
-    </p:extLst>
-  </p:cSld>
-  <p:clrMapOvr>
-    <a:masterClrMapping/>
-  </p:clrMapOvr>
-</p:sld>
-</file>
-
-<file path=ppt/slides/slide8.xml><?xml version="1.0" encoding="utf-8"?>
-<p:sld xmlns:a="http://schemas.openxmlformats.org/drawingml/2006/main" xmlns:r="http://schemas.openxmlformats.org/officeDocument/2006/relationships" xmlns:p="http://schemas.openxmlformats.org/presentationml/2006/main">
-  <p:cSld>
-    <p:bg>
-      <p:bgPr>
-        <a:solidFill>
-          <a:schemeClr val="bg1"/>
-        </a:solidFill>
-        <a:effectLst/>
-      </p:bgPr>
-    </p:bg>
-    <p:spTree>
-      <p:nvGrpSpPr>
-        <p:cNvPr id="1" name=""/>
-        <p:cNvGrpSpPr/>
-        <p:nvPr/>
-      </p:nvGrpSpPr>
-      <p:grpSpPr>
-        <a:xfrm>
-          <a:off x="0" y="0"/>
-          <a:ext cx="0" cy="0"/>
-          <a:chOff x="0" y="0"/>
-          <a:chExt cx="0" cy="0"/>
-        </a:xfrm>
-      </p:grpSpPr>
-      <p:sp>
-        <p:nvSpPr>
-          <p:cNvPr id="8" name="Rectangle 7">
-            <a:extLst>
-              <a:ext uri="{FF2B5EF4-FFF2-40B4-BE49-F238E27FC236}">
-                <a16:creationId xmlns:a16="http://schemas.microsoft.com/office/drawing/2014/main" id="{8D06CE56-3881-4ADA-8CEF-D18B02C242A3}"/>
-              </a:ext>
-              <a:ext uri="{C183D7F6-B498-43B3-948B-1728B52AA6E4}">
-                <adec:decorative xmlns:adec="http://schemas.microsoft.com/office/drawing/2017/decorative" val="1"/>
-              </a:ext>
-            </a:extLst>
-          </p:cNvPr>
-          <p:cNvSpPr>
-            <a:spLocks noGrp="1" noRot="1" noChangeAspect="1" noMove="1" noResize="1" noEditPoints="1" noAdjustHandles="1" noChangeArrowheads="1" noChangeShapeType="1" noTextEdit="1"/>
-          </p:cNvSpPr>
-          <p:nvPr>
-            <p:extLst>
-              <p:ext uri="{386F3935-93C4-4BCD-93E2-E3B085C9AB24}">
-                <p16:designElem xmlns:p16="http://schemas.microsoft.com/office/powerpoint/2015/main" val="1"/>
-              </p:ext>
-            </p:extLst>
-          </p:nvPr>
-        </p:nvSpPr>
-        <p:spPr>
-          <a:xfrm rot="5400000">
-            <a:off x="857544" y="346791"/>
-            <a:ext cx="146304" cy="704088"/>
-          </a:xfrm>
-          <a:prstGeom prst="rect">
-            <a:avLst/>
-          </a:prstGeom>
-          <a:solidFill>
-            <a:schemeClr val="accent1"/>
-          </a:solidFill>
-          <a:ln>
-            <a:noFill/>
-          </a:ln>
-        </p:spPr>
-        <p:style>
-          <a:lnRef idx="2">
-            <a:schemeClr val="accent1">
-              <a:shade val="50000"/>
-            </a:schemeClr>
-          </a:lnRef>
-          <a:fillRef idx="1">
-            <a:schemeClr val="accent1"/>
-          </a:fillRef>
-          <a:effectRef idx="0">
-            <a:schemeClr val="accent1"/>
-          </a:effectRef>
-          <a:fontRef idx="minor">
-            <a:schemeClr val="lt1"/>
-          </a:fontRef>
-        </p:style>
-        <p:txBody>
-          <a:bodyPr rtlCol="0" anchor="ctr"/>
-          <a:lstStyle/>
-          <a:p>
-            <a:pPr marL="0" marR="0" lvl="0" indent="0" algn="ctr" defTabSz="914400" rtl="0" eaLnBrk="1" fontAlgn="auto" latinLnBrk="0" hangingPunct="1">
-              <a:lnSpc>
-                <a:spcPct val="100000"/>
-              </a:lnSpc>
-              <a:spcBef>
-                <a:spcPts val="0"/>
-              </a:spcBef>
-              <a:spcAft>
-                <a:spcPts val="0"/>
-              </a:spcAft>
-              <a:buClrTx/>
-              <a:buSzTx/>
-              <a:buFontTx/>
-              <a:buNone/>
-              <a:tabLst/>
-              <a:defRPr/>
-            </a:pPr>
-            <a:endParaRPr kumimoji="0" lang="en-US" sz="1800" b="0" i="0" u="none" strike="noStrike" kern="1200" cap="none" spc="0" normalizeH="0" baseline="0" noProof="0">
-              <a:ln>
-                <a:noFill/>
-              </a:ln>
-              <a:solidFill>
-                <a:prstClr val="white"/>
-              </a:solidFill>
-              <a:effectLst/>
-              <a:uLnTx/>
-              <a:uFillTx/>
-              <a:latin typeface="Calibri" panose="020F0502020204030204"/>
-              <a:ea typeface="+mn-ea"/>
-              <a:cs typeface="+mn-cs"/>
-            </a:endParaRPr>
-          </a:p>
-        </p:txBody>
-      </p:sp>
-      <p:sp>
-        <p:nvSpPr>
-          <p:cNvPr id="10" name="Rectangle 9">
-            <a:extLst>
-              <a:ext uri="{FF2B5EF4-FFF2-40B4-BE49-F238E27FC236}">
-                <a16:creationId xmlns:a16="http://schemas.microsoft.com/office/drawing/2014/main" id="{79F3C543-62EC-4433-9C93-A2CD8764E9B4}"/>
-              </a:ext>
-              <a:ext uri="{C183D7F6-B498-43B3-948B-1728B52AA6E4}">
-                <adec:decorative xmlns:adec="http://schemas.microsoft.com/office/drawing/2017/decorative" val="1"/>
-              </a:ext>
-            </a:extLst>
-          </p:cNvPr>
-          <p:cNvSpPr>
-            <a:spLocks noGrp="1" noRot="1" noChangeAspect="1" noMove="1" noResize="1" noEditPoints="1" noAdjustHandles="1" noChangeArrowheads="1" noChangeShapeType="1" noTextEdit="1"/>
-          </p:cNvSpPr>
-          <p:nvPr>
-            <p:extLst>
-              <p:ext uri="{386F3935-93C4-4BCD-93E2-E3B085C9AB24}">
-                <p16:designElem xmlns:p16="http://schemas.microsoft.com/office/powerpoint/2015/main" val="1"/>
-              </p:ext>
-            </p:extLst>
-          </p:nvPr>
-        </p:nvSpPr>
-        <p:spPr>
-          <a:xfrm flipV="1">
-            <a:off x="578652" y="4501201"/>
-            <a:ext cx="11034696" cy="18288"/>
-          </a:xfrm>
-          <a:prstGeom prst="rect">
-            <a:avLst/>
-          </a:prstGeom>
-          <a:solidFill>
-            <a:schemeClr val="tx2">
-              <a:lumMod val="25000"/>
-              <a:lumOff val="75000"/>
-            </a:schemeClr>
-          </a:solidFill>
-          <a:ln w="3175">
-            <a:noFill/>
-          </a:ln>
-          <a:effectLst/>
-        </p:spPr>
-        <p:style>
-          <a:lnRef idx="2">
-            <a:schemeClr val="accent1">
-              <a:shade val="50000"/>
-            </a:schemeClr>
-          </a:lnRef>
-          <a:fillRef idx="1">
-            <a:schemeClr val="accent1"/>
-          </a:fillRef>
-          <a:effectRef idx="0">
-            <a:schemeClr val="accent1"/>
-          </a:effectRef>
-          <a:fontRef idx="minor">
-            <a:schemeClr val="lt1"/>
-          </a:fontRef>
-        </p:style>
-        <p:txBody>
-          <a:bodyPr rtlCol="0" anchor="ctr"/>
-          <a:lstStyle/>
-          <a:p>
-            <a:pPr marL="0" marR="0" lvl="0" indent="0" algn="ctr" defTabSz="914400" rtl="0" eaLnBrk="1" fontAlgn="auto" latinLnBrk="0" hangingPunct="1">
-              <a:lnSpc>
-                <a:spcPct val="100000"/>
-              </a:lnSpc>
-              <a:spcBef>
-                <a:spcPts val="0"/>
-              </a:spcBef>
-              <a:spcAft>
-                <a:spcPts val="0"/>
-              </a:spcAft>
-              <a:buClrTx/>
-              <a:buSzTx/>
-              <a:buFontTx/>
-              <a:buNone/>
-              <a:tabLst/>
-              <a:defRPr/>
-            </a:pPr>
-            <a:endParaRPr kumimoji="0" lang="en-US" sz="1800" b="0" i="0" u="none" strike="noStrike" kern="1200" cap="none" spc="0" normalizeH="0" baseline="0" noProof="0">
-              <a:ln>
-                <a:noFill/>
-              </a:ln>
-              <a:solidFill>
-                <a:prstClr val="white"/>
-              </a:solidFill>
-              <a:effectLst/>
-              <a:uLnTx/>
-              <a:uFillTx/>
-              <a:latin typeface="Calibri" panose="020F0502020204030204"/>
-              <a:ea typeface="+mn-ea"/>
-              <a:cs typeface="+mn-cs"/>
-            </a:endParaRPr>
-          </a:p>
-        </p:txBody>
-      </p:sp>
-      <p:sp useBgFill="1">
-        <p:nvSpPr>
-          <p:cNvPr id="12" name="Rectangle 11">
-            <a:extLst>
-              <a:ext uri="{FF2B5EF4-FFF2-40B4-BE49-F238E27FC236}">
-                <a16:creationId xmlns:a16="http://schemas.microsoft.com/office/drawing/2014/main" id="{1ACA2EA0-FFD3-42EC-9406-B595015ED96E}"/>
-              </a:ext>
-              <a:ext uri="{C183D7F6-B498-43B3-948B-1728B52AA6E4}">
-                <adec:decorative xmlns:adec="http://schemas.microsoft.com/office/drawing/2017/decorative" val="1"/>
-              </a:ext>
-            </a:extLst>
-          </p:cNvPr>
-          <p:cNvSpPr>
-            <a:spLocks noGrp="1" noRot="1" noChangeAspect="1" noMove="1" noResize="1" noEditPoints="1" noAdjustHandles="1" noChangeArrowheads="1" noChangeShapeType="1" noTextEdit="1"/>
-          </p:cNvSpPr>
-          <p:nvPr>
-            <p:extLst>
-              <p:ext uri="{386F3935-93C4-4BCD-93E2-E3B085C9AB24}">
-                <p16:designElem xmlns:p16="http://schemas.microsoft.com/office/powerpoint/2015/main" val="1"/>
-              </p:ext>
-            </p:extLst>
-          </p:nvPr>
-        </p:nvSpPr>
-        <p:spPr>
-          <a:xfrm>
-            <a:off x="0" y="0"/>
-            <a:ext cx="12192000" cy="6858000"/>
-          </a:xfrm>
-          <a:prstGeom prst="rect">
-            <a:avLst/>
-          </a:prstGeom>
-          <a:ln>
-            <a:noFill/>
-          </a:ln>
-        </p:spPr>
-        <p:style>
-          <a:lnRef idx="2">
-            <a:schemeClr val="accent1">
-              <a:shade val="50000"/>
-            </a:schemeClr>
-          </a:lnRef>
-          <a:fillRef idx="1">
-            <a:schemeClr val="accent1"/>
-          </a:fillRef>
-          <a:effectRef idx="0">
-            <a:schemeClr val="accent1"/>
-          </a:effectRef>
-          <a:fontRef idx="minor">
-            <a:schemeClr val="lt1"/>
-          </a:fontRef>
-        </p:style>
-        <p:txBody>
-          <a:bodyPr rtlCol="0" anchor="ctr"/>
-          <a:lstStyle/>
-          <a:p>
-            <a:pPr algn="ctr"/>
-            <a:endParaRPr lang="en-US"/>
-          </a:p>
-        </p:txBody>
-      </p:sp>
-      <p:sp useBgFill="1">
-        <p:nvSpPr>
-          <p:cNvPr id="14" name="Rectangle 13">
-            <a:extLst>
-              <a:ext uri="{FF2B5EF4-FFF2-40B4-BE49-F238E27FC236}">
-                <a16:creationId xmlns:a16="http://schemas.microsoft.com/office/drawing/2014/main" id="{D5288BCE-665C-472A-8C43-664BCFA31E43}"/>
-              </a:ext>
-              <a:ext uri="{C183D7F6-B498-43B3-948B-1728B52AA6E4}">
-                <adec:decorative xmlns:adec="http://schemas.microsoft.com/office/drawing/2017/decorative" val="1"/>
-              </a:ext>
-            </a:extLst>
-          </p:cNvPr>
-          <p:cNvSpPr>
-            <a:spLocks noGrp="1" noRot="1" noChangeAspect="1" noMove="1" noResize="1" noEditPoints="1" noAdjustHandles="1" noChangeArrowheads="1" noChangeShapeType="1" noTextEdit="1"/>
-          </p:cNvSpPr>
-          <p:nvPr>
-            <p:extLst>
-              <p:ext uri="{386F3935-93C4-4BCD-93E2-E3B085C9AB24}">
-                <p16:designElem xmlns:p16="http://schemas.microsoft.com/office/powerpoint/2015/main" val="1"/>
-              </p:ext>
-            </p:extLst>
-          </p:nvPr>
-        </p:nvSpPr>
-        <p:spPr>
-          <a:xfrm>
-            <a:off x="1528762" y="1247775"/>
-            <a:ext cx="9144000" cy="3007447"/>
-          </a:xfrm>
-          <a:prstGeom prst="rect">
-            <a:avLst/>
-          </a:prstGeom>
-          <a:ln w="12700">
-            <a:solidFill>
-              <a:schemeClr val="tx2">
-                <a:lumMod val="10000"/>
-                <a:lumOff val="90000"/>
-              </a:schemeClr>
-            </a:solidFill>
-          </a:ln>
-          <a:effectLst>
-            <a:outerShdw blurRad="50800" dist="38100" dir="2700000" algn="tl" rotWithShape="0">
-              <a:schemeClr val="bg2">
-                <a:lumMod val="85000"/>
-                <a:alpha val="30000"/>
-              </a:schemeClr>
-            </a:outerShdw>
-          </a:effectLst>
-        </p:spPr>
-        <p:style>
-          <a:lnRef idx="2">
-            <a:schemeClr val="accent1">
-              <a:shade val="50000"/>
-            </a:schemeClr>
-          </a:lnRef>
-          <a:fillRef idx="1">
-            <a:schemeClr val="accent1"/>
-          </a:fillRef>
-          <a:effectRef idx="0">
-            <a:schemeClr val="accent1"/>
-          </a:effectRef>
-          <a:fontRef idx="minor">
-            <a:schemeClr val="lt1"/>
-          </a:fontRef>
-        </p:style>
-        <p:txBody>
-          <a:bodyPr rtlCol="0" anchor="ctr"/>
-          <a:lstStyle/>
-          <a:p>
-            <a:pPr marL="0" marR="0" lvl="0" indent="0" algn="ctr" defTabSz="914400" rtl="0" eaLnBrk="1" fontAlgn="auto" latinLnBrk="0" hangingPunct="1">
-              <a:lnSpc>
-                <a:spcPct val="100000"/>
-              </a:lnSpc>
-              <a:spcBef>
-                <a:spcPts val="0"/>
-              </a:spcBef>
-              <a:spcAft>
-                <a:spcPts val="0"/>
-              </a:spcAft>
-              <a:buClrTx/>
-              <a:buSzTx/>
-              <a:buFontTx/>
-              <a:buNone/>
-              <a:tabLst/>
-              <a:defRPr/>
-            </a:pPr>
-            <a:endParaRPr kumimoji="0" lang="en-US" sz="1800" b="0" i="0" u="none" strike="noStrike" kern="1200" cap="none" spc="0" normalizeH="0" baseline="0" noProof="0">
-              <a:ln>
-                <a:noFill/>
-              </a:ln>
-              <a:solidFill>
-                <a:prstClr val="white"/>
-              </a:solidFill>
-              <a:effectLst/>
-              <a:uLnTx/>
-              <a:uFillTx/>
-              <a:latin typeface="Calibri" panose="020F0502020204030204"/>
-              <a:ea typeface="+mn-ea"/>
-              <a:cs typeface="+mn-cs"/>
-            </a:endParaRPr>
-          </a:p>
-        </p:txBody>
-      </p:sp>
-      <p:sp>
-        <p:nvSpPr>
-          <p:cNvPr id="2" name="Title 1">
-            <a:extLst>
-              <a:ext uri="{FF2B5EF4-FFF2-40B4-BE49-F238E27FC236}">
-                <a16:creationId xmlns:a16="http://schemas.microsoft.com/office/drawing/2014/main" id="{9261304E-6204-8E44-A343-DCFEABC60BBA}"/>
-              </a:ext>
-            </a:extLst>
-          </p:cNvPr>
-          <p:cNvSpPr>
-            <a:spLocks noGrp="1"/>
-          </p:cNvSpPr>
-          <p:nvPr>
-            <p:ph type="title"/>
-          </p:nvPr>
-        </p:nvSpPr>
-        <p:spPr>
-          <a:xfrm>
-            <a:off x="1804988" y="1442172"/>
-            <a:ext cx="8582025" cy="2177328"/>
-          </a:xfrm>
-        </p:spPr>
-        <p:txBody>
-          <a:bodyPr vert="horz" lIns="91440" tIns="45720" rIns="91440" bIns="45720" rtlCol="0" anchor="ctr">
-            <a:normAutofit/>
-          </a:bodyPr>
-          <a:lstStyle/>
-          <a:p>
-            <a:pPr algn="ctr"/>
-            <a:r>
-              <a:rPr lang="en-US" sz="7200" dirty="0"/>
-              <a:t>Final Conclusions</a:t>
-            </a:r>
-          </a:p>
-        </p:txBody>
-      </p:sp>
-      <p:sp>
-        <p:nvSpPr>
-          <p:cNvPr id="16" name="Rectangle: Rounded Corners 15">
-            <a:extLst>
-              <a:ext uri="{FF2B5EF4-FFF2-40B4-BE49-F238E27FC236}">
-                <a16:creationId xmlns:a16="http://schemas.microsoft.com/office/drawing/2014/main" id="{46C57131-53A7-4C1A-BEA8-25F06A06AD29}"/>
-              </a:ext>
-              <a:ext uri="{C183D7F6-B498-43B3-948B-1728B52AA6E4}">
-                <adec:decorative xmlns:adec="http://schemas.microsoft.com/office/drawing/2017/decorative" val="1"/>
-              </a:ext>
-            </a:extLst>
-          </p:cNvPr>
-          <p:cNvSpPr>
-            <a:spLocks noGrp="1" noRot="1" noChangeAspect="1" noMove="1" noResize="1" noEditPoints="1" noAdjustHandles="1" noChangeArrowheads="1" noChangeShapeType="1" noTextEdit="1"/>
-          </p:cNvSpPr>
-          <p:nvPr>
-            <p:extLst>
-              <p:ext uri="{386F3935-93C4-4BCD-93E2-E3B085C9AB24}">
-                <p16:designElem xmlns:p16="http://schemas.microsoft.com/office/powerpoint/2015/main" val="1"/>
-              </p:ext>
-            </p:extLst>
-          </p:nvPr>
-        </p:nvSpPr>
-        <p:spPr>
-          <a:xfrm>
-            <a:off x="2487872" y="3912322"/>
-            <a:ext cx="7225780" cy="685800"/>
-          </a:xfrm>
-          <a:prstGeom prst="roundRect">
-            <a:avLst>
-              <a:gd name="adj" fmla="val 0"/>
-            </a:avLst>
-          </a:prstGeom>
-          <a:solidFill>
-            <a:schemeClr val="accent1"/>
-          </a:solidFill>
-          <a:ln>
-            <a:noFill/>
-          </a:ln>
-        </p:spPr>
-        <p:style>
-          <a:lnRef idx="2">
-            <a:schemeClr val="accent1">
-              <a:shade val="50000"/>
-            </a:schemeClr>
-          </a:lnRef>
-          <a:fillRef idx="1">
-            <a:schemeClr val="accent1"/>
-          </a:fillRef>
-          <a:effectRef idx="0">
-            <a:schemeClr val="accent1"/>
-          </a:effectRef>
-          <a:fontRef idx="minor">
-            <a:schemeClr val="lt1"/>
-          </a:fontRef>
-        </p:style>
-        <p:txBody>
-          <a:bodyPr rtlCol="0" anchor="ctr"/>
-          <a:lstStyle/>
-          <a:p>
-            <a:pPr algn="ctr"/>
-            <a:endParaRPr lang="en-US"/>
-          </a:p>
-        </p:txBody>
-      </p:sp>
-    </p:spTree>
-    <p:extLst>
-      <p:ext uri="{BB962C8B-B14F-4D97-AF65-F5344CB8AC3E}">
-        <p14:creationId xmlns:p14="http://schemas.microsoft.com/office/powerpoint/2010/main" val="3197243115"/>
       </p:ext>
     </p:extLst>
   </p:cSld>

</xml_diff>

<commit_message>
ppt + add figs
</commit_message>
<xml_diff>
--- a/ETL PROJECT POWERPOINT.pptx
+++ b/ETL PROJECT POWERPOINT.pptx
@@ -5,19 +5,20 @@
     <p:sldMasterId id="2147484131" r:id="rId1"/>
   </p:sldMasterIdLst>
   <p:notesMasterIdLst>
-    <p:notesMasterId r:id="rId12"/>
+    <p:notesMasterId r:id="rId13"/>
   </p:notesMasterIdLst>
   <p:sldIdLst>
     <p:sldId id="256" r:id="rId2"/>
     <p:sldId id="257" r:id="rId3"/>
     <p:sldId id="261" r:id="rId4"/>
     <p:sldId id="263" r:id="rId5"/>
-    <p:sldId id="258" r:id="rId6"/>
+    <p:sldId id="266" r:id="rId6"/>
     <p:sldId id="264" r:id="rId7"/>
     <p:sldId id="265" r:id="rId8"/>
-    <p:sldId id="259" r:id="rId9"/>
-    <p:sldId id="262" r:id="rId10"/>
-    <p:sldId id="260" r:id="rId11"/>
+    <p:sldId id="267" r:id="rId9"/>
+    <p:sldId id="259" r:id="rId10"/>
+    <p:sldId id="262" r:id="rId11"/>
+    <p:sldId id="260" r:id="rId12"/>
   </p:sldIdLst>
   <p:sldSz cx="12192000" cy="6858000"/>
   <p:notesSz cx="6858000" cy="9144000"/>
@@ -625,7 +626,7 @@
           <a:p>
             <a:fld id="{0E2084AF-775F-644F-A6A8-8F68198F063E}" type="slidenum">
               <a:rPr lang="en-US" smtClean="0"/>
-              <a:t>9</a:t>
+              <a:t>10</a:t>
             </a:fld>
             <a:endParaRPr lang="en-US"/>
           </a:p>
@@ -6099,6 +6100,419 @@
           <a:chExt cx="0" cy="0"/>
         </a:xfrm>
       </p:grpSpPr>
+      <p:sp useBgFill="1">
+        <p:nvSpPr>
+          <p:cNvPr id="21" name="Rectangle 20">
+            <a:extLst>
+              <a:ext uri="{FF2B5EF4-FFF2-40B4-BE49-F238E27FC236}">
+                <a16:creationId xmlns:a16="http://schemas.microsoft.com/office/drawing/2014/main" id="{0B9EE3F3-89B7-43C3-8651-C4C96830993D}"/>
+              </a:ext>
+              <a:ext uri="{C183D7F6-B498-43B3-948B-1728B52AA6E4}">
+                <adec:decorative xmlns:adec="http://schemas.microsoft.com/office/drawing/2017/decorative" val="1"/>
+              </a:ext>
+            </a:extLst>
+          </p:cNvPr>
+          <p:cNvSpPr>
+            <a:spLocks noGrp="1" noRot="1" noChangeAspect="1" noMove="1" noResize="1" noEditPoints="1" noAdjustHandles="1" noChangeArrowheads="1" noChangeShapeType="1" noTextEdit="1"/>
+          </p:cNvSpPr>
+          <p:nvPr>
+            <p:extLst>
+              <p:ext uri="{386F3935-93C4-4BCD-93E2-E3B085C9AB24}">
+                <p16:designElem xmlns:p16="http://schemas.microsoft.com/office/powerpoint/2015/main" val="1"/>
+              </p:ext>
+            </p:extLst>
+          </p:nvPr>
+        </p:nvSpPr>
+        <p:spPr>
+          <a:xfrm>
+            <a:off x="0" y="0"/>
+            <a:ext cx="12192000" cy="6858000"/>
+          </a:xfrm>
+          <a:prstGeom prst="rect">
+            <a:avLst/>
+          </a:prstGeom>
+          <a:ln>
+            <a:noFill/>
+          </a:ln>
+        </p:spPr>
+        <p:style>
+          <a:lnRef idx="2">
+            <a:schemeClr val="accent1">
+              <a:shade val="50000"/>
+            </a:schemeClr>
+          </a:lnRef>
+          <a:fillRef idx="1">
+            <a:schemeClr val="accent1"/>
+          </a:fillRef>
+          <a:effectRef idx="0">
+            <a:schemeClr val="accent1"/>
+          </a:effectRef>
+          <a:fontRef idx="minor">
+            <a:schemeClr val="lt1"/>
+          </a:fontRef>
+        </p:style>
+        <p:txBody>
+          <a:bodyPr rtlCol="0" anchor="ctr"/>
+          <a:lstStyle/>
+          <a:p>
+            <a:pPr algn="ctr"/>
+            <a:endParaRPr lang="en-US"/>
+          </a:p>
+        </p:txBody>
+      </p:sp>
+      <p:sp>
+        <p:nvSpPr>
+          <p:cNvPr id="2" name="Title 1">
+            <a:extLst>
+              <a:ext uri="{FF2B5EF4-FFF2-40B4-BE49-F238E27FC236}">
+                <a16:creationId xmlns:a16="http://schemas.microsoft.com/office/drawing/2014/main" id="{6CD7E464-D8AA-B140-9A1F-1DA8E7871E93}"/>
+              </a:ext>
+            </a:extLst>
+          </p:cNvPr>
+          <p:cNvSpPr>
+            <a:spLocks noGrp="1"/>
+          </p:cNvSpPr>
+          <p:nvPr>
+            <p:ph type="title"/>
+          </p:nvPr>
+        </p:nvSpPr>
+        <p:spPr>
+          <a:xfrm>
+            <a:off x="411480" y="991443"/>
+            <a:ext cx="4443154" cy="1087819"/>
+          </a:xfrm>
+        </p:spPr>
+        <p:txBody>
+          <a:bodyPr anchor="b">
+            <a:normAutofit/>
+          </a:bodyPr>
+          <a:lstStyle/>
+          <a:p>
+            <a:r>
+              <a:rPr lang="en-US" sz="3400"/>
+              <a:t>Issues we ran into</a:t>
+            </a:r>
+          </a:p>
+        </p:txBody>
+      </p:sp>
+      <p:sp>
+        <p:nvSpPr>
+          <p:cNvPr id="23" name="Rectangle 22">
+            <a:extLst>
+              <a:ext uri="{FF2B5EF4-FFF2-40B4-BE49-F238E27FC236}">
+                <a16:creationId xmlns:a16="http://schemas.microsoft.com/office/drawing/2014/main" id="{33AE4636-AEEC-45D6-84D4-7AC2DA48ECF8}"/>
+              </a:ext>
+              <a:ext uri="{C183D7F6-B498-43B3-948B-1728B52AA6E4}">
+                <adec:decorative xmlns:adec="http://schemas.microsoft.com/office/drawing/2017/decorative" val="1"/>
+              </a:ext>
+            </a:extLst>
+          </p:cNvPr>
+          <p:cNvSpPr>
+            <a:spLocks noGrp="1" noRot="1" noChangeAspect="1" noMove="1" noResize="1" noEditPoints="1" noAdjustHandles="1" noChangeArrowheads="1" noChangeShapeType="1" noTextEdit="1"/>
+          </p:cNvSpPr>
+          <p:nvPr>
+            <p:extLst>
+              <p:ext uri="{386F3935-93C4-4BCD-93E2-E3B085C9AB24}">
+                <p16:designElem xmlns:p16="http://schemas.microsoft.com/office/powerpoint/2015/main" val="1"/>
+              </p:ext>
+            </p:extLst>
+          </p:nvPr>
+        </p:nvSpPr>
+        <p:spPr>
+          <a:xfrm rot="5400000">
+            <a:off x="649223" y="387939"/>
+            <a:ext cx="73152" cy="548640"/>
+          </a:xfrm>
+          <a:prstGeom prst="rect">
+            <a:avLst/>
+          </a:prstGeom>
+          <a:solidFill>
+            <a:schemeClr val="accent1"/>
+          </a:solidFill>
+          <a:ln>
+            <a:noFill/>
+          </a:ln>
+        </p:spPr>
+        <p:style>
+          <a:lnRef idx="2">
+            <a:schemeClr val="accent1">
+              <a:shade val="50000"/>
+            </a:schemeClr>
+          </a:lnRef>
+          <a:fillRef idx="1">
+            <a:schemeClr val="accent1"/>
+          </a:fillRef>
+          <a:effectRef idx="0">
+            <a:schemeClr val="accent1"/>
+          </a:effectRef>
+          <a:fontRef idx="minor">
+            <a:schemeClr val="lt1"/>
+          </a:fontRef>
+        </p:style>
+        <p:txBody>
+          <a:bodyPr rtlCol="0" anchor="ctr"/>
+          <a:lstStyle/>
+          <a:p>
+            <a:pPr marL="0" marR="0" lvl="0" indent="0" algn="ctr" defTabSz="914400" rtl="0" eaLnBrk="1" fontAlgn="auto" latinLnBrk="0" hangingPunct="1">
+              <a:lnSpc>
+                <a:spcPct val="100000"/>
+              </a:lnSpc>
+              <a:spcBef>
+                <a:spcPts val="0"/>
+              </a:spcBef>
+              <a:spcAft>
+                <a:spcPts val="0"/>
+              </a:spcAft>
+              <a:buClrTx/>
+              <a:buSzTx/>
+              <a:buFontTx/>
+              <a:buNone/>
+              <a:tabLst/>
+              <a:defRPr/>
+            </a:pPr>
+            <a:endParaRPr kumimoji="0" lang="en-US" sz="1800" b="0" i="0" u="none" strike="noStrike" kern="1200" cap="none" spc="0" normalizeH="0" baseline="0" noProof="0">
+              <a:ln>
+                <a:noFill/>
+              </a:ln>
+              <a:solidFill>
+                <a:prstClr val="white"/>
+              </a:solidFill>
+              <a:effectLst/>
+              <a:uLnTx/>
+              <a:uFillTx/>
+              <a:latin typeface="Calibri" panose="020F0502020204030204"/>
+              <a:ea typeface="+mn-ea"/>
+              <a:cs typeface="+mn-cs"/>
+            </a:endParaRPr>
+          </a:p>
+        </p:txBody>
+      </p:sp>
+      <p:sp>
+        <p:nvSpPr>
+          <p:cNvPr id="25" name="Rectangle 24">
+            <a:extLst>
+              <a:ext uri="{FF2B5EF4-FFF2-40B4-BE49-F238E27FC236}">
+                <a16:creationId xmlns:a16="http://schemas.microsoft.com/office/drawing/2014/main" id="{8D9CE0F4-2EB2-4F1F-8AAC-DB3571D9FE10}"/>
+              </a:ext>
+              <a:ext uri="{C183D7F6-B498-43B3-948B-1728B52AA6E4}">
+                <adec:decorative xmlns:adec="http://schemas.microsoft.com/office/drawing/2017/decorative" val="1"/>
+              </a:ext>
+            </a:extLst>
+          </p:cNvPr>
+          <p:cNvSpPr>
+            <a:spLocks noGrp="1" noRot="1" noChangeAspect="1" noMove="1" noResize="1" noEditPoints="1" noAdjustHandles="1" noChangeArrowheads="1" noChangeShapeType="1" noTextEdit="1"/>
+          </p:cNvSpPr>
+          <p:nvPr>
+            <p:extLst>
+              <p:ext uri="{386F3935-93C4-4BCD-93E2-E3B085C9AB24}">
+                <p16:designElem xmlns:p16="http://schemas.microsoft.com/office/powerpoint/2015/main" val="1"/>
+              </p:ext>
+            </p:extLst>
+          </p:nvPr>
+        </p:nvSpPr>
+        <p:spPr>
+          <a:xfrm>
+            <a:off x="411480" y="2285541"/>
+            <a:ext cx="4389120" cy="18288"/>
+          </a:xfrm>
+          <a:prstGeom prst="rect">
+            <a:avLst/>
+          </a:prstGeom>
+          <a:solidFill>
+            <a:schemeClr val="tx2">
+              <a:lumMod val="25000"/>
+              <a:lumOff val="75000"/>
+            </a:schemeClr>
+          </a:solidFill>
+          <a:ln w="3175">
+            <a:noFill/>
+          </a:ln>
+          <a:effectLst/>
+        </p:spPr>
+        <p:style>
+          <a:lnRef idx="2">
+            <a:schemeClr val="accent1">
+              <a:shade val="50000"/>
+            </a:schemeClr>
+          </a:lnRef>
+          <a:fillRef idx="1">
+            <a:schemeClr val="accent1"/>
+          </a:fillRef>
+          <a:effectRef idx="0">
+            <a:schemeClr val="accent1"/>
+          </a:effectRef>
+          <a:fontRef idx="minor">
+            <a:schemeClr val="lt1"/>
+          </a:fontRef>
+        </p:style>
+        <p:txBody>
+          <a:bodyPr rtlCol="0" anchor="ctr"/>
+          <a:lstStyle/>
+          <a:p>
+            <a:pPr marL="0" marR="0" lvl="0" indent="0" algn="ctr" defTabSz="914400" rtl="0" eaLnBrk="1" fontAlgn="auto" latinLnBrk="0" hangingPunct="1">
+              <a:lnSpc>
+                <a:spcPct val="100000"/>
+              </a:lnSpc>
+              <a:spcBef>
+                <a:spcPts val="0"/>
+              </a:spcBef>
+              <a:spcAft>
+                <a:spcPts val="0"/>
+              </a:spcAft>
+              <a:buClrTx/>
+              <a:buSzTx/>
+              <a:buFontTx/>
+              <a:buNone/>
+              <a:tabLst/>
+              <a:defRPr/>
+            </a:pPr>
+            <a:endParaRPr kumimoji="0" lang="en-US" sz="1800" b="0" i="0" u="none" strike="noStrike" kern="1200" cap="none" spc="0" normalizeH="0" baseline="0" noProof="0">
+              <a:ln>
+                <a:noFill/>
+              </a:ln>
+              <a:solidFill>
+                <a:prstClr val="white"/>
+              </a:solidFill>
+              <a:effectLst/>
+              <a:uLnTx/>
+              <a:uFillTx/>
+              <a:latin typeface="Calibri" panose="020F0502020204030204"/>
+              <a:ea typeface="+mn-ea"/>
+              <a:cs typeface="+mn-cs"/>
+            </a:endParaRPr>
+          </a:p>
+        </p:txBody>
+      </p:sp>
+      <p:sp>
+        <p:nvSpPr>
+          <p:cNvPr id="3" name="Content Placeholder 2">
+            <a:extLst>
+              <a:ext uri="{FF2B5EF4-FFF2-40B4-BE49-F238E27FC236}">
+                <a16:creationId xmlns:a16="http://schemas.microsoft.com/office/drawing/2014/main" id="{C2AC20D3-1AFB-844B-8B1B-6B9C26B27666}"/>
+              </a:ext>
+            </a:extLst>
+          </p:cNvPr>
+          <p:cNvSpPr>
+            <a:spLocks noGrp="1"/>
+          </p:cNvSpPr>
+          <p:nvPr>
+            <p:ph idx="1"/>
+          </p:nvPr>
+        </p:nvSpPr>
+        <p:spPr>
+          <a:xfrm>
+            <a:off x="411480" y="2684095"/>
+            <a:ext cx="4443154" cy="3492868"/>
+          </a:xfrm>
+        </p:spPr>
+        <p:txBody>
+          <a:bodyPr>
+            <a:normAutofit/>
+          </a:bodyPr>
+          <a:lstStyle/>
+          <a:p>
+            <a:r>
+              <a:rPr lang="en-US" sz="1700" dirty="0"/>
+              <a:t>Data interpretation with the heatmap</a:t>
+            </a:r>
+          </a:p>
+          <a:p>
+            <a:r>
+              <a:rPr lang="en-US" sz="1700" dirty="0"/>
+              <a:t>Data sources </a:t>
+            </a:r>
+          </a:p>
+          <a:p>
+            <a:r>
+              <a:rPr lang="en-US" sz="1700" dirty="0"/>
+              <a:t>Converting zip codes to latitude and longitude </a:t>
+            </a:r>
+          </a:p>
+          <a:p>
+            <a:endParaRPr lang="en-US" sz="1700" dirty="0"/>
+          </a:p>
+          <a:p>
+            <a:endParaRPr lang="en-US" sz="1700" dirty="0"/>
+          </a:p>
+        </p:txBody>
+      </p:sp>
+      <p:pic>
+        <p:nvPicPr>
+          <p:cNvPr id="18" name="Graphic 17" descr="Statistics">
+            <a:extLst>
+              <a:ext uri="{FF2B5EF4-FFF2-40B4-BE49-F238E27FC236}">
+                <a16:creationId xmlns:a16="http://schemas.microsoft.com/office/drawing/2014/main" id="{DFB68B12-8ED3-4769-AEC6-47412BBD89D7}"/>
+              </a:ext>
+            </a:extLst>
+          </p:cNvPr>
+          <p:cNvPicPr>
+            <a:picLocks noChangeAspect="1"/>
+          </p:cNvPicPr>
+          <p:nvPr/>
+        </p:nvPicPr>
+        <p:blipFill>
+          <a:blip r:embed="rId3">
+            <a:extLst>
+              <a:ext uri="{28A0092B-C50C-407E-A947-70E740481C1C}">
+                <a14:useLocalDpi xmlns:a14="http://schemas.microsoft.com/office/drawing/2010/main" val="0"/>
+              </a:ext>
+              <a:ext uri="{96DAC541-7B7A-43D3-8B79-37D633B846F1}">
+                <asvg:svgBlip xmlns:asvg="http://schemas.microsoft.com/office/drawing/2016/SVG/main" r:embed="rId4"/>
+              </a:ext>
+            </a:extLst>
+          </a:blip>
+          <a:stretch>
+            <a:fillRect/>
+          </a:stretch>
+        </p:blipFill>
+        <p:spPr>
+          <a:xfrm>
+            <a:off x="5830388" y="625683"/>
+            <a:ext cx="5551280" cy="5551280"/>
+          </a:xfrm>
+          <a:prstGeom prst="rect">
+            <a:avLst/>
+          </a:prstGeom>
+        </p:spPr>
+      </p:pic>
+    </p:spTree>
+    <p:extLst>
+      <p:ext uri="{BB962C8B-B14F-4D97-AF65-F5344CB8AC3E}">
+        <p14:creationId xmlns:p14="http://schemas.microsoft.com/office/powerpoint/2010/main" val="1750294061"/>
+      </p:ext>
+    </p:extLst>
+  </p:cSld>
+  <p:clrMapOvr>
+    <a:masterClrMapping/>
+  </p:clrMapOvr>
+</p:sld>
+</file>
+
+<file path=ppt/slides/slide11.xml><?xml version="1.0" encoding="utf-8"?>
+<p:sld xmlns:a="http://schemas.openxmlformats.org/drawingml/2006/main" xmlns:r="http://schemas.openxmlformats.org/officeDocument/2006/relationships" xmlns:p="http://schemas.openxmlformats.org/presentationml/2006/main">
+  <p:cSld>
+    <p:bg>
+      <p:bgPr>
+        <a:solidFill>
+          <a:schemeClr val="bg1"/>
+        </a:solidFill>
+        <a:effectLst/>
+      </p:bgPr>
+    </p:bg>
+    <p:spTree>
+      <p:nvGrpSpPr>
+        <p:cNvPr id="1" name=""/>
+        <p:cNvGrpSpPr/>
+        <p:nvPr/>
+      </p:nvGrpSpPr>
+      <p:grpSpPr>
+        <a:xfrm>
+          <a:off x="0" y="0"/>
+          <a:ext cx="0" cy="0"/>
+          <a:chOff x="0" y="0"/>
+          <a:chExt cx="0" cy="0"/>
+        </a:xfrm>
+      </p:grpSpPr>
       <p:sp>
         <p:nvSpPr>
           <p:cNvPr id="8" name="Rectangle 7">
@@ -8091,24 +8505,35 @@
         </p:spPr>
         <p:txBody>
           <a:bodyPr>
-            <a:normAutofit/>
+            <a:normAutofit lnSpcReduction="10000"/>
           </a:bodyPr>
           <a:lstStyle/>
           <a:p>
             <a:r>
-              <a:rPr lang="en-US" sz="2000"/>
-              <a:t>Our data was from OpenDataKC as CSVs, we first needed to narrow down the columns in the crime dataset, we went from 27 columns to 8 columns. </a:t>
+              <a:rPr lang="en-US" sz="2000" dirty="0"/>
+              <a:t>We brought our data in through an API from </a:t>
             </a:r>
-          </a:p>
-          <a:p>
             <a:r>
-              <a:rPr lang="en-US" sz="2000"/>
+              <a:rPr lang="en-US" sz="2000" dirty="0" err="1"/>
+              <a:t>OpenDataKC</a:t>
+            </a:r>
+            <a:endParaRPr lang="en-US" sz="2000" dirty="0"/>
+          </a:p>
+          <a:p>
+            <a:r>
+              <a:rPr lang="en-US" sz="2000" dirty="0"/>
+              <a:t>For the crime data, we needed to narrow down the columns in the crime dataset. We went from 27 columns to 8 columns. </a:t>
+            </a:r>
+          </a:p>
+          <a:p>
+            <a:r>
+              <a:rPr lang="en-US" sz="2000" dirty="0"/>
               <a:t>Then, we dropped all null columns from both datasets. </a:t>
             </a:r>
           </a:p>
           <a:p>
             <a:r>
-              <a:rPr lang="en-US" sz="2000"/>
+              <a:rPr lang="en-US" sz="2000" dirty="0"/>
               <a:t>The biggest task was finding the latitude and longitude for the datasets. The crime dataset had it hidden within the address field but the COVID data only had the zip code***</a:t>
             </a:r>
           </a:p>
@@ -8144,63 +8569,40 @@
           <a:chExt cx="0" cy="0"/>
         </a:xfrm>
       </p:grpSpPr>
-      <p:sp>
-        <p:nvSpPr>
-          <p:cNvPr id="2" name="Title 1">
-            <a:extLst>
-              <a:ext uri="{FF2B5EF4-FFF2-40B4-BE49-F238E27FC236}">
-                <a16:creationId xmlns:a16="http://schemas.microsoft.com/office/drawing/2014/main" id="{0C233F22-265A-1347-8316-0D305C5B9A75}"/>
-              </a:ext>
-            </a:extLst>
-          </p:cNvPr>
-          <p:cNvSpPr>
-            <a:spLocks noGrp="1"/>
-          </p:cNvSpPr>
-          <p:nvPr>
-            <p:ph type="title"/>
-          </p:nvPr>
-        </p:nvSpPr>
-        <p:spPr/>
-        <p:txBody>
-          <a:bodyPr/>
-          <a:lstStyle/>
-          <a:p>
-            <a:r>
-              <a:rPr lang="en-US" dirty="0"/>
-              <a:t>Picture of dashboard</a:t>
-            </a:r>
-          </a:p>
-        </p:txBody>
-      </p:sp>
-      <p:sp>
-        <p:nvSpPr>
-          <p:cNvPr id="3" name="Content Placeholder 2">
-            <a:extLst>
-              <a:ext uri="{FF2B5EF4-FFF2-40B4-BE49-F238E27FC236}">
-                <a16:creationId xmlns:a16="http://schemas.microsoft.com/office/drawing/2014/main" id="{C210CFC3-70EC-8141-9C00-D60B810E5602}"/>
-              </a:ext>
-            </a:extLst>
-          </p:cNvPr>
-          <p:cNvSpPr>
-            <a:spLocks noGrp="1"/>
-          </p:cNvSpPr>
-          <p:nvPr>
-            <p:ph idx="1"/>
-          </p:nvPr>
-        </p:nvSpPr>
-        <p:spPr/>
-        <p:txBody>
-          <a:bodyPr/>
-          <a:lstStyle/>
-          <a:p>
-            <a:endParaRPr lang="en-US" dirty="0"/>
-          </a:p>
-        </p:txBody>
-      </p:sp>
+      <p:pic>
+        <p:nvPicPr>
+          <p:cNvPr id="3" name="Picture 2" descr="A screenshot of a cell phone&#10;&#10;Description automatically generated">
+            <a:extLst>
+              <a:ext uri="{FF2B5EF4-FFF2-40B4-BE49-F238E27FC236}">
+                <a16:creationId xmlns:a16="http://schemas.microsoft.com/office/drawing/2014/main" id="{8795A5C3-DCA5-494A-9DEC-B005F58AABEA}"/>
+              </a:ext>
+            </a:extLst>
+          </p:cNvPr>
+          <p:cNvPicPr>
+            <a:picLocks noChangeAspect="1"/>
+          </p:cNvPicPr>
+          <p:nvPr/>
+        </p:nvPicPr>
+        <p:blipFill>
+          <a:blip r:embed="rId2"/>
+          <a:stretch>
+            <a:fillRect/>
+          </a:stretch>
+        </p:blipFill>
+        <p:spPr>
+          <a:xfrm>
+            <a:off x="107950" y="476250"/>
+            <a:ext cx="11976100" cy="5905500"/>
+          </a:xfrm>
+          <a:prstGeom prst="rect">
+            <a:avLst/>
+          </a:prstGeom>
+        </p:spPr>
+      </p:pic>
     </p:spTree>
     <p:extLst>
       <p:ext uri="{BB962C8B-B14F-4D97-AF65-F5344CB8AC3E}">
-        <p14:creationId xmlns:p14="http://schemas.microsoft.com/office/powerpoint/2010/main" val="3160576289"/>
+        <p14:creationId xmlns:p14="http://schemas.microsoft.com/office/powerpoint/2010/main" val="4057299804"/>
       </p:ext>
     </p:extLst>
   </p:cSld>
@@ -8237,7 +8639,7 @@
       </p:grpSpPr>
       <p:sp useBgFill="1">
         <p:nvSpPr>
-          <p:cNvPr id="32" name="Rectangle 31">
+          <p:cNvPr id="54" name="Rectangle 44">
             <a:extLst>
               <a:ext uri="{FF2B5EF4-FFF2-40B4-BE49-F238E27FC236}">
                 <a16:creationId xmlns:a16="http://schemas.microsoft.com/office/drawing/2014/main" id="{63F5877B-98C7-49DD-83AB-0F6F57CB6543}"/>
@@ -8297,13 +8699,10 @@
       </p:sp>
       <p:pic>
         <p:nvPicPr>
-          <p:cNvPr id="5" name="Content Placeholder 4">
-            <a:extLst>
-              <a:ext uri="{FF2B5EF4-FFF2-40B4-BE49-F238E27FC236}">
-                <a16:creationId xmlns:a16="http://schemas.microsoft.com/office/drawing/2014/main" id="{69F7A8CA-DFD2-0243-B2DC-8817C6509E22}"/>
-              </a:ext>
-              <a:ext uri="{C183D7F6-B498-43B3-948B-1728B52AA6E4}">
-                <adec:decorative xmlns:adec="http://schemas.microsoft.com/office/drawing/2017/decorative" val="1"/>
+          <p:cNvPr id="20" name="Picture 19" descr="A close up of a map&#10;&#10;Description automatically generated">
+            <a:extLst>
+              <a:ext uri="{FF2B5EF4-FFF2-40B4-BE49-F238E27FC236}">
+                <a16:creationId xmlns:a16="http://schemas.microsoft.com/office/drawing/2014/main" id="{554BF10F-5336-A742-B621-513F2BAC2BB1}"/>
               </a:ext>
             </a:extLst>
           </p:cNvPr>
@@ -8314,7 +8713,7 @@
         </p:nvPicPr>
         <p:blipFill rotWithShape="1">
           <a:blip r:embed="rId2"/>
-          <a:srcRect l="15361" r="14241"/>
+          <a:srcRect l="5323" r="9086"/>
           <a:stretch/>
         </p:blipFill>
         <p:spPr>
@@ -8439,7 +8838,7 @@
       </p:pic>
       <p:sp useBgFill="1">
         <p:nvSpPr>
-          <p:cNvPr id="34" name="Freeform: Shape 33">
+          <p:cNvPr id="55" name="Freeform: Shape 46">
             <a:extLst>
               <a:ext uri="{FF2B5EF4-FFF2-40B4-BE49-F238E27FC236}">
                 <a16:creationId xmlns:a16="http://schemas.microsoft.com/office/drawing/2014/main" id="{4EA91930-66BC-4C41-B4F5-C31EB216F64B}"/>
@@ -8614,7 +9013,7 @@
       </p:sp>
       <p:sp useBgFill="1">
         <p:nvSpPr>
-          <p:cNvPr id="36" name="Freeform: Shape 35">
+          <p:cNvPr id="56" name="Freeform: Shape 48">
             <a:extLst>
               <a:ext uri="{FF2B5EF4-FFF2-40B4-BE49-F238E27FC236}">
                 <a16:creationId xmlns:a16="http://schemas.microsoft.com/office/drawing/2014/main" id="{6313CF8F-B436-401E-9575-DE0F8E8B5B17}"/>
@@ -8777,10 +9176,10 @@
       </p:sp>
       <p:sp>
         <p:nvSpPr>
-          <p:cNvPr id="2" name="Title 1">
-            <a:extLst>
-              <a:ext uri="{FF2B5EF4-FFF2-40B4-BE49-F238E27FC236}">
-                <a16:creationId xmlns:a16="http://schemas.microsoft.com/office/drawing/2014/main" id="{D22BC9F0-495B-E640-BC32-12185CDE5BF0}"/>
+          <p:cNvPr id="14" name="Title 13">
+            <a:extLst>
+              <a:ext uri="{FF2B5EF4-FFF2-40B4-BE49-F238E27FC236}">
+                <a16:creationId xmlns:a16="http://schemas.microsoft.com/office/drawing/2014/main" id="{6FD57BF9-B34F-294D-8E7F-90E8CE78BAA0}"/>
               </a:ext>
             </a:extLst>
           </p:cNvPr>
@@ -8804,22 +9203,15 @@
           <a:lstStyle/>
           <a:p>
             <a:r>
-              <a:rPr lang="en-US" sz="2800"/>
-              <a:t>KC Crime Data </a:t>
+              <a:rPr lang="en-US" sz="2800" dirty="0"/>
+              <a:t>A Closer Look </a:t>
             </a:r>
-            <a:br>
-              <a:rPr lang="en-US" sz="2800"/>
-            </a:br>
-            <a:r>
-              <a:rPr lang="en-US" sz="2800"/>
-              <a:t>COVID Data </a:t>
-            </a:r>
-          </a:p>
-        </p:txBody>
-      </p:sp>
-      <p:sp>
-        <p:nvSpPr>
-          <p:cNvPr id="38" name="Rectangle 37">
+          </a:p>
+        </p:txBody>
+      </p:sp>
+      <p:sp>
+        <p:nvSpPr>
+          <p:cNvPr id="57" name="Rectangle 50">
             <a:extLst>
               <a:ext uri="{FF2B5EF4-FFF2-40B4-BE49-F238E27FC236}">
                 <a16:creationId xmlns:a16="http://schemas.microsoft.com/office/drawing/2014/main" id="{2A38CFE9-C30A-4551-ACCB-D5808FBC39CD}"/>
@@ -8911,7 +9303,7 @@
       </p:sp>
       <p:sp>
         <p:nvSpPr>
-          <p:cNvPr id="40" name="Rectangle 39">
+          <p:cNvPr id="53" name="Rectangle 52">
             <a:extLst>
               <a:ext uri="{FF2B5EF4-FFF2-40B4-BE49-F238E27FC236}">
                 <a16:creationId xmlns:a16="http://schemas.microsoft.com/office/drawing/2014/main" id="{67EF550F-47CE-4FB2-9DAC-12AD835C833D}"/>
@@ -9005,44 +9397,47 @@
           </a:p>
         </p:txBody>
       </p:sp>
-      <p:sp>
-        <p:nvSpPr>
-          <p:cNvPr id="29" name="Content Placeholder 28">
-            <a:extLst>
-              <a:ext uri="{FF2B5EF4-FFF2-40B4-BE49-F238E27FC236}">
-                <a16:creationId xmlns:a16="http://schemas.microsoft.com/office/drawing/2014/main" id="{79255222-5F05-4B02-974A-36F88B261388}"/>
-              </a:ext>
-            </a:extLst>
-          </p:cNvPr>
-          <p:cNvSpPr>
-            <a:spLocks noGrp="1"/>
-          </p:cNvSpPr>
+      <p:pic>
+        <p:nvPicPr>
+          <p:cNvPr id="3" name="Content Placeholder 2" descr="Magnifying glass">
+            <a:extLst>
+              <a:ext uri="{FF2B5EF4-FFF2-40B4-BE49-F238E27FC236}">
+                <a16:creationId xmlns:a16="http://schemas.microsoft.com/office/drawing/2014/main" id="{0672D016-C2B1-AA40-A1F1-B3C6431C13D0}"/>
+              </a:ext>
+            </a:extLst>
+          </p:cNvPr>
+          <p:cNvPicPr>
+            <a:picLocks noGrp="1" noChangeAspect="1"/>
+          </p:cNvPicPr>
           <p:nvPr>
             <p:ph idx="1"/>
           </p:nvPr>
-        </p:nvSpPr>
-        <p:spPr>
-          <a:xfrm>
-            <a:off x="445274" y="2258171"/>
-            <a:ext cx="2804504" cy="3918792"/>
-          </a:xfrm>
-        </p:spPr>
-        <p:txBody>
-          <a:bodyPr>
-            <a:normAutofit/>
-          </a:bodyPr>
-          <a:lstStyle/>
-          <a:p>
-            <a:endParaRPr lang="en-US" sz="1800"/>
-          </a:p>
-        </p:txBody>
-      </p:sp>
-      <p:sp>
-        <p:nvSpPr>
-          <p:cNvPr id="9" name="Right Arrow 8">
-            <a:extLst>
-              <a:ext uri="{FF2B5EF4-FFF2-40B4-BE49-F238E27FC236}">
-                <a16:creationId xmlns:a16="http://schemas.microsoft.com/office/drawing/2014/main" id="{4D0DCA35-0AEB-7D41-945E-6E626E2C8B9B}"/>
+        </p:nvPicPr>
+        <p:blipFill>
+          <a:blip r:embed="rId4">
+            <a:extLst>
+              <a:ext uri="{96DAC541-7B7A-43D3-8B79-37D633B846F1}">
+                <asvg:svgBlip xmlns:asvg="http://schemas.microsoft.com/office/drawing/2016/SVG/main" r:embed="rId5"/>
+              </a:ext>
+            </a:extLst>
+          </a:blip>
+          <a:stretch>
+            <a:fillRect/>
+          </a:stretch>
+        </p:blipFill>
+        <p:spPr>
+          <a:xfrm rot="5551953">
+            <a:off x="1050858" y="2506887"/>
+            <a:ext cx="1834954" cy="1834954"/>
+          </a:xfrm>
+        </p:spPr>
+      </p:pic>
+      <p:sp>
+        <p:nvSpPr>
+          <p:cNvPr id="16" name="Rectangle 15">
+            <a:extLst>
+              <a:ext uri="{FF2B5EF4-FFF2-40B4-BE49-F238E27FC236}">
+                <a16:creationId xmlns:a16="http://schemas.microsoft.com/office/drawing/2014/main" id="{FBFD3534-E286-5343-A1E8-998300A595FA}"/>
               </a:ext>
             </a:extLst>
           </p:cNvPr>
@@ -9051,47 +9446,51 @@
         </p:nvSpPr>
         <p:spPr>
           <a:xfrm>
-            <a:off x="4114800" y="727164"/>
-            <a:ext cx="478971" cy="365223"/>
-          </a:xfrm>
-          <a:prstGeom prst="rightArrow">
-            <a:avLst>
-              <a:gd name="adj1" fmla="val 44039"/>
-              <a:gd name="adj2" fmla="val 50000"/>
-            </a:avLst>
+            <a:off x="8882121" y="343230"/>
+            <a:ext cx="2199641" cy="923330"/>
+          </a:xfrm>
+          <a:prstGeom prst="rect">
+            <a:avLst/>
           </a:prstGeom>
-        </p:spPr>
-        <p:style>
-          <a:lnRef idx="2">
-            <a:schemeClr val="accent2">
-              <a:shade val="50000"/>
-            </a:schemeClr>
-          </a:lnRef>
-          <a:fillRef idx="1">
-            <a:schemeClr val="accent2"/>
-          </a:fillRef>
-          <a:effectRef idx="0">
-            <a:schemeClr val="accent2"/>
-          </a:effectRef>
-          <a:fontRef idx="minor">
-            <a:schemeClr val="lt1"/>
-          </a:fontRef>
-        </p:style>
-        <p:txBody>
-          <a:bodyPr rtlCol="0" anchor="ctr"/>
-          <a:lstStyle/>
-          <a:p>
-            <a:pPr algn="ctr"/>
-            <a:endParaRPr lang="en-US"/>
-          </a:p>
-        </p:txBody>
-      </p:sp>
-      <p:sp>
-        <p:nvSpPr>
-          <p:cNvPr id="11" name="Down Arrow 10">
-            <a:extLst>
-              <a:ext uri="{FF2B5EF4-FFF2-40B4-BE49-F238E27FC236}">
-                <a16:creationId xmlns:a16="http://schemas.microsoft.com/office/drawing/2014/main" id="{5A0D3D0E-2535-3944-AC1E-6DD4FB3EF000}"/>
+          <a:noFill/>
+        </p:spPr>
+        <p:txBody>
+          <a:bodyPr wrap="none" lIns="91440" tIns="45720" rIns="91440" bIns="45720">
+            <a:spAutoFit/>
+          </a:bodyPr>
+          <a:lstStyle/>
+          <a:p>
+            <a:pPr algn="ctr">
+              <a:spcAft>
+                <a:spcPts val="600"/>
+              </a:spcAft>
+            </a:pPr>
+            <a:r>
+              <a:rPr lang="en-US" sz="5400" b="1">
+                <a:ln w="22225">
+                  <a:solidFill>
+                    <a:schemeClr val="accent2"/>
+                  </a:solidFill>
+                  <a:prstDash val="solid"/>
+                </a:ln>
+                <a:solidFill>
+                  <a:schemeClr val="accent2">
+                    <a:lumMod val="40000"/>
+                    <a:lumOff val="60000"/>
+                  </a:schemeClr>
+                </a:solidFill>
+              </a:rPr>
+              <a:t>Crime</a:t>
+            </a:r>
+          </a:p>
+        </p:txBody>
+      </p:sp>
+      <p:sp>
+        <p:nvSpPr>
+          <p:cNvPr id="17" name="Rectangle 16">
+            <a:extLst>
+              <a:ext uri="{FF2B5EF4-FFF2-40B4-BE49-F238E27FC236}">
+                <a16:creationId xmlns:a16="http://schemas.microsoft.com/office/drawing/2014/main" id="{963640D2-AD5E-3B40-98CE-58E68ED99592}"/>
               </a:ext>
             </a:extLst>
           </p:cNvPr>
@@ -9100,35 +9499,43 @@
         </p:nvSpPr>
         <p:spPr>
           <a:xfrm>
-            <a:off x="3537857" y="1219701"/>
-            <a:ext cx="359229" cy="420831"/>
-          </a:xfrm>
-          <a:prstGeom prst="downArrow">
+            <a:off x="3936670" y="343230"/>
+            <a:ext cx="3761671" cy="923330"/>
+          </a:xfrm>
+          <a:prstGeom prst="rect">
             <a:avLst/>
           </a:prstGeom>
-        </p:spPr>
-        <p:style>
-          <a:lnRef idx="2">
-            <a:schemeClr val="accent2">
-              <a:shade val="50000"/>
-            </a:schemeClr>
-          </a:lnRef>
-          <a:fillRef idx="1">
-            <a:schemeClr val="accent2"/>
-          </a:fillRef>
-          <a:effectRef idx="0">
-            <a:schemeClr val="accent2"/>
-          </a:effectRef>
-          <a:fontRef idx="minor">
-            <a:schemeClr val="lt1"/>
-          </a:fontRef>
-        </p:style>
-        <p:txBody>
-          <a:bodyPr rtlCol="0" anchor="ctr"/>
-          <a:lstStyle/>
-          <a:p>
-            <a:pPr algn="ctr"/>
-            <a:endParaRPr lang="en-US"/>
+          <a:noFill/>
+        </p:spPr>
+        <p:txBody>
+          <a:bodyPr wrap="none" lIns="91440" tIns="45720" rIns="91440" bIns="45720">
+            <a:spAutoFit/>
+          </a:bodyPr>
+          <a:lstStyle/>
+          <a:p>
+            <a:pPr algn="ctr">
+              <a:spcAft>
+                <a:spcPts val="600"/>
+              </a:spcAft>
+            </a:pPr>
+            <a:r>
+              <a:rPr lang="en-US" sz="5400" b="1" cap="none" spc="0">
+                <a:ln w="22225">
+                  <a:solidFill>
+                    <a:schemeClr val="accent2"/>
+                  </a:solidFill>
+                  <a:prstDash val="solid"/>
+                </a:ln>
+                <a:solidFill>
+                  <a:schemeClr val="accent2">
+                    <a:lumMod val="40000"/>
+                    <a:lumOff val="60000"/>
+                  </a:schemeClr>
+                </a:solidFill>
+                <a:effectLst/>
+              </a:rPr>
+              <a:t>COVID-19 </a:t>
+            </a:r>
           </a:p>
         </p:txBody>
       </p:sp>
@@ -9170,12 +9577,12 @@
           <a:chExt cx="0" cy="0"/>
         </a:xfrm>
       </p:grpSpPr>
-      <p:sp useBgFill="1">
-        <p:nvSpPr>
-          <p:cNvPr id="73" name="Rectangle 72">
-            <a:extLst>
-              <a:ext uri="{FF2B5EF4-FFF2-40B4-BE49-F238E27FC236}">
-                <a16:creationId xmlns:a16="http://schemas.microsoft.com/office/drawing/2014/main" id="{E45CA849-654C-4173-AD99-B3A2528275F5}"/>
+      <p:sp>
+        <p:nvSpPr>
+          <p:cNvPr id="82" name="Rectangle 81">
+            <a:extLst>
+              <a:ext uri="{FF2B5EF4-FFF2-40B4-BE49-F238E27FC236}">
+                <a16:creationId xmlns:a16="http://schemas.microsoft.com/office/drawing/2014/main" id="{8D06CE56-3881-4ADA-8CEF-D18B02C242A3}"/>
               </a:ext>
               <a:ext uri="{C183D7F6-B498-43B3-948B-1728B52AA6E4}">
                 <adec:decorative xmlns:adec="http://schemas.microsoft.com/office/drawing/2017/decorative" val="1"/>
@@ -9194,104 +9601,9 @@
           </p:nvPr>
         </p:nvSpPr>
         <p:spPr>
-          <a:xfrm>
-            <a:off x="0" y="0"/>
-            <a:ext cx="12192000" cy="6858000"/>
-          </a:xfrm>
-          <a:prstGeom prst="rect">
-            <a:avLst/>
-          </a:prstGeom>
-          <a:ln>
-            <a:noFill/>
-          </a:ln>
-        </p:spPr>
-        <p:style>
-          <a:lnRef idx="2">
-            <a:schemeClr val="accent1">
-              <a:shade val="50000"/>
-            </a:schemeClr>
-          </a:lnRef>
-          <a:fillRef idx="1">
-            <a:schemeClr val="accent1"/>
-          </a:fillRef>
-          <a:effectRef idx="0">
-            <a:schemeClr val="accent1"/>
-          </a:effectRef>
-          <a:fontRef idx="minor">
-            <a:schemeClr val="lt1"/>
-          </a:fontRef>
-        </p:style>
-        <p:txBody>
-          <a:bodyPr rtlCol="0" anchor="ctr"/>
-          <a:lstStyle/>
-          <a:p>
-            <a:pPr algn="ctr"/>
-            <a:endParaRPr lang="en-US"/>
-          </a:p>
-        </p:txBody>
-      </p:sp>
-      <p:sp>
-        <p:nvSpPr>
-          <p:cNvPr id="2" name="Title 1">
-            <a:extLst>
-              <a:ext uri="{FF2B5EF4-FFF2-40B4-BE49-F238E27FC236}">
-                <a16:creationId xmlns:a16="http://schemas.microsoft.com/office/drawing/2014/main" id="{7107BC43-B322-2F47-952F-C78D18132E21}"/>
-              </a:ext>
-            </a:extLst>
-          </p:cNvPr>
-          <p:cNvSpPr>
-            <a:spLocks noGrp="1"/>
-          </p:cNvSpPr>
-          <p:nvPr>
-            <p:ph type="title"/>
-          </p:nvPr>
-        </p:nvSpPr>
-        <p:spPr>
-          <a:xfrm>
-            <a:off x="429768" y="411480"/>
-            <a:ext cx="11201400" cy="1106424"/>
-          </a:xfrm>
-        </p:spPr>
-        <p:txBody>
-          <a:bodyPr>
-            <a:normAutofit/>
-          </a:bodyPr>
-          <a:lstStyle/>
-          <a:p>
-            <a:r>
-              <a:rPr lang="en-US" sz="3600" dirty="0"/>
-              <a:t>Interesting Findings</a:t>
-            </a:r>
-          </a:p>
-        </p:txBody>
-      </p:sp>
-      <p:sp>
-        <p:nvSpPr>
-          <p:cNvPr id="75" name="Rectangle 74">
-            <a:extLst>
-              <a:ext uri="{FF2B5EF4-FFF2-40B4-BE49-F238E27FC236}">
-                <a16:creationId xmlns:a16="http://schemas.microsoft.com/office/drawing/2014/main" id="{3E23A947-2D45-4208-AE2B-64948C87A3EB}"/>
-              </a:ext>
-              <a:ext uri="{C183D7F6-B498-43B3-948B-1728B52AA6E4}">
-                <adec:decorative xmlns:adec="http://schemas.microsoft.com/office/drawing/2017/decorative" val="1"/>
-              </a:ext>
-            </a:extLst>
-          </p:cNvPr>
-          <p:cNvSpPr>
-            <a:spLocks noGrp="1" noRot="1" noChangeAspect="1" noMove="1" noResize="1" noEditPoints="1" noAdjustHandles="1" noChangeArrowheads="1" noChangeShapeType="1" noTextEdit="1"/>
-          </p:cNvSpPr>
-          <p:nvPr>
-            <p:extLst>
-              <p:ext uri="{386F3935-93C4-4BCD-93E2-E3B085C9AB24}">
-                <p16:designElem xmlns:p16="http://schemas.microsoft.com/office/powerpoint/2015/main" val="1"/>
-              </p:ext>
-            </p:extLst>
-          </p:nvPr>
-        </p:nvSpPr>
-        <p:spPr>
-          <a:xfrm>
-            <a:off x="0" y="587931"/>
-            <a:ext cx="128016" cy="704088"/>
+          <a:xfrm rot="5400000">
+            <a:off x="857544" y="346791"/>
+            <a:ext cx="146304" cy="704088"/>
           </a:xfrm>
           <a:prstGeom prst="rect">
             <a:avLst/>
@@ -9357,57 +9669,12 @@
           </a:p>
         </p:txBody>
       </p:sp>
-      <p:pic>
-        <p:nvPicPr>
-          <p:cNvPr id="1026" name="Picture 2">
-            <a:extLst>
-              <a:ext uri="{FF2B5EF4-FFF2-40B4-BE49-F238E27FC236}">
-                <a16:creationId xmlns:a16="http://schemas.microsoft.com/office/drawing/2014/main" id="{BAF8153F-9722-9D40-B2DE-3752E7A596DD}"/>
-              </a:ext>
-            </a:extLst>
-          </p:cNvPr>
-          <p:cNvPicPr>
-            <a:picLocks noChangeAspect="1" noChangeArrowheads="1"/>
-          </p:cNvPicPr>
-          <p:nvPr/>
-        </p:nvPicPr>
-        <p:blipFill rotWithShape="1">
-          <a:blip r:embed="rId2">
-            <a:extLst>
-              <a:ext uri="{28A0092B-C50C-407E-A947-70E740481C1C}">
-                <a14:useLocalDpi xmlns:a14="http://schemas.microsoft.com/office/drawing/2010/main" val="0"/>
-              </a:ext>
-            </a:extLst>
-          </a:blip>
-          <a:srcRect r="-3" b="6675"/>
-          <a:stretch/>
-        </p:blipFill>
-        <p:spPr bwMode="auto">
-          <a:xfrm>
-            <a:off x="429768" y="1721922"/>
-            <a:ext cx="6071045" cy="4520559"/>
-          </a:xfrm>
-          <a:prstGeom prst="rect">
-            <a:avLst/>
-          </a:prstGeom>
-          <a:noFill/>
-          <a:extLst>
-            <a:ext uri="{909E8E84-426E-40DD-AFC4-6F175D3DCCD1}">
-              <a14:hiddenFill xmlns:a14="http://schemas.microsoft.com/office/drawing/2010/main">
-                <a:solidFill>
-                  <a:srgbClr val="FFFFFF"/>
-                </a:solidFill>
-              </a14:hiddenFill>
-            </a:ext>
-          </a:extLst>
-        </p:spPr>
-      </p:pic>
-      <p:sp useBgFill="1">
-        <p:nvSpPr>
-          <p:cNvPr id="77" name="Rectangle 76">
-            <a:extLst>
-              <a:ext uri="{FF2B5EF4-FFF2-40B4-BE49-F238E27FC236}">
-                <a16:creationId xmlns:a16="http://schemas.microsoft.com/office/drawing/2014/main" id="{E5BBB0F9-6A59-4D02-A9C7-A2D6516684CE}"/>
+      <p:sp>
+        <p:nvSpPr>
+          <p:cNvPr id="84" name="Rectangle 83">
+            <a:extLst>
+              <a:ext uri="{FF2B5EF4-FFF2-40B4-BE49-F238E27FC236}">
+                <a16:creationId xmlns:a16="http://schemas.microsoft.com/office/drawing/2014/main" id="{79F3C543-62EC-4433-9C93-A2CD8764E9B4}"/>
               </a:ext>
               <a:ext uri="{C183D7F6-B498-43B3-948B-1728B52AA6E4}">
                 <adec:decorative xmlns:adec="http://schemas.microsoft.com/office/drawing/2017/decorative" val="1"/>
@@ -9426,29 +9693,23 @@
           </p:nvPr>
         </p:nvSpPr>
         <p:spPr>
-          <a:xfrm>
-            <a:off x="7543801" y="1721922"/>
-            <a:ext cx="4218432" cy="4520560"/>
+          <a:xfrm flipV="1">
+            <a:off x="578652" y="4501201"/>
+            <a:ext cx="11034696" cy="18288"/>
           </a:xfrm>
           <a:prstGeom prst="rect">
             <a:avLst/>
           </a:prstGeom>
-          <a:ln w="9525">
-            <a:solidFill>
-              <a:schemeClr val="tx2">
-                <a:lumMod val="10000"/>
-                <a:lumOff val="90000"/>
-              </a:schemeClr>
-            </a:solidFill>
+          <a:solidFill>
+            <a:schemeClr val="tx2">
+              <a:lumMod val="25000"/>
+              <a:lumOff val="75000"/>
+            </a:schemeClr>
+          </a:solidFill>
+          <a:ln w="3175">
+            <a:noFill/>
           </a:ln>
-          <a:effectLst>
-            <a:outerShdw blurRad="50800" dist="38100" dir="2700000" algn="tl" rotWithShape="0">
-              <a:schemeClr val="bg1">
-                <a:lumMod val="85000"/>
-                <a:alpha val="30000"/>
-              </a:schemeClr>
-            </a:outerShdw>
-          </a:effectLst>
+          <a:effectLst/>
         </p:spPr>
         <p:style>
           <a:lnRef idx="2">
@@ -9504,53 +9765,657 @@
           </a:p>
         </p:txBody>
       </p:sp>
+      <p:sp useBgFill="1">
+        <p:nvSpPr>
+          <p:cNvPr id="86" name="Rectangle 85">
+            <a:extLst>
+              <a:ext uri="{FF2B5EF4-FFF2-40B4-BE49-F238E27FC236}">
+                <a16:creationId xmlns:a16="http://schemas.microsoft.com/office/drawing/2014/main" id="{5DCB5928-DC7D-4612-9922-441966E15627}"/>
+              </a:ext>
+              <a:ext uri="{C183D7F6-B498-43B3-948B-1728B52AA6E4}">
+                <adec:decorative xmlns:adec="http://schemas.microsoft.com/office/drawing/2017/decorative" val="1"/>
+              </a:ext>
+            </a:extLst>
+          </p:cNvPr>
+          <p:cNvSpPr>
+            <a:spLocks noGrp="1" noRot="1" noChangeAspect="1" noMove="1" noResize="1" noEditPoints="1" noAdjustHandles="1" noChangeArrowheads="1" noChangeShapeType="1" noTextEdit="1"/>
+          </p:cNvSpPr>
+          <p:nvPr>
+            <p:extLst>
+              <p:ext uri="{386F3935-93C4-4BCD-93E2-E3B085C9AB24}">
+                <p16:designElem xmlns:p16="http://schemas.microsoft.com/office/powerpoint/2015/main" val="1"/>
+              </p:ext>
+            </p:extLst>
+          </p:nvPr>
+        </p:nvSpPr>
+        <p:spPr>
+          <a:xfrm>
+            <a:off x="0" y="0"/>
+            <a:ext cx="12192000" cy="6858000"/>
+          </a:xfrm>
+          <a:prstGeom prst="rect">
+            <a:avLst/>
+          </a:prstGeom>
+          <a:ln>
+            <a:noFill/>
+          </a:ln>
+        </p:spPr>
+        <p:style>
+          <a:lnRef idx="2">
+            <a:schemeClr val="accent1">
+              <a:shade val="50000"/>
+            </a:schemeClr>
+          </a:lnRef>
+          <a:fillRef idx="1">
+            <a:schemeClr val="accent1"/>
+          </a:fillRef>
+          <a:effectRef idx="0">
+            <a:schemeClr val="accent1"/>
+          </a:effectRef>
+          <a:fontRef idx="minor">
+            <a:schemeClr val="lt1"/>
+          </a:fontRef>
+        </p:style>
+        <p:txBody>
+          <a:bodyPr rtlCol="0" anchor="ctr"/>
+          <a:lstStyle/>
+          <a:p>
+            <a:pPr algn="ctr"/>
+            <a:endParaRPr lang="en-US"/>
+          </a:p>
+        </p:txBody>
+      </p:sp>
+      <p:sp useBgFill="1">
+        <p:nvSpPr>
+          <p:cNvPr id="88" name="Freeform: Shape 87">
+            <a:extLst>
+              <a:ext uri="{FF2B5EF4-FFF2-40B4-BE49-F238E27FC236}">
+                <a16:creationId xmlns:a16="http://schemas.microsoft.com/office/drawing/2014/main" id="{682C1161-1736-45EC-99B7-33F3CAE9D517}"/>
+              </a:ext>
+              <a:ext uri="{C183D7F6-B498-43B3-948B-1728B52AA6E4}">
+                <adec:decorative xmlns:adec="http://schemas.microsoft.com/office/drawing/2017/decorative" val="1"/>
+              </a:ext>
+            </a:extLst>
+          </p:cNvPr>
+          <p:cNvSpPr>
+            <a:spLocks noGrp="1" noRot="1" noChangeAspect="1" noMove="1" noResize="1" noEditPoints="1" noAdjustHandles="1" noChangeArrowheads="1" noChangeShapeType="1" noTextEdit="1"/>
+          </p:cNvSpPr>
+          <p:nvPr>
+            <p:extLst>
+              <p:ext uri="{386F3935-93C4-4BCD-93E2-E3B085C9AB24}">
+                <p16:designElem xmlns:p16="http://schemas.microsoft.com/office/powerpoint/2015/main" val="1"/>
+              </p:ext>
+            </p:extLst>
+          </p:nvPr>
+        </p:nvSpPr>
+        <p:spPr>
+          <a:xfrm>
+            <a:off x="0" y="0"/>
+            <a:ext cx="4959047" cy="6858000"/>
+          </a:xfrm>
+          <a:custGeom>
+            <a:avLst/>
+            <a:gdLst>
+              <a:gd name="connsiteX0" fmla="*/ 0 w 4959047"/>
+              <a:gd name="connsiteY0" fmla="*/ 0 h 6858000"/>
+              <a:gd name="connsiteX1" fmla="*/ 4110127 w 4959047"/>
+              <a:gd name="connsiteY1" fmla="*/ 0 h 6858000"/>
+              <a:gd name="connsiteX2" fmla="*/ 4179024 w 4959047"/>
+              <a:gd name="connsiteY2" fmla="*/ 123368 h 6858000"/>
+              <a:gd name="connsiteX3" fmla="*/ 4959047 w 4959047"/>
+              <a:gd name="connsiteY3" fmla="*/ 3429000 h 6858000"/>
+              <a:gd name="connsiteX4" fmla="*/ 4179024 w 4959047"/>
+              <a:gd name="connsiteY4" fmla="*/ 6734633 h 6858000"/>
+              <a:gd name="connsiteX5" fmla="*/ 4110127 w 4959047"/>
+              <a:gd name="connsiteY5" fmla="*/ 6858000 h 6858000"/>
+              <a:gd name="connsiteX6" fmla="*/ 0 w 4959047"/>
+              <a:gd name="connsiteY6" fmla="*/ 6858000 h 6858000"/>
+            </a:gdLst>
+            <a:ahLst/>
+            <a:cxnLst>
+              <a:cxn ang="0">
+                <a:pos x="connsiteX0" y="connsiteY0"/>
+              </a:cxn>
+              <a:cxn ang="0">
+                <a:pos x="connsiteX1" y="connsiteY1"/>
+              </a:cxn>
+              <a:cxn ang="0">
+                <a:pos x="connsiteX2" y="connsiteY2"/>
+              </a:cxn>
+              <a:cxn ang="0">
+                <a:pos x="connsiteX3" y="connsiteY3"/>
+              </a:cxn>
+              <a:cxn ang="0">
+                <a:pos x="connsiteX4" y="connsiteY4"/>
+              </a:cxn>
+              <a:cxn ang="0">
+                <a:pos x="connsiteX5" y="connsiteY5"/>
+              </a:cxn>
+              <a:cxn ang="0">
+                <a:pos x="connsiteX6" y="connsiteY6"/>
+              </a:cxn>
+            </a:cxnLst>
+            <a:rect l="l" t="t" r="r" b="b"/>
+            <a:pathLst>
+              <a:path w="4959047" h="6858000">
+                <a:moveTo>
+                  <a:pt x="0" y="0"/>
+                </a:moveTo>
+                <a:lnTo>
+                  <a:pt x="4110127" y="0"/>
+                </a:lnTo>
+                <a:lnTo>
+                  <a:pt x="4179024" y="123368"/>
+                </a:lnTo>
+                <a:cubicBezTo>
+                  <a:pt x="4668929" y="1045156"/>
+                  <a:pt x="4959047" y="2189404"/>
+                  <a:pt x="4959047" y="3429000"/>
+                </a:cubicBezTo>
+                <a:cubicBezTo>
+                  <a:pt x="4959047" y="4668597"/>
+                  <a:pt x="4668929" y="5812845"/>
+                  <a:pt x="4179024" y="6734633"/>
+                </a:cubicBezTo>
+                <a:lnTo>
+                  <a:pt x="4110127" y="6858000"/>
+                </a:lnTo>
+                <a:lnTo>
+                  <a:pt x="0" y="6858000"/>
+                </a:lnTo>
+                <a:close/>
+              </a:path>
+            </a:pathLst>
+          </a:custGeom>
+          <a:ln w="9525">
+            <a:solidFill>
+              <a:schemeClr val="tx2">
+                <a:lumMod val="10000"/>
+                <a:lumOff val="90000"/>
+              </a:schemeClr>
+            </a:solidFill>
+          </a:ln>
+          <a:effectLst>
+            <a:outerShdw blurRad="50800" dist="38100" algn="l" rotWithShape="0">
+              <a:schemeClr val="bg1">
+                <a:lumMod val="85000"/>
+                <a:alpha val="30000"/>
+              </a:schemeClr>
+            </a:outerShdw>
+          </a:effectLst>
+        </p:spPr>
+        <p:style>
+          <a:lnRef idx="2">
+            <a:schemeClr val="accent1">
+              <a:shade val="50000"/>
+            </a:schemeClr>
+          </a:lnRef>
+          <a:fillRef idx="1">
+            <a:schemeClr val="accent1"/>
+          </a:fillRef>
+          <a:effectRef idx="0">
+            <a:schemeClr val="accent1"/>
+          </a:effectRef>
+          <a:fontRef idx="minor">
+            <a:schemeClr val="lt1"/>
+          </a:fontRef>
+        </p:style>
+        <p:txBody>
+          <a:bodyPr wrap="square" rtlCol="0" anchor="ctr">
+            <a:noAutofit/>
+          </a:bodyPr>
+          <a:lstStyle/>
+          <a:p>
+            <a:pPr marL="0" marR="0" lvl="0" indent="0" algn="ctr" defTabSz="914400" rtl="0" eaLnBrk="1" fontAlgn="auto" latinLnBrk="0" hangingPunct="1">
+              <a:lnSpc>
+                <a:spcPct val="100000"/>
+              </a:lnSpc>
+              <a:spcBef>
+                <a:spcPts val="0"/>
+              </a:spcBef>
+              <a:spcAft>
+                <a:spcPts val="0"/>
+              </a:spcAft>
+              <a:buClrTx/>
+              <a:buSzTx/>
+              <a:buFontTx/>
+              <a:buNone/>
+              <a:tabLst/>
+              <a:defRPr/>
+            </a:pPr>
+            <a:endParaRPr kumimoji="0" lang="en-US" sz="1800" b="0" i="0" u="none" strike="noStrike" kern="1200" cap="none" spc="0" normalizeH="0" baseline="0" noProof="0">
+              <a:ln>
+                <a:noFill/>
+              </a:ln>
+              <a:solidFill>
+                <a:prstClr val="white"/>
+              </a:solidFill>
+              <a:effectLst/>
+              <a:uLnTx/>
+              <a:uFillTx/>
+              <a:latin typeface="Calibri" panose="020F0502020204030204"/>
+              <a:ea typeface="+mn-ea"/>
+              <a:cs typeface="+mn-cs"/>
+            </a:endParaRPr>
+          </a:p>
+        </p:txBody>
+      </p:sp>
+      <p:sp useBgFill="1">
+        <p:nvSpPr>
+          <p:cNvPr id="90" name="Freeform: Shape 89">
+            <a:extLst>
+              <a:ext uri="{FF2B5EF4-FFF2-40B4-BE49-F238E27FC236}">
+                <a16:creationId xmlns:a16="http://schemas.microsoft.com/office/drawing/2014/main" id="{84D4DDB8-B68F-45B0-9F62-C4279996F672}"/>
+              </a:ext>
+              <a:ext uri="{C183D7F6-B498-43B3-948B-1728B52AA6E4}">
+                <adec:decorative xmlns:adec="http://schemas.microsoft.com/office/drawing/2017/decorative" val="1"/>
+              </a:ext>
+            </a:extLst>
+          </p:cNvPr>
+          <p:cNvSpPr>
+            <a:spLocks noGrp="1" noRot="1" noChangeAspect="1" noMove="1" noResize="1" noEditPoints="1" noAdjustHandles="1" noChangeArrowheads="1" noChangeShapeType="1" noTextEdit="1"/>
+          </p:cNvSpPr>
+          <p:nvPr>
+            <p:extLst>
+              <p:ext uri="{386F3935-93C4-4BCD-93E2-E3B085C9AB24}">
+                <p16:designElem xmlns:p16="http://schemas.microsoft.com/office/powerpoint/2015/main" val="1"/>
+              </p:ext>
+            </p:extLst>
+          </p:nvPr>
+        </p:nvSpPr>
+        <p:spPr>
+          <a:xfrm>
+            <a:off x="0" y="0"/>
+            <a:ext cx="4948887" cy="6858000"/>
+          </a:xfrm>
+          <a:custGeom>
+            <a:avLst/>
+            <a:gdLst>
+              <a:gd name="connsiteX0" fmla="*/ 0 w 4948887"/>
+              <a:gd name="connsiteY0" fmla="*/ 0 h 6858000"/>
+              <a:gd name="connsiteX1" fmla="*/ 4099967 w 4948887"/>
+              <a:gd name="connsiteY1" fmla="*/ 0 h 6858000"/>
+              <a:gd name="connsiteX2" fmla="*/ 4168864 w 4948887"/>
+              <a:gd name="connsiteY2" fmla="*/ 123368 h 6858000"/>
+              <a:gd name="connsiteX3" fmla="*/ 4948887 w 4948887"/>
+              <a:gd name="connsiteY3" fmla="*/ 3429000 h 6858000"/>
+              <a:gd name="connsiteX4" fmla="*/ 4168864 w 4948887"/>
+              <a:gd name="connsiteY4" fmla="*/ 6734633 h 6858000"/>
+              <a:gd name="connsiteX5" fmla="*/ 4099967 w 4948887"/>
+              <a:gd name="connsiteY5" fmla="*/ 6858000 h 6858000"/>
+              <a:gd name="connsiteX6" fmla="*/ 0 w 4948887"/>
+              <a:gd name="connsiteY6" fmla="*/ 6858000 h 6858000"/>
+            </a:gdLst>
+            <a:ahLst/>
+            <a:cxnLst>
+              <a:cxn ang="0">
+                <a:pos x="connsiteX0" y="connsiteY0"/>
+              </a:cxn>
+              <a:cxn ang="0">
+                <a:pos x="connsiteX1" y="connsiteY1"/>
+              </a:cxn>
+              <a:cxn ang="0">
+                <a:pos x="connsiteX2" y="connsiteY2"/>
+              </a:cxn>
+              <a:cxn ang="0">
+                <a:pos x="connsiteX3" y="connsiteY3"/>
+              </a:cxn>
+              <a:cxn ang="0">
+                <a:pos x="connsiteX4" y="connsiteY4"/>
+              </a:cxn>
+              <a:cxn ang="0">
+                <a:pos x="connsiteX5" y="connsiteY5"/>
+              </a:cxn>
+              <a:cxn ang="0">
+                <a:pos x="connsiteX6" y="connsiteY6"/>
+              </a:cxn>
+            </a:cxnLst>
+            <a:rect l="l" t="t" r="r" b="b"/>
+            <a:pathLst>
+              <a:path w="4948887" h="6858000">
+                <a:moveTo>
+                  <a:pt x="0" y="0"/>
+                </a:moveTo>
+                <a:lnTo>
+                  <a:pt x="4099967" y="0"/>
+                </a:lnTo>
+                <a:lnTo>
+                  <a:pt x="4168864" y="123368"/>
+                </a:lnTo>
+                <a:cubicBezTo>
+                  <a:pt x="4658769" y="1045156"/>
+                  <a:pt x="4948887" y="2189404"/>
+                  <a:pt x="4948887" y="3429000"/>
+                </a:cubicBezTo>
+                <a:cubicBezTo>
+                  <a:pt x="4948887" y="4668597"/>
+                  <a:pt x="4658769" y="5812845"/>
+                  <a:pt x="4168864" y="6734633"/>
+                </a:cubicBezTo>
+                <a:lnTo>
+                  <a:pt x="4099967" y="6858000"/>
+                </a:lnTo>
+                <a:lnTo>
+                  <a:pt x="0" y="6858000"/>
+                </a:lnTo>
+                <a:close/>
+              </a:path>
+            </a:pathLst>
+          </a:custGeom>
+          <a:ln w="9525">
+            <a:noFill/>
+          </a:ln>
+          <a:effectLst/>
+        </p:spPr>
+        <p:style>
+          <a:lnRef idx="2">
+            <a:schemeClr val="accent1">
+              <a:shade val="50000"/>
+            </a:schemeClr>
+          </a:lnRef>
+          <a:fillRef idx="1">
+            <a:schemeClr val="accent1"/>
+          </a:fillRef>
+          <a:effectRef idx="0">
+            <a:schemeClr val="accent1"/>
+          </a:effectRef>
+          <a:fontRef idx="minor">
+            <a:schemeClr val="lt1"/>
+          </a:fontRef>
+        </p:style>
+        <p:txBody>
+          <a:bodyPr wrap="square" rtlCol="0" anchor="ctr">
+            <a:noAutofit/>
+          </a:bodyPr>
+          <a:lstStyle/>
+          <a:p>
+            <a:pPr marL="0" marR="0" lvl="0" indent="0" algn="ctr" defTabSz="914400" rtl="0" eaLnBrk="1" fontAlgn="auto" latinLnBrk="0" hangingPunct="1">
+              <a:lnSpc>
+                <a:spcPct val="100000"/>
+              </a:lnSpc>
+              <a:spcBef>
+                <a:spcPts val="0"/>
+              </a:spcBef>
+              <a:spcAft>
+                <a:spcPts val="0"/>
+              </a:spcAft>
+              <a:buClrTx/>
+              <a:buSzTx/>
+              <a:buFontTx/>
+              <a:buNone/>
+              <a:tabLst/>
+              <a:defRPr/>
+            </a:pPr>
+            <a:endParaRPr kumimoji="0" lang="en-US" sz="1800" b="0" i="0" u="none" strike="noStrike" kern="1200" cap="none" spc="0" normalizeH="0" baseline="0" noProof="0">
+              <a:ln>
+                <a:noFill/>
+              </a:ln>
+              <a:solidFill>
+                <a:prstClr val="white"/>
+              </a:solidFill>
+              <a:effectLst/>
+              <a:uLnTx/>
+              <a:uFillTx/>
+              <a:latin typeface="Calibri" panose="020F0502020204030204"/>
+              <a:ea typeface="+mn-ea"/>
+              <a:cs typeface="+mn-cs"/>
+            </a:endParaRPr>
+          </a:p>
+        </p:txBody>
+      </p:sp>
+      <p:sp>
+        <p:nvSpPr>
+          <p:cNvPr id="2" name="Title 1">
+            <a:extLst>
+              <a:ext uri="{FF2B5EF4-FFF2-40B4-BE49-F238E27FC236}">
+                <a16:creationId xmlns:a16="http://schemas.microsoft.com/office/drawing/2014/main" id="{7107BC43-B322-2F47-952F-C78D18132E21}"/>
+              </a:ext>
+            </a:extLst>
+          </p:cNvPr>
+          <p:cNvSpPr>
+            <a:spLocks noGrp="1"/>
+          </p:cNvSpPr>
+          <p:nvPr>
+            <p:ph type="title"/>
+          </p:nvPr>
+        </p:nvSpPr>
+        <p:spPr>
+          <a:xfrm>
+            <a:off x="477981" y="1122363"/>
+            <a:ext cx="4023360" cy="3204134"/>
+          </a:xfrm>
+        </p:spPr>
+        <p:txBody>
+          <a:bodyPr vert="horz" lIns="91440" tIns="45720" rIns="91440" bIns="45720" rtlCol="0" anchor="b">
+            <a:normAutofit/>
+          </a:bodyPr>
+          <a:lstStyle/>
+          <a:p>
+            <a:r>
+              <a:rPr lang="en-US" sz="4800"/>
+              <a:t>Interesting Findings</a:t>
+            </a:r>
+          </a:p>
+        </p:txBody>
+      </p:sp>
+      <p:sp>
+        <p:nvSpPr>
+          <p:cNvPr id="92" name="Rectangle 91">
+            <a:extLst>
+              <a:ext uri="{FF2B5EF4-FFF2-40B4-BE49-F238E27FC236}">
+                <a16:creationId xmlns:a16="http://schemas.microsoft.com/office/drawing/2014/main" id="{AF2F604E-43BE-4DC3-B983-E071523364F8}"/>
+              </a:ext>
+              <a:ext uri="{C183D7F6-B498-43B3-948B-1728B52AA6E4}">
+                <adec:decorative xmlns:adec="http://schemas.microsoft.com/office/drawing/2017/decorative" val="1"/>
+              </a:ext>
+            </a:extLst>
+          </p:cNvPr>
+          <p:cNvSpPr>
+            <a:spLocks noGrp="1" noRot="1" noChangeAspect="1" noMove="1" noResize="1" noEditPoints="1" noAdjustHandles="1" noChangeArrowheads="1" noChangeShapeType="1" noTextEdit="1"/>
+          </p:cNvSpPr>
+          <p:nvPr>
+            <p:extLst>
+              <p:ext uri="{386F3935-93C4-4BCD-93E2-E3B085C9AB24}">
+                <p16:designElem xmlns:p16="http://schemas.microsoft.com/office/powerpoint/2015/main" val="1"/>
+              </p:ext>
+            </p:extLst>
+          </p:nvPr>
+        </p:nvSpPr>
+        <p:spPr>
+          <a:xfrm rot="5400000">
+            <a:off x="759921" y="346791"/>
+            <a:ext cx="146304" cy="704088"/>
+          </a:xfrm>
+          <a:prstGeom prst="rect">
+            <a:avLst/>
+          </a:prstGeom>
+          <a:solidFill>
+            <a:schemeClr val="accent1"/>
+          </a:solidFill>
+          <a:ln>
+            <a:noFill/>
+          </a:ln>
+        </p:spPr>
+        <p:style>
+          <a:lnRef idx="2">
+            <a:schemeClr val="accent1">
+              <a:shade val="50000"/>
+            </a:schemeClr>
+          </a:lnRef>
+          <a:fillRef idx="1">
+            <a:schemeClr val="accent1"/>
+          </a:fillRef>
+          <a:effectRef idx="0">
+            <a:schemeClr val="accent1"/>
+          </a:effectRef>
+          <a:fontRef idx="minor">
+            <a:schemeClr val="lt1"/>
+          </a:fontRef>
+        </p:style>
+        <p:txBody>
+          <a:bodyPr rtlCol="0" anchor="ctr"/>
+          <a:lstStyle/>
+          <a:p>
+            <a:pPr marL="0" marR="0" lvl="0" indent="0" algn="ctr" defTabSz="914400" rtl="0" eaLnBrk="1" fontAlgn="auto" latinLnBrk="0" hangingPunct="1">
+              <a:lnSpc>
+                <a:spcPct val="100000"/>
+              </a:lnSpc>
+              <a:spcBef>
+                <a:spcPts val="0"/>
+              </a:spcBef>
+              <a:spcAft>
+                <a:spcPts val="0"/>
+              </a:spcAft>
+              <a:buClrTx/>
+              <a:buSzTx/>
+              <a:buFontTx/>
+              <a:buNone/>
+              <a:tabLst/>
+              <a:defRPr/>
+            </a:pPr>
+            <a:endParaRPr kumimoji="0" lang="en-US" sz="1800" b="0" i="0" u="none" strike="noStrike" kern="1200" cap="none" spc="0" normalizeH="0" baseline="0" noProof="0">
+              <a:ln>
+                <a:noFill/>
+              </a:ln>
+              <a:solidFill>
+                <a:prstClr val="white"/>
+              </a:solidFill>
+              <a:effectLst/>
+              <a:uLnTx/>
+              <a:uFillTx/>
+              <a:latin typeface="Calibri" panose="020F0502020204030204"/>
+              <a:ea typeface="+mn-ea"/>
+              <a:cs typeface="+mn-cs"/>
+            </a:endParaRPr>
+          </a:p>
+        </p:txBody>
+      </p:sp>
+      <p:sp>
+        <p:nvSpPr>
+          <p:cNvPr id="94" name="Rectangle 93">
+            <a:extLst>
+              <a:ext uri="{FF2B5EF4-FFF2-40B4-BE49-F238E27FC236}">
+                <a16:creationId xmlns:a16="http://schemas.microsoft.com/office/drawing/2014/main" id="{08C9B587-E65E-4B52-B37C-ABEBB6E87928}"/>
+              </a:ext>
+              <a:ext uri="{C183D7F6-B498-43B3-948B-1728B52AA6E4}">
+                <adec:decorative xmlns:adec="http://schemas.microsoft.com/office/drawing/2017/decorative" val="1"/>
+              </a:ext>
+            </a:extLst>
+          </p:cNvPr>
+          <p:cNvSpPr>
+            <a:spLocks noGrp="1" noRot="1" noChangeAspect="1" noMove="1" noResize="1" noEditPoints="1" noAdjustHandles="1" noChangeArrowheads="1" noChangeShapeType="1" noTextEdit="1"/>
+          </p:cNvSpPr>
+          <p:nvPr>
+            <p:extLst>
+              <p:ext uri="{386F3935-93C4-4BCD-93E2-E3B085C9AB24}">
+                <p16:designElem xmlns:p16="http://schemas.microsoft.com/office/powerpoint/2015/main" val="1"/>
+              </p:ext>
+            </p:extLst>
+          </p:nvPr>
+        </p:nvSpPr>
+        <p:spPr>
+          <a:xfrm>
+            <a:off x="481029" y="4546920"/>
+            <a:ext cx="4023360" cy="18288"/>
+          </a:xfrm>
+          <a:prstGeom prst="rect">
+            <a:avLst/>
+          </a:prstGeom>
+          <a:solidFill>
+            <a:schemeClr val="tx2">
+              <a:lumMod val="25000"/>
+              <a:lumOff val="75000"/>
+            </a:schemeClr>
+          </a:solidFill>
+          <a:ln w="3175">
+            <a:noFill/>
+          </a:ln>
+          <a:effectLst/>
+        </p:spPr>
+        <p:style>
+          <a:lnRef idx="2">
+            <a:schemeClr val="accent1">
+              <a:shade val="50000"/>
+            </a:schemeClr>
+          </a:lnRef>
+          <a:fillRef idx="1">
+            <a:schemeClr val="accent1"/>
+          </a:fillRef>
+          <a:effectRef idx="0">
+            <a:schemeClr val="accent1"/>
+          </a:effectRef>
+          <a:fontRef idx="minor">
+            <a:schemeClr val="lt1"/>
+          </a:fontRef>
+        </p:style>
+        <p:txBody>
+          <a:bodyPr rtlCol="0" anchor="ctr"/>
+          <a:lstStyle/>
+          <a:p>
+            <a:pPr marL="0" marR="0" lvl="0" indent="0" algn="ctr" defTabSz="914400" rtl="0" eaLnBrk="1" fontAlgn="auto" latinLnBrk="0" hangingPunct="1">
+              <a:lnSpc>
+                <a:spcPct val="100000"/>
+              </a:lnSpc>
+              <a:spcBef>
+                <a:spcPts val="0"/>
+              </a:spcBef>
+              <a:spcAft>
+                <a:spcPts val="0"/>
+              </a:spcAft>
+              <a:buClrTx/>
+              <a:buSzTx/>
+              <a:buFontTx/>
+              <a:buNone/>
+              <a:tabLst/>
+              <a:defRPr/>
+            </a:pPr>
+            <a:endParaRPr kumimoji="0" lang="en-US" sz="1800" b="0" i="0" u="none" strike="noStrike" kern="1200" cap="none" spc="0" normalizeH="0" baseline="0" noProof="0">
+              <a:ln>
+                <a:noFill/>
+              </a:ln>
+              <a:solidFill>
+                <a:prstClr val="white"/>
+              </a:solidFill>
+              <a:effectLst/>
+              <a:uLnTx/>
+              <a:uFillTx/>
+              <a:latin typeface="Calibri" panose="020F0502020204030204"/>
+              <a:ea typeface="+mn-ea"/>
+              <a:cs typeface="+mn-cs"/>
+            </a:endParaRPr>
+          </a:p>
+        </p:txBody>
+      </p:sp>
       <p:pic>
         <p:nvPicPr>
-          <p:cNvPr id="1028" name="Picture 4">
-            <a:extLst>
-              <a:ext uri="{FF2B5EF4-FFF2-40B4-BE49-F238E27FC236}">
-                <a16:creationId xmlns:a16="http://schemas.microsoft.com/office/drawing/2014/main" id="{8EDC7C2B-80F2-CD4C-B045-D9ECF1EADE9D}"/>
+          <p:cNvPr id="4" name="Content Placeholder 3" descr="A close up of a mans face&#10;&#10;Description automatically generated">
+            <a:extLst>
+              <a:ext uri="{FF2B5EF4-FFF2-40B4-BE49-F238E27FC236}">
+                <a16:creationId xmlns:a16="http://schemas.microsoft.com/office/drawing/2014/main" id="{71737A87-EAAD-2D4A-84EC-CC6C0EA60120}"/>
               </a:ext>
             </a:extLst>
           </p:cNvPr>
           <p:cNvPicPr>
-            <a:picLocks noGrp="1" noChangeAspect="1" noChangeArrowheads="1"/>
+            <a:picLocks noGrp="1" noChangeAspect="1"/>
           </p:cNvPicPr>
           <p:nvPr>
             <p:ph idx="1"/>
           </p:nvPr>
         </p:nvPicPr>
         <p:blipFill>
-          <a:blip r:embed="rId3">
-            <a:extLst>
-              <a:ext uri="{28A0092B-C50C-407E-A947-70E740481C1C}">
-                <a14:useLocalDpi xmlns:a14="http://schemas.microsoft.com/office/drawing/2010/main" val="0"/>
-              </a:ext>
-            </a:extLst>
-          </a:blip>
-          <a:srcRect/>
+          <a:blip r:embed="rId2"/>
           <a:stretch>
             <a:fillRect/>
           </a:stretch>
         </p:blipFill>
-        <p:spPr bwMode="auto">
-          <a:xfrm>
-            <a:off x="7723569" y="2285391"/>
-            <a:ext cx="3858896" cy="3253579"/>
+        <p:spPr>
+          <a:xfrm>
+            <a:off x="5414356" y="1182382"/>
+            <a:ext cx="6408836" cy="4341984"/>
           </a:xfrm>
           <a:prstGeom prst="rect">
             <a:avLst/>
           </a:prstGeom>
-          <a:noFill/>
-          <a:extLst>
-            <a:ext uri="{909E8E84-426E-40DD-AFC4-6F175D3DCCD1}">
-              <a14:hiddenFill xmlns:a14="http://schemas.microsoft.com/office/drawing/2010/main">
-                <a:solidFill>
-                  <a:srgbClr val="FFFFFF"/>
-                </a:solidFill>
-              </a14:hiddenFill>
-            </a:ext>
-          </a:extLst>
         </p:spPr>
       </p:pic>
     </p:spTree>
@@ -9567,6 +10432,145 @@
 </file>
 
 <file path=ppt/slides/slide8.xml><?xml version="1.0" encoding="utf-8"?>
+<p:sld xmlns:a="http://schemas.openxmlformats.org/drawingml/2006/main" xmlns:r="http://schemas.openxmlformats.org/officeDocument/2006/relationships" xmlns:p="http://schemas.openxmlformats.org/presentationml/2006/main">
+  <p:cSld>
+    <p:spTree>
+      <p:nvGrpSpPr>
+        <p:cNvPr id="1" name=""/>
+        <p:cNvGrpSpPr/>
+        <p:nvPr/>
+      </p:nvGrpSpPr>
+      <p:grpSpPr>
+        <a:xfrm>
+          <a:off x="0" y="0"/>
+          <a:ext cx="0" cy="0"/>
+          <a:chOff x="0" y="0"/>
+          <a:chExt cx="0" cy="0"/>
+        </a:xfrm>
+      </p:grpSpPr>
+      <p:sp>
+        <p:nvSpPr>
+          <p:cNvPr id="2" name="Title 1">
+            <a:extLst>
+              <a:ext uri="{FF2B5EF4-FFF2-40B4-BE49-F238E27FC236}">
+                <a16:creationId xmlns:a16="http://schemas.microsoft.com/office/drawing/2014/main" id="{6FD65C29-C236-1348-A4EA-394977077B17}"/>
+              </a:ext>
+            </a:extLst>
+          </p:cNvPr>
+          <p:cNvSpPr>
+            <a:spLocks noGrp="1"/>
+          </p:cNvSpPr>
+          <p:nvPr>
+            <p:ph type="title"/>
+          </p:nvPr>
+        </p:nvSpPr>
+        <p:spPr/>
+        <p:txBody>
+          <a:bodyPr>
+            <a:normAutofit/>
+          </a:bodyPr>
+          <a:lstStyle/>
+          <a:p>
+            <a:r>
+              <a:rPr lang="en-US" dirty="0"/>
+              <a:t>Crime stats</a:t>
+            </a:r>
+          </a:p>
+        </p:txBody>
+      </p:sp>
+      <p:pic>
+        <p:nvPicPr>
+          <p:cNvPr id="4" name="Picture 4">
+            <a:extLst>
+              <a:ext uri="{FF2B5EF4-FFF2-40B4-BE49-F238E27FC236}">
+                <a16:creationId xmlns:a16="http://schemas.microsoft.com/office/drawing/2014/main" id="{A6AFEC6E-760B-974D-972F-9563E79E2310}"/>
+              </a:ext>
+            </a:extLst>
+          </p:cNvPr>
+          <p:cNvPicPr>
+            <a:picLocks noGrp="1" noChangeAspect="1" noChangeArrowheads="1"/>
+          </p:cNvPicPr>
+          <p:nvPr>
+            <p:ph idx="1"/>
+          </p:nvPr>
+        </p:nvPicPr>
+        <p:blipFill>
+          <a:blip r:embed="rId2">
+            <a:extLst>
+              <a:ext uri="{28A0092B-C50C-407E-A947-70E740481C1C}">
+                <a14:useLocalDpi xmlns:a14="http://schemas.microsoft.com/office/drawing/2010/main" val="0"/>
+              </a:ext>
+            </a:extLst>
+          </a:blip>
+          <a:srcRect/>
+          <a:stretch>
+            <a:fillRect/>
+          </a:stretch>
+        </p:blipFill>
+        <p:spPr bwMode="auto">
+          <a:xfrm>
+            <a:off x="993228" y="2194312"/>
+            <a:ext cx="5102772" cy="4302337"/>
+          </a:xfrm>
+          <a:prstGeom prst="rect">
+            <a:avLst/>
+          </a:prstGeom>
+          <a:noFill/>
+          <a:extLst>
+            <a:ext uri="{909E8E84-426E-40DD-AFC4-6F175D3DCCD1}">
+              <a14:hiddenFill xmlns:a14="http://schemas.microsoft.com/office/drawing/2010/main">
+                <a:solidFill>
+                  <a:srgbClr val="FFFFFF"/>
+                </a:solidFill>
+              </a14:hiddenFill>
+            </a:ext>
+          </a:extLst>
+        </p:spPr>
+      </p:pic>
+      <p:pic>
+        <p:nvPicPr>
+          <p:cNvPr id="6" name="Picture 5" descr="A close up of a logo&#10;&#10;Description automatically generated">
+            <a:extLst>
+              <a:ext uri="{FF2B5EF4-FFF2-40B4-BE49-F238E27FC236}">
+                <a16:creationId xmlns:a16="http://schemas.microsoft.com/office/drawing/2014/main" id="{1DCBCCD5-8F18-6B4B-BDAB-BF10C99FE133}"/>
+              </a:ext>
+            </a:extLst>
+          </p:cNvPr>
+          <p:cNvPicPr>
+            <a:picLocks noChangeAspect="1"/>
+          </p:cNvPicPr>
+          <p:nvPr/>
+        </p:nvPicPr>
+        <p:blipFill>
+          <a:blip r:embed="rId3"/>
+          <a:stretch>
+            <a:fillRect/>
+          </a:stretch>
+        </p:blipFill>
+        <p:spPr>
+          <a:xfrm>
+            <a:off x="6747641" y="2590022"/>
+            <a:ext cx="4256689" cy="3738983"/>
+          </a:xfrm>
+          <a:prstGeom prst="rect">
+            <a:avLst/>
+          </a:prstGeom>
+        </p:spPr>
+      </p:pic>
+    </p:spTree>
+    <p:extLst>
+      <p:ext uri="{BB962C8B-B14F-4D97-AF65-F5344CB8AC3E}">
+        <p14:creationId xmlns:p14="http://schemas.microsoft.com/office/powerpoint/2010/main" val="319120901"/>
+      </p:ext>
+    </p:extLst>
+  </p:cSld>
+  <p:clrMapOvr>
+    <a:masterClrMapping/>
+  </p:clrMapOvr>
+</p:sld>
+</file>
+
+<file path=ppt/slides/slide9.xml><?xml version="1.0" encoding="utf-8"?>
 <p:sld xmlns:a="http://schemas.openxmlformats.org/drawingml/2006/main" xmlns:r="http://schemas.openxmlformats.org/officeDocument/2006/relationships" xmlns:p="http://schemas.openxmlformats.org/presentationml/2006/main">
   <p:cSld>
     <p:bg>
@@ -10201,602 +11205,6 @@
     <p:extLst>
       <p:ext uri="{BB962C8B-B14F-4D97-AF65-F5344CB8AC3E}">
         <p14:creationId xmlns:p14="http://schemas.microsoft.com/office/powerpoint/2010/main" val="1903028505"/>
-      </p:ext>
-    </p:extLst>
-  </p:cSld>
-  <p:clrMapOvr>
-    <a:masterClrMapping/>
-  </p:clrMapOvr>
-</p:sld>
-</file>
-
-<file path=ppt/slides/slide9.xml><?xml version="1.0" encoding="utf-8"?>
-<p:sld xmlns:a="http://schemas.openxmlformats.org/drawingml/2006/main" xmlns:r="http://schemas.openxmlformats.org/officeDocument/2006/relationships" xmlns:p="http://schemas.openxmlformats.org/presentationml/2006/main">
-  <p:cSld>
-    <p:bg>
-      <p:bgPr>
-        <a:solidFill>
-          <a:schemeClr val="bg1"/>
-        </a:solidFill>
-        <a:effectLst/>
-      </p:bgPr>
-    </p:bg>
-    <p:spTree>
-      <p:nvGrpSpPr>
-        <p:cNvPr id="1" name=""/>
-        <p:cNvGrpSpPr/>
-        <p:nvPr/>
-      </p:nvGrpSpPr>
-      <p:grpSpPr>
-        <a:xfrm>
-          <a:off x="0" y="0"/>
-          <a:ext cx="0" cy="0"/>
-          <a:chOff x="0" y="0"/>
-          <a:chExt cx="0" cy="0"/>
-        </a:xfrm>
-      </p:grpSpPr>
-      <p:sp useBgFill="1">
-        <p:nvSpPr>
-          <p:cNvPr id="8" name="Rectangle 7">
-            <a:extLst>
-              <a:ext uri="{FF2B5EF4-FFF2-40B4-BE49-F238E27FC236}">
-                <a16:creationId xmlns:a16="http://schemas.microsoft.com/office/drawing/2014/main" id="{1C799903-48D5-4A31-A1A2-541072D9771E}"/>
-              </a:ext>
-              <a:ext uri="{C183D7F6-B498-43B3-948B-1728B52AA6E4}">
-                <adec:decorative xmlns:adec="http://schemas.microsoft.com/office/drawing/2017/decorative" val="1"/>
-              </a:ext>
-            </a:extLst>
-          </p:cNvPr>
-          <p:cNvSpPr>
-            <a:spLocks noGrp="1" noRot="1" noChangeAspect="1" noMove="1" noResize="1" noEditPoints="1" noAdjustHandles="1" noChangeArrowheads="1" noChangeShapeType="1" noTextEdit="1"/>
-          </p:cNvSpPr>
-          <p:nvPr>
-            <p:extLst>
-              <p:ext uri="{386F3935-93C4-4BCD-93E2-E3B085C9AB24}">
-                <p16:designElem xmlns:p16="http://schemas.microsoft.com/office/powerpoint/2015/main" val="1"/>
-              </p:ext>
-            </p:extLst>
-          </p:nvPr>
-        </p:nvSpPr>
-        <p:spPr>
-          <a:xfrm>
-            <a:off x="0" y="0"/>
-            <a:ext cx="12192002" cy="6858000"/>
-          </a:xfrm>
-          <a:prstGeom prst="rect">
-            <a:avLst/>
-          </a:prstGeom>
-          <a:ln>
-            <a:noFill/>
-          </a:ln>
-        </p:spPr>
-        <p:style>
-          <a:lnRef idx="2">
-            <a:schemeClr val="accent1">
-              <a:shade val="50000"/>
-            </a:schemeClr>
-          </a:lnRef>
-          <a:fillRef idx="1">
-            <a:schemeClr val="accent1"/>
-          </a:fillRef>
-          <a:effectRef idx="0">
-            <a:schemeClr val="accent1"/>
-          </a:effectRef>
-          <a:fontRef idx="minor">
-            <a:schemeClr val="lt1"/>
-          </a:fontRef>
-        </p:style>
-        <p:txBody>
-          <a:bodyPr rtlCol="0" anchor="ctr"/>
-          <a:lstStyle/>
-          <a:p>
-            <a:pPr algn="ctr"/>
-            <a:endParaRPr lang="en-US"/>
-          </a:p>
-        </p:txBody>
-      </p:sp>
-      <p:sp useBgFill="1">
-        <p:nvSpPr>
-          <p:cNvPr id="10" name="Freeform: Shape 9">
-            <a:extLst>
-              <a:ext uri="{FF2B5EF4-FFF2-40B4-BE49-F238E27FC236}">
-                <a16:creationId xmlns:a16="http://schemas.microsoft.com/office/drawing/2014/main" id="{8EFFF109-FC58-4FD3-BE05-9775A1310F55}"/>
-              </a:ext>
-              <a:ext uri="{C183D7F6-B498-43B3-948B-1728B52AA6E4}">
-                <adec:decorative xmlns:adec="http://schemas.microsoft.com/office/drawing/2017/decorative" val="1"/>
-              </a:ext>
-            </a:extLst>
-          </p:cNvPr>
-          <p:cNvSpPr>
-            <a:spLocks noGrp="1" noRot="1" noChangeAspect="1" noMove="1" noResize="1" noEditPoints="1" noAdjustHandles="1" noChangeArrowheads="1" noChangeShapeType="1" noTextEdit="1"/>
-          </p:cNvSpPr>
-          <p:nvPr>
-            <p:extLst>
-              <p:ext uri="{386F3935-93C4-4BCD-93E2-E3B085C9AB24}">
-                <p16:designElem xmlns:p16="http://schemas.microsoft.com/office/powerpoint/2015/main" val="1"/>
-              </p:ext>
-            </p:extLst>
-          </p:nvPr>
-        </p:nvSpPr>
-        <p:spPr>
-          <a:xfrm>
-            <a:off x="-1" y="0"/>
-            <a:ext cx="4818889" cy="6858000"/>
-          </a:xfrm>
-          <a:custGeom>
-            <a:avLst/>
-            <a:gdLst>
-              <a:gd name="connsiteX0" fmla="*/ 0 w 4818889"/>
-              <a:gd name="connsiteY0" fmla="*/ 0 h 6858000"/>
-              <a:gd name="connsiteX1" fmla="*/ 3605911 w 4818889"/>
-              <a:gd name="connsiteY1" fmla="*/ 0 h 6858000"/>
-              <a:gd name="connsiteX2" fmla="*/ 3668894 w 4818889"/>
-              <a:gd name="connsiteY2" fmla="*/ 69271 h 6858000"/>
-              <a:gd name="connsiteX3" fmla="*/ 4818889 w 4818889"/>
-              <a:gd name="connsiteY3" fmla="*/ 3429000 h 6858000"/>
-              <a:gd name="connsiteX4" fmla="*/ 3668894 w 4818889"/>
-              <a:gd name="connsiteY4" fmla="*/ 6788730 h 6858000"/>
-              <a:gd name="connsiteX5" fmla="*/ 3605911 w 4818889"/>
-              <a:gd name="connsiteY5" fmla="*/ 6858000 h 6858000"/>
-              <a:gd name="connsiteX6" fmla="*/ 0 w 4818889"/>
-              <a:gd name="connsiteY6" fmla="*/ 6858000 h 6858000"/>
-            </a:gdLst>
-            <a:ahLst/>
-            <a:cxnLst>
-              <a:cxn ang="0">
-                <a:pos x="connsiteX0" y="connsiteY0"/>
-              </a:cxn>
-              <a:cxn ang="0">
-                <a:pos x="connsiteX1" y="connsiteY1"/>
-              </a:cxn>
-              <a:cxn ang="0">
-                <a:pos x="connsiteX2" y="connsiteY2"/>
-              </a:cxn>
-              <a:cxn ang="0">
-                <a:pos x="connsiteX3" y="connsiteY3"/>
-              </a:cxn>
-              <a:cxn ang="0">
-                <a:pos x="connsiteX4" y="connsiteY4"/>
-              </a:cxn>
-              <a:cxn ang="0">
-                <a:pos x="connsiteX5" y="connsiteY5"/>
-              </a:cxn>
-              <a:cxn ang="0">
-                <a:pos x="connsiteX6" y="connsiteY6"/>
-              </a:cxn>
-            </a:cxnLst>
-            <a:rect l="l" t="t" r="r" b="b"/>
-            <a:pathLst>
-              <a:path w="4818889" h="6858000">
-                <a:moveTo>
-                  <a:pt x="0" y="0"/>
-                </a:moveTo>
-                <a:lnTo>
-                  <a:pt x="3605911" y="0"/>
-                </a:lnTo>
-                <a:lnTo>
-                  <a:pt x="3668894" y="69271"/>
-                </a:lnTo>
-                <a:cubicBezTo>
-                  <a:pt x="4379420" y="929100"/>
-                  <a:pt x="4818889" y="2116944"/>
-                  <a:pt x="4818889" y="3429000"/>
-                </a:cubicBezTo>
-                <a:cubicBezTo>
-                  <a:pt x="4818889" y="4741056"/>
-                  <a:pt x="4379420" y="5928900"/>
-                  <a:pt x="3668894" y="6788730"/>
-                </a:cubicBezTo>
-                <a:lnTo>
-                  <a:pt x="3605911" y="6858000"/>
-                </a:lnTo>
-                <a:lnTo>
-                  <a:pt x="0" y="6858000"/>
-                </a:lnTo>
-                <a:close/>
-              </a:path>
-            </a:pathLst>
-          </a:custGeom>
-          <a:ln w="9525">
-            <a:solidFill>
-              <a:schemeClr val="tx2">
-                <a:lumMod val="10000"/>
-                <a:lumOff val="90000"/>
-              </a:schemeClr>
-            </a:solidFill>
-          </a:ln>
-          <a:effectLst>
-            <a:outerShdw blurRad="50800" dist="38100" algn="l" rotWithShape="0">
-              <a:schemeClr val="bg1">
-                <a:lumMod val="85000"/>
-                <a:alpha val="30000"/>
-              </a:schemeClr>
-            </a:outerShdw>
-          </a:effectLst>
-        </p:spPr>
-        <p:style>
-          <a:lnRef idx="2">
-            <a:schemeClr val="accent1">
-              <a:shade val="50000"/>
-            </a:schemeClr>
-          </a:lnRef>
-          <a:fillRef idx="1">
-            <a:schemeClr val="accent1"/>
-          </a:fillRef>
-          <a:effectRef idx="0">
-            <a:schemeClr val="accent1"/>
-          </a:effectRef>
-          <a:fontRef idx="minor">
-            <a:schemeClr val="lt1"/>
-          </a:fontRef>
-        </p:style>
-        <p:txBody>
-          <a:bodyPr wrap="square" rtlCol="0" anchor="ctr">
-            <a:noAutofit/>
-          </a:bodyPr>
-          <a:lstStyle/>
-          <a:p>
-            <a:pPr marL="0" marR="0" lvl="0" indent="0" algn="ctr" defTabSz="914400" rtl="0" eaLnBrk="1" fontAlgn="auto" latinLnBrk="0" hangingPunct="1">
-              <a:lnSpc>
-                <a:spcPct val="100000"/>
-              </a:lnSpc>
-              <a:spcBef>
-                <a:spcPts val="0"/>
-              </a:spcBef>
-              <a:spcAft>
-                <a:spcPts val="0"/>
-              </a:spcAft>
-              <a:buClrTx/>
-              <a:buSzTx/>
-              <a:buFontTx/>
-              <a:buNone/>
-              <a:tabLst/>
-              <a:defRPr/>
-            </a:pPr>
-            <a:endParaRPr kumimoji="0" lang="en-US" sz="1800" b="0" i="0" u="none" strike="noStrike" kern="1200" cap="none" spc="0" normalizeH="0" baseline="0" noProof="0">
-              <a:ln>
-                <a:noFill/>
-              </a:ln>
-              <a:solidFill>
-                <a:prstClr val="white"/>
-              </a:solidFill>
-              <a:effectLst/>
-              <a:uLnTx/>
-              <a:uFillTx/>
-              <a:latin typeface="Calibri" panose="020F0502020204030204"/>
-              <a:ea typeface="+mn-ea"/>
-              <a:cs typeface="+mn-cs"/>
-            </a:endParaRPr>
-          </a:p>
-        </p:txBody>
-      </p:sp>
-      <p:sp useBgFill="1">
-        <p:nvSpPr>
-          <p:cNvPr id="12" name="Freeform: Shape 11">
-            <a:extLst>
-              <a:ext uri="{FF2B5EF4-FFF2-40B4-BE49-F238E27FC236}">
-                <a16:creationId xmlns:a16="http://schemas.microsoft.com/office/drawing/2014/main" id="{E1B96AD6-92A9-4273-A62B-96A1C3E0BA95}"/>
-              </a:ext>
-              <a:ext uri="{C183D7F6-B498-43B3-948B-1728B52AA6E4}">
-                <adec:decorative xmlns:adec="http://schemas.microsoft.com/office/drawing/2017/decorative" val="1"/>
-              </a:ext>
-            </a:extLst>
-          </p:cNvPr>
-          <p:cNvSpPr>
-            <a:spLocks noGrp="1" noRot="1" noChangeAspect="1" noMove="1" noResize="1" noEditPoints="1" noAdjustHandles="1" noChangeArrowheads="1" noChangeShapeType="1" noTextEdit="1"/>
-          </p:cNvSpPr>
-          <p:nvPr>
-            <p:extLst>
-              <p:ext uri="{386F3935-93C4-4BCD-93E2-E3B085C9AB24}">
-                <p16:designElem xmlns:p16="http://schemas.microsoft.com/office/powerpoint/2015/main" val="1"/>
-              </p:ext>
-            </p:extLst>
-          </p:nvPr>
-        </p:nvSpPr>
-        <p:spPr>
-          <a:xfrm>
-            <a:off x="1" y="0"/>
-            <a:ext cx="4811477" cy="6858000"/>
-          </a:xfrm>
-          <a:custGeom>
-            <a:avLst/>
-            <a:gdLst>
-              <a:gd name="connsiteX0" fmla="*/ 0 w 4811477"/>
-              <a:gd name="connsiteY0" fmla="*/ 0 h 6858000"/>
-              <a:gd name="connsiteX1" fmla="*/ 3598499 w 4811477"/>
-              <a:gd name="connsiteY1" fmla="*/ 0 h 6858000"/>
-              <a:gd name="connsiteX2" fmla="*/ 3661482 w 4811477"/>
-              <a:gd name="connsiteY2" fmla="*/ 69271 h 6858000"/>
-              <a:gd name="connsiteX3" fmla="*/ 4811477 w 4811477"/>
-              <a:gd name="connsiteY3" fmla="*/ 3429000 h 6858000"/>
-              <a:gd name="connsiteX4" fmla="*/ 3661482 w 4811477"/>
-              <a:gd name="connsiteY4" fmla="*/ 6788730 h 6858000"/>
-              <a:gd name="connsiteX5" fmla="*/ 3598499 w 4811477"/>
-              <a:gd name="connsiteY5" fmla="*/ 6858000 h 6858000"/>
-              <a:gd name="connsiteX6" fmla="*/ 0 w 4811477"/>
-              <a:gd name="connsiteY6" fmla="*/ 6858000 h 6858000"/>
-            </a:gdLst>
-            <a:ahLst/>
-            <a:cxnLst>
-              <a:cxn ang="0">
-                <a:pos x="connsiteX0" y="connsiteY0"/>
-              </a:cxn>
-              <a:cxn ang="0">
-                <a:pos x="connsiteX1" y="connsiteY1"/>
-              </a:cxn>
-              <a:cxn ang="0">
-                <a:pos x="connsiteX2" y="connsiteY2"/>
-              </a:cxn>
-              <a:cxn ang="0">
-                <a:pos x="connsiteX3" y="connsiteY3"/>
-              </a:cxn>
-              <a:cxn ang="0">
-                <a:pos x="connsiteX4" y="connsiteY4"/>
-              </a:cxn>
-              <a:cxn ang="0">
-                <a:pos x="connsiteX5" y="connsiteY5"/>
-              </a:cxn>
-              <a:cxn ang="0">
-                <a:pos x="connsiteX6" y="connsiteY6"/>
-              </a:cxn>
-            </a:cxnLst>
-            <a:rect l="l" t="t" r="r" b="b"/>
-            <a:pathLst>
-              <a:path w="4811477" h="6858000">
-                <a:moveTo>
-                  <a:pt x="0" y="0"/>
-                </a:moveTo>
-                <a:lnTo>
-                  <a:pt x="3598499" y="0"/>
-                </a:lnTo>
-                <a:lnTo>
-                  <a:pt x="3661482" y="69271"/>
-                </a:lnTo>
-                <a:cubicBezTo>
-                  <a:pt x="4372008" y="929100"/>
-                  <a:pt x="4811477" y="2116944"/>
-                  <a:pt x="4811477" y="3429000"/>
-                </a:cubicBezTo>
-                <a:cubicBezTo>
-                  <a:pt x="4811477" y="4741056"/>
-                  <a:pt x="4372008" y="5928900"/>
-                  <a:pt x="3661482" y="6788730"/>
-                </a:cubicBezTo>
-                <a:lnTo>
-                  <a:pt x="3598499" y="6858000"/>
-                </a:lnTo>
-                <a:lnTo>
-                  <a:pt x="0" y="6858000"/>
-                </a:lnTo>
-                <a:close/>
-              </a:path>
-            </a:pathLst>
-          </a:custGeom>
-          <a:ln w="9525">
-            <a:noFill/>
-          </a:ln>
-          <a:effectLst/>
-        </p:spPr>
-        <p:style>
-          <a:lnRef idx="2">
-            <a:schemeClr val="accent1">
-              <a:shade val="50000"/>
-            </a:schemeClr>
-          </a:lnRef>
-          <a:fillRef idx="1">
-            <a:schemeClr val="accent1"/>
-          </a:fillRef>
-          <a:effectRef idx="0">
-            <a:schemeClr val="accent1"/>
-          </a:effectRef>
-          <a:fontRef idx="minor">
-            <a:schemeClr val="lt1"/>
-          </a:fontRef>
-        </p:style>
-        <p:txBody>
-          <a:bodyPr wrap="square" rtlCol="0" anchor="ctr">
-            <a:noAutofit/>
-          </a:bodyPr>
-          <a:lstStyle/>
-          <a:p>
-            <a:pPr marL="0" marR="0" lvl="0" indent="0" algn="ctr" defTabSz="914400" rtl="0" eaLnBrk="1" fontAlgn="auto" latinLnBrk="0" hangingPunct="1">
-              <a:lnSpc>
-                <a:spcPct val="100000"/>
-              </a:lnSpc>
-              <a:spcBef>
-                <a:spcPts val="0"/>
-              </a:spcBef>
-              <a:spcAft>
-                <a:spcPts val="0"/>
-              </a:spcAft>
-              <a:buClrTx/>
-              <a:buSzTx/>
-              <a:buFontTx/>
-              <a:buNone/>
-              <a:tabLst/>
-              <a:defRPr/>
-            </a:pPr>
-            <a:endParaRPr kumimoji="0" lang="en-US" sz="1800" b="0" i="0" u="none" strike="noStrike" kern="1200" cap="none" spc="0" normalizeH="0" baseline="0" noProof="0">
-              <a:ln>
-                <a:noFill/>
-              </a:ln>
-              <a:solidFill>
-                <a:prstClr val="white"/>
-              </a:solidFill>
-              <a:effectLst/>
-              <a:uLnTx/>
-              <a:uFillTx/>
-              <a:latin typeface="Calibri" panose="020F0502020204030204"/>
-              <a:ea typeface="+mn-ea"/>
-              <a:cs typeface="+mn-cs"/>
-            </a:endParaRPr>
-          </a:p>
-        </p:txBody>
-      </p:sp>
-      <p:sp>
-        <p:nvSpPr>
-          <p:cNvPr id="2" name="Title 1">
-            <a:extLst>
-              <a:ext uri="{FF2B5EF4-FFF2-40B4-BE49-F238E27FC236}">
-                <a16:creationId xmlns:a16="http://schemas.microsoft.com/office/drawing/2014/main" id="{6CD7E464-D8AA-B140-9A1F-1DA8E7871E93}"/>
-              </a:ext>
-            </a:extLst>
-          </p:cNvPr>
-          <p:cNvSpPr>
-            <a:spLocks noGrp="1"/>
-          </p:cNvSpPr>
-          <p:nvPr>
-            <p:ph type="title"/>
-          </p:nvPr>
-        </p:nvSpPr>
-        <p:spPr>
-          <a:xfrm>
-            <a:off x="621792" y="1161288"/>
-            <a:ext cx="3602736" cy="4526280"/>
-          </a:xfrm>
-        </p:spPr>
-        <p:txBody>
-          <a:bodyPr>
-            <a:normAutofit/>
-          </a:bodyPr>
-          <a:lstStyle/>
-          <a:p>
-            <a:pPr algn="ctr"/>
-            <a:r>
-              <a:rPr lang="en-US" dirty="0"/>
-              <a:t>Issues we ran into</a:t>
-            </a:r>
-          </a:p>
-        </p:txBody>
-      </p:sp>
-      <p:sp>
-        <p:nvSpPr>
-          <p:cNvPr id="14" name="Rectangle 13">
-            <a:extLst>
-              <a:ext uri="{FF2B5EF4-FFF2-40B4-BE49-F238E27FC236}">
-                <a16:creationId xmlns:a16="http://schemas.microsoft.com/office/drawing/2014/main" id="{463EEC44-1BA3-44ED-81FC-A644B04B2A44}"/>
-              </a:ext>
-              <a:ext uri="{C183D7F6-B498-43B3-948B-1728B52AA6E4}">
-                <adec:decorative xmlns:adec="http://schemas.microsoft.com/office/drawing/2017/decorative" val="1"/>
-              </a:ext>
-            </a:extLst>
-          </p:cNvPr>
-          <p:cNvSpPr>
-            <a:spLocks noGrp="1" noRot="1" noChangeAspect="1" noMove="1" noResize="1" noEditPoints="1" noAdjustHandles="1" noChangeArrowheads="1" noChangeShapeType="1" noTextEdit="1"/>
-          </p:cNvSpPr>
-          <p:nvPr>
-            <p:extLst>
-              <p:ext uri="{386F3935-93C4-4BCD-93E2-E3B085C9AB24}">
-                <p16:designElem xmlns:p16="http://schemas.microsoft.com/office/powerpoint/2015/main" val="1"/>
-              </p:ext>
-            </p:extLst>
-          </p:nvPr>
-        </p:nvSpPr>
-        <p:spPr>
-          <a:xfrm>
-            <a:off x="0" y="3102049"/>
-            <a:ext cx="128016" cy="653903"/>
-          </a:xfrm>
-          <a:prstGeom prst="rect">
-            <a:avLst/>
-          </a:prstGeom>
-          <a:solidFill>
-            <a:schemeClr val="accent1"/>
-          </a:solidFill>
-          <a:ln>
-            <a:noFill/>
-          </a:ln>
-        </p:spPr>
-        <p:style>
-          <a:lnRef idx="2">
-            <a:schemeClr val="accent1">
-              <a:shade val="50000"/>
-            </a:schemeClr>
-          </a:lnRef>
-          <a:fillRef idx="1">
-            <a:schemeClr val="accent1"/>
-          </a:fillRef>
-          <a:effectRef idx="0">
-            <a:schemeClr val="accent1"/>
-          </a:effectRef>
-          <a:fontRef idx="minor">
-            <a:schemeClr val="lt1"/>
-          </a:fontRef>
-        </p:style>
-        <p:txBody>
-          <a:bodyPr rtlCol="0" anchor="ctr"/>
-          <a:lstStyle/>
-          <a:p>
-            <a:pPr marL="0" marR="0" lvl="0" indent="0" algn="ctr" defTabSz="914400" rtl="0" eaLnBrk="1" fontAlgn="auto" latinLnBrk="0" hangingPunct="1">
-              <a:lnSpc>
-                <a:spcPct val="100000"/>
-              </a:lnSpc>
-              <a:spcBef>
-                <a:spcPts val="0"/>
-              </a:spcBef>
-              <a:spcAft>
-                <a:spcPts val="0"/>
-              </a:spcAft>
-              <a:buClrTx/>
-              <a:buSzTx/>
-              <a:buFontTx/>
-              <a:buNone/>
-              <a:tabLst/>
-              <a:defRPr/>
-            </a:pPr>
-            <a:endParaRPr kumimoji="0" lang="en-US" sz="1800" b="0" i="0" u="none" strike="noStrike" kern="1200" cap="none" spc="0" normalizeH="0" baseline="0" noProof="0">
-              <a:ln>
-                <a:noFill/>
-              </a:ln>
-              <a:solidFill>
-                <a:prstClr val="white"/>
-              </a:solidFill>
-              <a:effectLst/>
-              <a:uLnTx/>
-              <a:uFillTx/>
-              <a:latin typeface="Calibri" panose="020F0502020204030204"/>
-              <a:ea typeface="+mn-ea"/>
-              <a:cs typeface="+mn-cs"/>
-            </a:endParaRPr>
-          </a:p>
-        </p:txBody>
-      </p:sp>
-      <p:sp>
-        <p:nvSpPr>
-          <p:cNvPr id="3" name="Content Placeholder 2">
-            <a:extLst>
-              <a:ext uri="{FF2B5EF4-FFF2-40B4-BE49-F238E27FC236}">
-                <a16:creationId xmlns:a16="http://schemas.microsoft.com/office/drawing/2014/main" id="{C2AC20D3-1AFB-844B-8B1B-6B9C26B27666}"/>
-              </a:ext>
-            </a:extLst>
-          </p:cNvPr>
-          <p:cNvSpPr>
-            <a:spLocks noGrp="1"/>
-          </p:cNvSpPr>
-          <p:nvPr>
-            <p:ph idx="1"/>
-          </p:nvPr>
-        </p:nvSpPr>
-        <p:spPr>
-          <a:xfrm>
-            <a:off x="5434149" y="932688"/>
-            <a:ext cx="5916603" cy="4992624"/>
-          </a:xfrm>
-        </p:spPr>
-        <p:txBody>
-          <a:bodyPr anchor="ctr">
-            <a:normAutofit/>
-          </a:bodyPr>
-          <a:lstStyle/>
-          <a:p>
-            <a:endParaRPr lang="en-US" sz="2000"/>
-          </a:p>
-        </p:txBody>
-      </p:sp>
-    </p:spTree>
-    <p:extLst>
-      <p:ext uri="{BB962C8B-B14F-4D97-AF65-F5344CB8AC3E}">
-        <p14:creationId xmlns:p14="http://schemas.microsoft.com/office/powerpoint/2010/main" val="1750294061"/>
       </p:ext>
     </p:extLst>
   </p:cSld>

</xml_diff>

<commit_message>
ppt and word cloud img
</commit_message>
<xml_diff>
--- a/ETL PROJECT POWERPOINT.pptx
+++ b/ETL PROJECT POWERPOINT.pptx
@@ -5,7 +5,7 @@
     <p:sldMasterId id="2147484131" r:id="rId1"/>
   </p:sldMasterIdLst>
   <p:notesMasterIdLst>
-    <p:notesMasterId r:id="rId13"/>
+    <p:notesMasterId r:id="rId14"/>
   </p:notesMasterIdLst>
   <p:sldIdLst>
     <p:sldId id="256" r:id="rId2"/>
@@ -13,12 +13,13 @@
     <p:sldId id="261" r:id="rId4"/>
     <p:sldId id="263" r:id="rId5"/>
     <p:sldId id="266" r:id="rId6"/>
-    <p:sldId id="264" r:id="rId7"/>
-    <p:sldId id="265" r:id="rId8"/>
-    <p:sldId id="267" r:id="rId9"/>
-    <p:sldId id="259" r:id="rId10"/>
-    <p:sldId id="262" r:id="rId11"/>
-    <p:sldId id="260" r:id="rId12"/>
+    <p:sldId id="268" r:id="rId7"/>
+    <p:sldId id="264" r:id="rId8"/>
+    <p:sldId id="265" r:id="rId9"/>
+    <p:sldId id="267" r:id="rId10"/>
+    <p:sldId id="259" r:id="rId11"/>
+    <p:sldId id="262" r:id="rId12"/>
+    <p:sldId id="260" r:id="rId13"/>
   </p:sldIdLst>
   <p:sldSz cx="12192000" cy="6858000"/>
   <p:notesSz cx="6858000" cy="9144000"/>
@@ -207,7 +208,7 @@
           <a:p>
             <a:fld id="{482027EF-67BE-5A46-860B-6F29508315F9}" type="datetimeFigureOut">
               <a:rPr lang="en-US" smtClean="0"/>
-              <a:t>8/27/2020</a:t>
+              <a:t>8/28/20</a:t>
             </a:fld>
             <a:endParaRPr lang="en-US"/>
           </a:p>
@@ -626,7 +627,7 @@
           <a:p>
             <a:fld id="{0E2084AF-775F-644F-A6A8-8F68198F063E}" type="slidenum">
               <a:rPr lang="en-US" smtClean="0"/>
-              <a:t>10</a:t>
+              <a:t>11</a:t>
             </a:fld>
             <a:endParaRPr lang="en-US"/>
           </a:p>
@@ -801,7 +802,7 @@
           <a:p>
             <a:fld id="{02AC24A9-CCB6-4F8D-B8DB-C2F3692CFA5A}" type="datetimeFigureOut">
               <a:rPr lang="en-US" smtClean="0"/>
-              <a:t>8/27/2020</a:t>
+              <a:t>8/28/20</a:t>
             </a:fld>
             <a:endParaRPr lang="en-US" dirty="0"/>
           </a:p>
@@ -1171,7 +1172,7 @@
           <a:p>
             <a:fld id="{02AC24A9-CCB6-4F8D-B8DB-C2F3692CFA5A}" type="datetimeFigureOut">
               <a:rPr lang="en-US" smtClean="0"/>
-              <a:t>8/27/2020</a:t>
+              <a:t>8/28/20</a:t>
             </a:fld>
             <a:endParaRPr lang="en-US"/>
           </a:p>
@@ -1380,7 +1381,7 @@
           <a:p>
             <a:fld id="{02AC24A9-CCB6-4F8D-B8DB-C2F3692CFA5A}" type="datetimeFigureOut">
               <a:rPr lang="en-US" smtClean="0"/>
-              <a:t>8/27/2020</a:t>
+              <a:t>8/28/20</a:t>
             </a:fld>
             <a:endParaRPr lang="en-US"/>
           </a:p>
@@ -1850,7 +1851,7 @@
           <a:p>
             <a:fld id="{02AC24A9-CCB6-4F8D-B8DB-C2F3692CFA5A}" type="datetimeFigureOut">
               <a:rPr lang="en-US" smtClean="0"/>
-              <a:t>8/27/2020</a:t>
+              <a:t>8/28/20</a:t>
             </a:fld>
             <a:endParaRPr lang="en-US"/>
           </a:p>
@@ -2304,7 +2305,7 @@
           <a:p>
             <a:fld id="{02AC24A9-CCB6-4F8D-B8DB-C2F3692CFA5A}" type="datetimeFigureOut">
               <a:rPr lang="en-US" smtClean="0"/>
-              <a:t>8/27/2020</a:t>
+              <a:t>8/28/20</a:t>
             </a:fld>
             <a:endParaRPr lang="en-US"/>
           </a:p>
@@ -2836,7 +2837,7 @@
           <a:p>
             <a:fld id="{02AC24A9-CCB6-4F8D-B8DB-C2F3692CFA5A}" type="datetimeFigureOut">
               <a:rPr lang="en-US" smtClean="0"/>
-              <a:t>8/27/2020</a:t>
+              <a:t>8/28/20</a:t>
             </a:fld>
             <a:endParaRPr lang="en-US"/>
           </a:p>
@@ -3535,7 +3536,7 @@
           <a:p>
             <a:fld id="{02AC24A9-CCB6-4F8D-B8DB-C2F3692CFA5A}" type="datetimeFigureOut">
               <a:rPr lang="en-US" smtClean="0"/>
-              <a:t>8/27/2020</a:t>
+              <a:t>8/28/20</a:t>
             </a:fld>
             <a:endParaRPr lang="en-US"/>
           </a:p>
@@ -3864,7 +3865,7 @@
           <a:p>
             <a:fld id="{02AC24A9-CCB6-4F8D-B8DB-C2F3692CFA5A}" type="datetimeFigureOut">
               <a:rPr lang="en-US" smtClean="0"/>
-              <a:t>8/27/2020</a:t>
+              <a:t>8/28/20</a:t>
             </a:fld>
             <a:endParaRPr lang="en-US"/>
           </a:p>
@@ -3977,7 +3978,7 @@
           <a:p>
             <a:fld id="{02AC24A9-CCB6-4F8D-B8DB-C2F3692CFA5A}" type="datetimeFigureOut">
               <a:rPr lang="en-US" smtClean="0"/>
-              <a:t>8/27/2020</a:t>
+              <a:t>8/28/20</a:t>
             </a:fld>
             <a:endParaRPr lang="en-US"/>
           </a:p>
@@ -4472,7 +4473,7 @@
           <a:p>
             <a:fld id="{02AC24A9-CCB6-4F8D-B8DB-C2F3692CFA5A}" type="datetimeFigureOut">
               <a:rPr lang="en-US" smtClean="0"/>
-              <a:t>8/27/2020</a:t>
+              <a:t>8/28/20</a:t>
             </a:fld>
             <a:endParaRPr lang="en-US" dirty="0"/>
           </a:p>
@@ -4949,7 +4950,7 @@
           <a:p>
             <a:fld id="{02AC24A9-CCB6-4F8D-B8DB-C2F3692CFA5A}" type="datetimeFigureOut">
               <a:rPr lang="en-US" smtClean="0"/>
-              <a:t>8/27/2020</a:t>
+              <a:t>8/28/20</a:t>
             </a:fld>
             <a:endParaRPr lang="en-US"/>
           </a:p>
@@ -5192,7 +5193,7 @@
           <a:p>
             <a:fld id="{02AC24A9-CCB6-4F8D-B8DB-C2F3692CFA5A}" type="datetimeFigureOut">
               <a:rPr lang="en-US" smtClean="0"/>
-              <a:t>8/27/2020</a:t>
+              <a:t>8/28/20</a:t>
             </a:fld>
             <a:endParaRPr lang="en-US"/>
           </a:p>
@@ -6102,908 +6103,6 @@
       </p:grpSpPr>
       <p:sp useBgFill="1">
         <p:nvSpPr>
-          <p:cNvPr id="21" name="Rectangle 20">
-            <a:extLst>
-              <a:ext uri="{FF2B5EF4-FFF2-40B4-BE49-F238E27FC236}">
-                <a16:creationId xmlns:a16="http://schemas.microsoft.com/office/drawing/2014/main" id="{0B9EE3F3-89B7-43C3-8651-C4C96830993D}"/>
-              </a:ext>
-              <a:ext uri="{C183D7F6-B498-43B3-948B-1728B52AA6E4}">
-                <adec:decorative xmlns:adec="http://schemas.microsoft.com/office/drawing/2017/decorative" val="1"/>
-              </a:ext>
-            </a:extLst>
-          </p:cNvPr>
-          <p:cNvSpPr>
-            <a:spLocks noGrp="1" noRot="1" noChangeAspect="1" noMove="1" noResize="1" noEditPoints="1" noAdjustHandles="1" noChangeArrowheads="1" noChangeShapeType="1" noTextEdit="1"/>
-          </p:cNvSpPr>
-          <p:nvPr>
-            <p:extLst>
-              <p:ext uri="{386F3935-93C4-4BCD-93E2-E3B085C9AB24}">
-                <p16:designElem xmlns:p16="http://schemas.microsoft.com/office/powerpoint/2015/main" val="1"/>
-              </p:ext>
-            </p:extLst>
-          </p:nvPr>
-        </p:nvSpPr>
-        <p:spPr>
-          <a:xfrm>
-            <a:off x="0" y="0"/>
-            <a:ext cx="12192000" cy="6858000"/>
-          </a:xfrm>
-          <a:prstGeom prst="rect">
-            <a:avLst/>
-          </a:prstGeom>
-          <a:ln>
-            <a:noFill/>
-          </a:ln>
-        </p:spPr>
-        <p:style>
-          <a:lnRef idx="2">
-            <a:schemeClr val="accent1">
-              <a:shade val="50000"/>
-            </a:schemeClr>
-          </a:lnRef>
-          <a:fillRef idx="1">
-            <a:schemeClr val="accent1"/>
-          </a:fillRef>
-          <a:effectRef idx="0">
-            <a:schemeClr val="accent1"/>
-          </a:effectRef>
-          <a:fontRef idx="minor">
-            <a:schemeClr val="lt1"/>
-          </a:fontRef>
-        </p:style>
-        <p:txBody>
-          <a:bodyPr rtlCol="0" anchor="ctr"/>
-          <a:lstStyle/>
-          <a:p>
-            <a:pPr algn="ctr"/>
-            <a:endParaRPr lang="en-US"/>
-          </a:p>
-        </p:txBody>
-      </p:sp>
-      <p:sp>
-        <p:nvSpPr>
-          <p:cNvPr id="2" name="Title 1">
-            <a:extLst>
-              <a:ext uri="{FF2B5EF4-FFF2-40B4-BE49-F238E27FC236}">
-                <a16:creationId xmlns:a16="http://schemas.microsoft.com/office/drawing/2014/main" id="{6CD7E464-D8AA-B140-9A1F-1DA8E7871E93}"/>
-              </a:ext>
-            </a:extLst>
-          </p:cNvPr>
-          <p:cNvSpPr>
-            <a:spLocks noGrp="1"/>
-          </p:cNvSpPr>
-          <p:nvPr>
-            <p:ph type="title"/>
-          </p:nvPr>
-        </p:nvSpPr>
-        <p:spPr>
-          <a:xfrm>
-            <a:off x="411480" y="991443"/>
-            <a:ext cx="4443154" cy="1087819"/>
-          </a:xfrm>
-        </p:spPr>
-        <p:txBody>
-          <a:bodyPr anchor="b">
-            <a:normAutofit/>
-          </a:bodyPr>
-          <a:lstStyle/>
-          <a:p>
-            <a:r>
-              <a:rPr lang="en-US" sz="3400"/>
-              <a:t>Issues we ran into</a:t>
-            </a:r>
-          </a:p>
-        </p:txBody>
-      </p:sp>
-      <p:sp>
-        <p:nvSpPr>
-          <p:cNvPr id="23" name="Rectangle 22">
-            <a:extLst>
-              <a:ext uri="{FF2B5EF4-FFF2-40B4-BE49-F238E27FC236}">
-                <a16:creationId xmlns:a16="http://schemas.microsoft.com/office/drawing/2014/main" id="{33AE4636-AEEC-45D6-84D4-7AC2DA48ECF8}"/>
-              </a:ext>
-              <a:ext uri="{C183D7F6-B498-43B3-948B-1728B52AA6E4}">
-                <adec:decorative xmlns:adec="http://schemas.microsoft.com/office/drawing/2017/decorative" val="1"/>
-              </a:ext>
-            </a:extLst>
-          </p:cNvPr>
-          <p:cNvSpPr>
-            <a:spLocks noGrp="1" noRot="1" noChangeAspect="1" noMove="1" noResize="1" noEditPoints="1" noAdjustHandles="1" noChangeArrowheads="1" noChangeShapeType="1" noTextEdit="1"/>
-          </p:cNvSpPr>
-          <p:nvPr>
-            <p:extLst>
-              <p:ext uri="{386F3935-93C4-4BCD-93E2-E3B085C9AB24}">
-                <p16:designElem xmlns:p16="http://schemas.microsoft.com/office/powerpoint/2015/main" val="1"/>
-              </p:ext>
-            </p:extLst>
-          </p:nvPr>
-        </p:nvSpPr>
-        <p:spPr>
-          <a:xfrm rot="5400000">
-            <a:off x="649223" y="387939"/>
-            <a:ext cx="73152" cy="548640"/>
-          </a:xfrm>
-          <a:prstGeom prst="rect">
-            <a:avLst/>
-          </a:prstGeom>
-          <a:solidFill>
-            <a:schemeClr val="accent1"/>
-          </a:solidFill>
-          <a:ln>
-            <a:noFill/>
-          </a:ln>
-        </p:spPr>
-        <p:style>
-          <a:lnRef idx="2">
-            <a:schemeClr val="accent1">
-              <a:shade val="50000"/>
-            </a:schemeClr>
-          </a:lnRef>
-          <a:fillRef idx="1">
-            <a:schemeClr val="accent1"/>
-          </a:fillRef>
-          <a:effectRef idx="0">
-            <a:schemeClr val="accent1"/>
-          </a:effectRef>
-          <a:fontRef idx="minor">
-            <a:schemeClr val="lt1"/>
-          </a:fontRef>
-        </p:style>
-        <p:txBody>
-          <a:bodyPr rtlCol="0" anchor="ctr"/>
-          <a:lstStyle/>
-          <a:p>
-            <a:pPr marL="0" marR="0" lvl="0" indent="0" algn="ctr" defTabSz="914400" rtl="0" eaLnBrk="1" fontAlgn="auto" latinLnBrk="0" hangingPunct="1">
-              <a:lnSpc>
-                <a:spcPct val="100000"/>
-              </a:lnSpc>
-              <a:spcBef>
-                <a:spcPts val="0"/>
-              </a:spcBef>
-              <a:spcAft>
-                <a:spcPts val="0"/>
-              </a:spcAft>
-              <a:buClrTx/>
-              <a:buSzTx/>
-              <a:buFontTx/>
-              <a:buNone/>
-              <a:tabLst/>
-              <a:defRPr/>
-            </a:pPr>
-            <a:endParaRPr kumimoji="0" lang="en-US" sz="1800" b="0" i="0" u="none" strike="noStrike" kern="1200" cap="none" spc="0" normalizeH="0" baseline="0" noProof="0">
-              <a:ln>
-                <a:noFill/>
-              </a:ln>
-              <a:solidFill>
-                <a:prstClr val="white"/>
-              </a:solidFill>
-              <a:effectLst/>
-              <a:uLnTx/>
-              <a:uFillTx/>
-              <a:latin typeface="Calibri" panose="020F0502020204030204"/>
-              <a:ea typeface="+mn-ea"/>
-              <a:cs typeface="+mn-cs"/>
-            </a:endParaRPr>
-          </a:p>
-        </p:txBody>
-      </p:sp>
-      <p:sp>
-        <p:nvSpPr>
-          <p:cNvPr id="25" name="Rectangle 24">
-            <a:extLst>
-              <a:ext uri="{FF2B5EF4-FFF2-40B4-BE49-F238E27FC236}">
-                <a16:creationId xmlns:a16="http://schemas.microsoft.com/office/drawing/2014/main" id="{8D9CE0F4-2EB2-4F1F-8AAC-DB3571D9FE10}"/>
-              </a:ext>
-              <a:ext uri="{C183D7F6-B498-43B3-948B-1728B52AA6E4}">
-                <adec:decorative xmlns:adec="http://schemas.microsoft.com/office/drawing/2017/decorative" val="1"/>
-              </a:ext>
-            </a:extLst>
-          </p:cNvPr>
-          <p:cNvSpPr>
-            <a:spLocks noGrp="1" noRot="1" noChangeAspect="1" noMove="1" noResize="1" noEditPoints="1" noAdjustHandles="1" noChangeArrowheads="1" noChangeShapeType="1" noTextEdit="1"/>
-          </p:cNvSpPr>
-          <p:nvPr>
-            <p:extLst>
-              <p:ext uri="{386F3935-93C4-4BCD-93E2-E3B085C9AB24}">
-                <p16:designElem xmlns:p16="http://schemas.microsoft.com/office/powerpoint/2015/main" val="1"/>
-              </p:ext>
-            </p:extLst>
-          </p:nvPr>
-        </p:nvSpPr>
-        <p:spPr>
-          <a:xfrm>
-            <a:off x="411480" y="2285541"/>
-            <a:ext cx="4389120" cy="18288"/>
-          </a:xfrm>
-          <a:prstGeom prst="rect">
-            <a:avLst/>
-          </a:prstGeom>
-          <a:solidFill>
-            <a:schemeClr val="tx2">
-              <a:lumMod val="25000"/>
-              <a:lumOff val="75000"/>
-            </a:schemeClr>
-          </a:solidFill>
-          <a:ln w="3175">
-            <a:noFill/>
-          </a:ln>
-          <a:effectLst/>
-        </p:spPr>
-        <p:style>
-          <a:lnRef idx="2">
-            <a:schemeClr val="accent1">
-              <a:shade val="50000"/>
-            </a:schemeClr>
-          </a:lnRef>
-          <a:fillRef idx="1">
-            <a:schemeClr val="accent1"/>
-          </a:fillRef>
-          <a:effectRef idx="0">
-            <a:schemeClr val="accent1"/>
-          </a:effectRef>
-          <a:fontRef idx="minor">
-            <a:schemeClr val="lt1"/>
-          </a:fontRef>
-        </p:style>
-        <p:txBody>
-          <a:bodyPr rtlCol="0" anchor="ctr"/>
-          <a:lstStyle/>
-          <a:p>
-            <a:pPr marL="0" marR="0" lvl="0" indent="0" algn="ctr" defTabSz="914400" rtl="0" eaLnBrk="1" fontAlgn="auto" latinLnBrk="0" hangingPunct="1">
-              <a:lnSpc>
-                <a:spcPct val="100000"/>
-              </a:lnSpc>
-              <a:spcBef>
-                <a:spcPts val="0"/>
-              </a:spcBef>
-              <a:spcAft>
-                <a:spcPts val="0"/>
-              </a:spcAft>
-              <a:buClrTx/>
-              <a:buSzTx/>
-              <a:buFontTx/>
-              <a:buNone/>
-              <a:tabLst/>
-              <a:defRPr/>
-            </a:pPr>
-            <a:endParaRPr kumimoji="0" lang="en-US" sz="1800" b="0" i="0" u="none" strike="noStrike" kern="1200" cap="none" spc="0" normalizeH="0" baseline="0" noProof="0">
-              <a:ln>
-                <a:noFill/>
-              </a:ln>
-              <a:solidFill>
-                <a:prstClr val="white"/>
-              </a:solidFill>
-              <a:effectLst/>
-              <a:uLnTx/>
-              <a:uFillTx/>
-              <a:latin typeface="Calibri" panose="020F0502020204030204"/>
-              <a:ea typeface="+mn-ea"/>
-              <a:cs typeface="+mn-cs"/>
-            </a:endParaRPr>
-          </a:p>
-        </p:txBody>
-      </p:sp>
-      <p:sp>
-        <p:nvSpPr>
-          <p:cNvPr id="3" name="Content Placeholder 2">
-            <a:extLst>
-              <a:ext uri="{FF2B5EF4-FFF2-40B4-BE49-F238E27FC236}">
-                <a16:creationId xmlns:a16="http://schemas.microsoft.com/office/drawing/2014/main" id="{C2AC20D3-1AFB-844B-8B1B-6B9C26B27666}"/>
-              </a:ext>
-            </a:extLst>
-          </p:cNvPr>
-          <p:cNvSpPr>
-            <a:spLocks noGrp="1"/>
-          </p:cNvSpPr>
-          <p:nvPr>
-            <p:ph idx="1"/>
-          </p:nvPr>
-        </p:nvSpPr>
-        <p:spPr>
-          <a:xfrm>
-            <a:off x="411480" y="2684095"/>
-            <a:ext cx="4443154" cy="3492868"/>
-          </a:xfrm>
-        </p:spPr>
-        <p:txBody>
-          <a:bodyPr>
-            <a:normAutofit/>
-          </a:bodyPr>
-          <a:lstStyle/>
-          <a:p>
-            <a:r>
-              <a:rPr lang="en-US" sz="1700" dirty="0"/>
-              <a:t>Data interpretation with the heatmap</a:t>
-            </a:r>
-          </a:p>
-          <a:p>
-            <a:r>
-              <a:rPr lang="en-US" sz="1700" dirty="0"/>
-              <a:t>Data sources </a:t>
-            </a:r>
-          </a:p>
-          <a:p>
-            <a:r>
-              <a:rPr lang="en-US" sz="1700" dirty="0"/>
-              <a:t>Converting zip codes to latitude and longitude </a:t>
-            </a:r>
-          </a:p>
-          <a:p>
-            <a:endParaRPr lang="en-US" sz="1700" dirty="0"/>
-          </a:p>
-          <a:p>
-            <a:endParaRPr lang="en-US" sz="1700" dirty="0"/>
-          </a:p>
-        </p:txBody>
-      </p:sp>
-      <p:pic>
-        <p:nvPicPr>
-          <p:cNvPr id="18" name="Graphic 17" descr="Statistics">
-            <a:extLst>
-              <a:ext uri="{FF2B5EF4-FFF2-40B4-BE49-F238E27FC236}">
-                <a16:creationId xmlns:a16="http://schemas.microsoft.com/office/drawing/2014/main" id="{DFB68B12-8ED3-4769-AEC6-47412BBD89D7}"/>
-              </a:ext>
-            </a:extLst>
-          </p:cNvPr>
-          <p:cNvPicPr>
-            <a:picLocks noChangeAspect="1"/>
-          </p:cNvPicPr>
-          <p:nvPr/>
-        </p:nvPicPr>
-        <p:blipFill>
-          <a:blip r:embed="rId3">
-            <a:extLst>
-              <a:ext uri="{28A0092B-C50C-407E-A947-70E740481C1C}">
-                <a14:useLocalDpi xmlns:a14="http://schemas.microsoft.com/office/drawing/2010/main" val="0"/>
-              </a:ext>
-              <a:ext uri="{96DAC541-7B7A-43D3-8B79-37D633B846F1}">
-                <asvg:svgBlip xmlns:asvg="http://schemas.microsoft.com/office/drawing/2016/SVG/main" r:embed="rId4"/>
-              </a:ext>
-            </a:extLst>
-          </a:blip>
-          <a:stretch>
-            <a:fillRect/>
-          </a:stretch>
-        </p:blipFill>
-        <p:spPr>
-          <a:xfrm>
-            <a:off x="5830388" y="625683"/>
-            <a:ext cx="5551280" cy="5551280"/>
-          </a:xfrm>
-          <a:prstGeom prst="rect">
-            <a:avLst/>
-          </a:prstGeom>
-        </p:spPr>
-      </p:pic>
-    </p:spTree>
-    <p:extLst>
-      <p:ext uri="{BB962C8B-B14F-4D97-AF65-F5344CB8AC3E}">
-        <p14:creationId xmlns:p14="http://schemas.microsoft.com/office/powerpoint/2010/main" val="1750294061"/>
-      </p:ext>
-    </p:extLst>
-  </p:cSld>
-  <p:clrMapOvr>
-    <a:masterClrMapping/>
-  </p:clrMapOvr>
-</p:sld>
-</file>
-
-<file path=ppt/slides/slide11.xml><?xml version="1.0" encoding="utf-8"?>
-<p:sld xmlns:a="http://schemas.openxmlformats.org/drawingml/2006/main" xmlns:r="http://schemas.openxmlformats.org/officeDocument/2006/relationships" xmlns:p="http://schemas.openxmlformats.org/presentationml/2006/main">
-  <p:cSld>
-    <p:bg>
-      <p:bgPr>
-        <a:solidFill>
-          <a:schemeClr val="bg1"/>
-        </a:solidFill>
-        <a:effectLst/>
-      </p:bgPr>
-    </p:bg>
-    <p:spTree>
-      <p:nvGrpSpPr>
-        <p:cNvPr id="1" name=""/>
-        <p:cNvGrpSpPr/>
-        <p:nvPr/>
-      </p:nvGrpSpPr>
-      <p:grpSpPr>
-        <a:xfrm>
-          <a:off x="0" y="0"/>
-          <a:ext cx="0" cy="0"/>
-          <a:chOff x="0" y="0"/>
-          <a:chExt cx="0" cy="0"/>
-        </a:xfrm>
-      </p:grpSpPr>
-      <p:sp>
-        <p:nvSpPr>
-          <p:cNvPr id="8" name="Rectangle 7">
-            <a:extLst>
-              <a:ext uri="{FF2B5EF4-FFF2-40B4-BE49-F238E27FC236}">
-                <a16:creationId xmlns:a16="http://schemas.microsoft.com/office/drawing/2014/main" id="{8D06CE56-3881-4ADA-8CEF-D18B02C242A3}"/>
-              </a:ext>
-              <a:ext uri="{C183D7F6-B498-43B3-948B-1728B52AA6E4}">
-                <adec:decorative xmlns:adec="http://schemas.microsoft.com/office/drawing/2017/decorative" val="1"/>
-              </a:ext>
-            </a:extLst>
-          </p:cNvPr>
-          <p:cNvSpPr>
-            <a:spLocks noGrp="1" noRot="1" noChangeAspect="1" noMove="1" noResize="1" noEditPoints="1" noAdjustHandles="1" noChangeArrowheads="1" noChangeShapeType="1" noTextEdit="1"/>
-          </p:cNvSpPr>
-          <p:nvPr>
-            <p:extLst>
-              <p:ext uri="{386F3935-93C4-4BCD-93E2-E3B085C9AB24}">
-                <p16:designElem xmlns:p16="http://schemas.microsoft.com/office/powerpoint/2015/main" val="1"/>
-              </p:ext>
-            </p:extLst>
-          </p:nvPr>
-        </p:nvSpPr>
-        <p:spPr>
-          <a:xfrm rot="5400000">
-            <a:off x="857544" y="346791"/>
-            <a:ext cx="146304" cy="704088"/>
-          </a:xfrm>
-          <a:prstGeom prst="rect">
-            <a:avLst/>
-          </a:prstGeom>
-          <a:solidFill>
-            <a:schemeClr val="accent1"/>
-          </a:solidFill>
-          <a:ln>
-            <a:noFill/>
-          </a:ln>
-        </p:spPr>
-        <p:style>
-          <a:lnRef idx="2">
-            <a:schemeClr val="accent1">
-              <a:shade val="50000"/>
-            </a:schemeClr>
-          </a:lnRef>
-          <a:fillRef idx="1">
-            <a:schemeClr val="accent1"/>
-          </a:fillRef>
-          <a:effectRef idx="0">
-            <a:schemeClr val="accent1"/>
-          </a:effectRef>
-          <a:fontRef idx="minor">
-            <a:schemeClr val="lt1"/>
-          </a:fontRef>
-        </p:style>
-        <p:txBody>
-          <a:bodyPr rtlCol="0" anchor="ctr"/>
-          <a:lstStyle/>
-          <a:p>
-            <a:pPr marL="0" marR="0" lvl="0" indent="0" algn="ctr" defTabSz="914400" rtl="0" eaLnBrk="1" fontAlgn="auto" latinLnBrk="0" hangingPunct="1">
-              <a:lnSpc>
-                <a:spcPct val="100000"/>
-              </a:lnSpc>
-              <a:spcBef>
-                <a:spcPts val="0"/>
-              </a:spcBef>
-              <a:spcAft>
-                <a:spcPts val="0"/>
-              </a:spcAft>
-              <a:buClrTx/>
-              <a:buSzTx/>
-              <a:buFontTx/>
-              <a:buNone/>
-              <a:tabLst/>
-              <a:defRPr/>
-            </a:pPr>
-            <a:endParaRPr kumimoji="0" lang="en-US" sz="1800" b="0" i="0" u="none" strike="noStrike" kern="1200" cap="none" spc="0" normalizeH="0" baseline="0" noProof="0">
-              <a:ln>
-                <a:noFill/>
-              </a:ln>
-              <a:solidFill>
-                <a:prstClr val="white"/>
-              </a:solidFill>
-              <a:effectLst/>
-              <a:uLnTx/>
-              <a:uFillTx/>
-              <a:latin typeface="Calibri" panose="020F0502020204030204"/>
-              <a:ea typeface="+mn-ea"/>
-              <a:cs typeface="+mn-cs"/>
-            </a:endParaRPr>
-          </a:p>
-        </p:txBody>
-      </p:sp>
-      <p:sp>
-        <p:nvSpPr>
-          <p:cNvPr id="10" name="Rectangle 9">
-            <a:extLst>
-              <a:ext uri="{FF2B5EF4-FFF2-40B4-BE49-F238E27FC236}">
-                <a16:creationId xmlns:a16="http://schemas.microsoft.com/office/drawing/2014/main" id="{79F3C543-62EC-4433-9C93-A2CD8764E9B4}"/>
-              </a:ext>
-              <a:ext uri="{C183D7F6-B498-43B3-948B-1728B52AA6E4}">
-                <adec:decorative xmlns:adec="http://schemas.microsoft.com/office/drawing/2017/decorative" val="1"/>
-              </a:ext>
-            </a:extLst>
-          </p:cNvPr>
-          <p:cNvSpPr>
-            <a:spLocks noGrp="1" noRot="1" noChangeAspect="1" noMove="1" noResize="1" noEditPoints="1" noAdjustHandles="1" noChangeArrowheads="1" noChangeShapeType="1" noTextEdit="1"/>
-          </p:cNvSpPr>
-          <p:nvPr>
-            <p:extLst>
-              <p:ext uri="{386F3935-93C4-4BCD-93E2-E3B085C9AB24}">
-                <p16:designElem xmlns:p16="http://schemas.microsoft.com/office/powerpoint/2015/main" val="1"/>
-              </p:ext>
-            </p:extLst>
-          </p:nvPr>
-        </p:nvSpPr>
-        <p:spPr>
-          <a:xfrm flipV="1">
-            <a:off x="578652" y="4501201"/>
-            <a:ext cx="11034696" cy="18288"/>
-          </a:xfrm>
-          <a:prstGeom prst="rect">
-            <a:avLst/>
-          </a:prstGeom>
-          <a:solidFill>
-            <a:schemeClr val="tx2">
-              <a:lumMod val="25000"/>
-              <a:lumOff val="75000"/>
-            </a:schemeClr>
-          </a:solidFill>
-          <a:ln w="3175">
-            <a:noFill/>
-          </a:ln>
-          <a:effectLst/>
-        </p:spPr>
-        <p:style>
-          <a:lnRef idx="2">
-            <a:schemeClr val="accent1">
-              <a:shade val="50000"/>
-            </a:schemeClr>
-          </a:lnRef>
-          <a:fillRef idx="1">
-            <a:schemeClr val="accent1"/>
-          </a:fillRef>
-          <a:effectRef idx="0">
-            <a:schemeClr val="accent1"/>
-          </a:effectRef>
-          <a:fontRef idx="minor">
-            <a:schemeClr val="lt1"/>
-          </a:fontRef>
-        </p:style>
-        <p:txBody>
-          <a:bodyPr rtlCol="0" anchor="ctr"/>
-          <a:lstStyle/>
-          <a:p>
-            <a:pPr marL="0" marR="0" lvl="0" indent="0" algn="ctr" defTabSz="914400" rtl="0" eaLnBrk="1" fontAlgn="auto" latinLnBrk="0" hangingPunct="1">
-              <a:lnSpc>
-                <a:spcPct val="100000"/>
-              </a:lnSpc>
-              <a:spcBef>
-                <a:spcPts val="0"/>
-              </a:spcBef>
-              <a:spcAft>
-                <a:spcPts val="0"/>
-              </a:spcAft>
-              <a:buClrTx/>
-              <a:buSzTx/>
-              <a:buFontTx/>
-              <a:buNone/>
-              <a:tabLst/>
-              <a:defRPr/>
-            </a:pPr>
-            <a:endParaRPr kumimoji="0" lang="en-US" sz="1800" b="0" i="0" u="none" strike="noStrike" kern="1200" cap="none" spc="0" normalizeH="0" baseline="0" noProof="0">
-              <a:ln>
-                <a:noFill/>
-              </a:ln>
-              <a:solidFill>
-                <a:prstClr val="white"/>
-              </a:solidFill>
-              <a:effectLst/>
-              <a:uLnTx/>
-              <a:uFillTx/>
-              <a:latin typeface="Calibri" panose="020F0502020204030204"/>
-              <a:ea typeface="+mn-ea"/>
-              <a:cs typeface="+mn-cs"/>
-            </a:endParaRPr>
-          </a:p>
-        </p:txBody>
-      </p:sp>
-      <p:sp useBgFill="1">
-        <p:nvSpPr>
-          <p:cNvPr id="12" name="Rectangle 11">
-            <a:extLst>
-              <a:ext uri="{FF2B5EF4-FFF2-40B4-BE49-F238E27FC236}">
-                <a16:creationId xmlns:a16="http://schemas.microsoft.com/office/drawing/2014/main" id="{1ACA2EA0-FFD3-42EC-9406-B595015ED96E}"/>
-              </a:ext>
-              <a:ext uri="{C183D7F6-B498-43B3-948B-1728B52AA6E4}">
-                <adec:decorative xmlns:adec="http://schemas.microsoft.com/office/drawing/2017/decorative" val="1"/>
-              </a:ext>
-            </a:extLst>
-          </p:cNvPr>
-          <p:cNvSpPr>
-            <a:spLocks noGrp="1" noRot="1" noChangeAspect="1" noMove="1" noResize="1" noEditPoints="1" noAdjustHandles="1" noChangeArrowheads="1" noChangeShapeType="1" noTextEdit="1"/>
-          </p:cNvSpPr>
-          <p:nvPr>
-            <p:extLst>
-              <p:ext uri="{386F3935-93C4-4BCD-93E2-E3B085C9AB24}">
-                <p16:designElem xmlns:p16="http://schemas.microsoft.com/office/powerpoint/2015/main" val="1"/>
-              </p:ext>
-            </p:extLst>
-          </p:nvPr>
-        </p:nvSpPr>
-        <p:spPr>
-          <a:xfrm>
-            <a:off x="0" y="0"/>
-            <a:ext cx="12192000" cy="6858000"/>
-          </a:xfrm>
-          <a:prstGeom prst="rect">
-            <a:avLst/>
-          </a:prstGeom>
-          <a:ln>
-            <a:noFill/>
-          </a:ln>
-        </p:spPr>
-        <p:style>
-          <a:lnRef idx="2">
-            <a:schemeClr val="accent1">
-              <a:shade val="50000"/>
-            </a:schemeClr>
-          </a:lnRef>
-          <a:fillRef idx="1">
-            <a:schemeClr val="accent1"/>
-          </a:fillRef>
-          <a:effectRef idx="0">
-            <a:schemeClr val="accent1"/>
-          </a:effectRef>
-          <a:fontRef idx="minor">
-            <a:schemeClr val="lt1"/>
-          </a:fontRef>
-        </p:style>
-        <p:txBody>
-          <a:bodyPr rtlCol="0" anchor="ctr"/>
-          <a:lstStyle/>
-          <a:p>
-            <a:pPr algn="ctr"/>
-            <a:endParaRPr lang="en-US"/>
-          </a:p>
-        </p:txBody>
-      </p:sp>
-      <p:sp useBgFill="1">
-        <p:nvSpPr>
-          <p:cNvPr id="14" name="Rectangle 13">
-            <a:extLst>
-              <a:ext uri="{FF2B5EF4-FFF2-40B4-BE49-F238E27FC236}">
-                <a16:creationId xmlns:a16="http://schemas.microsoft.com/office/drawing/2014/main" id="{D5288BCE-665C-472A-8C43-664BCFA31E43}"/>
-              </a:ext>
-              <a:ext uri="{C183D7F6-B498-43B3-948B-1728B52AA6E4}">
-                <adec:decorative xmlns:adec="http://schemas.microsoft.com/office/drawing/2017/decorative" val="1"/>
-              </a:ext>
-            </a:extLst>
-          </p:cNvPr>
-          <p:cNvSpPr>
-            <a:spLocks noGrp="1" noRot="1" noChangeAspect="1" noMove="1" noResize="1" noEditPoints="1" noAdjustHandles="1" noChangeArrowheads="1" noChangeShapeType="1" noTextEdit="1"/>
-          </p:cNvSpPr>
-          <p:nvPr>
-            <p:extLst>
-              <p:ext uri="{386F3935-93C4-4BCD-93E2-E3B085C9AB24}">
-                <p16:designElem xmlns:p16="http://schemas.microsoft.com/office/powerpoint/2015/main" val="1"/>
-              </p:ext>
-            </p:extLst>
-          </p:nvPr>
-        </p:nvSpPr>
-        <p:spPr>
-          <a:xfrm>
-            <a:off x="1528762" y="1247775"/>
-            <a:ext cx="9144000" cy="3007447"/>
-          </a:xfrm>
-          <a:prstGeom prst="rect">
-            <a:avLst/>
-          </a:prstGeom>
-          <a:ln w="12700">
-            <a:solidFill>
-              <a:schemeClr val="tx2">
-                <a:lumMod val="10000"/>
-                <a:lumOff val="90000"/>
-              </a:schemeClr>
-            </a:solidFill>
-          </a:ln>
-          <a:effectLst>
-            <a:outerShdw blurRad="50800" dist="38100" dir="2700000" algn="tl" rotWithShape="0">
-              <a:schemeClr val="bg2">
-                <a:lumMod val="85000"/>
-                <a:alpha val="30000"/>
-              </a:schemeClr>
-            </a:outerShdw>
-          </a:effectLst>
-        </p:spPr>
-        <p:style>
-          <a:lnRef idx="2">
-            <a:schemeClr val="accent1">
-              <a:shade val="50000"/>
-            </a:schemeClr>
-          </a:lnRef>
-          <a:fillRef idx="1">
-            <a:schemeClr val="accent1"/>
-          </a:fillRef>
-          <a:effectRef idx="0">
-            <a:schemeClr val="accent1"/>
-          </a:effectRef>
-          <a:fontRef idx="minor">
-            <a:schemeClr val="lt1"/>
-          </a:fontRef>
-        </p:style>
-        <p:txBody>
-          <a:bodyPr rtlCol="0" anchor="ctr"/>
-          <a:lstStyle/>
-          <a:p>
-            <a:pPr marL="0" marR="0" lvl="0" indent="0" algn="ctr" defTabSz="914400" rtl="0" eaLnBrk="1" fontAlgn="auto" latinLnBrk="0" hangingPunct="1">
-              <a:lnSpc>
-                <a:spcPct val="100000"/>
-              </a:lnSpc>
-              <a:spcBef>
-                <a:spcPts val="0"/>
-              </a:spcBef>
-              <a:spcAft>
-                <a:spcPts val="0"/>
-              </a:spcAft>
-              <a:buClrTx/>
-              <a:buSzTx/>
-              <a:buFontTx/>
-              <a:buNone/>
-              <a:tabLst/>
-              <a:defRPr/>
-            </a:pPr>
-            <a:endParaRPr kumimoji="0" lang="en-US" sz="1800" b="0" i="0" u="none" strike="noStrike" kern="1200" cap="none" spc="0" normalizeH="0" baseline="0" noProof="0">
-              <a:ln>
-                <a:noFill/>
-              </a:ln>
-              <a:solidFill>
-                <a:prstClr val="white"/>
-              </a:solidFill>
-              <a:effectLst/>
-              <a:uLnTx/>
-              <a:uFillTx/>
-              <a:latin typeface="Calibri" panose="020F0502020204030204"/>
-              <a:ea typeface="+mn-ea"/>
-              <a:cs typeface="+mn-cs"/>
-            </a:endParaRPr>
-          </a:p>
-        </p:txBody>
-      </p:sp>
-      <p:sp>
-        <p:nvSpPr>
-          <p:cNvPr id="2" name="Title 1">
-            <a:extLst>
-              <a:ext uri="{FF2B5EF4-FFF2-40B4-BE49-F238E27FC236}">
-                <a16:creationId xmlns:a16="http://schemas.microsoft.com/office/drawing/2014/main" id="{9261304E-6204-8E44-A343-DCFEABC60BBA}"/>
-              </a:ext>
-            </a:extLst>
-          </p:cNvPr>
-          <p:cNvSpPr>
-            <a:spLocks noGrp="1"/>
-          </p:cNvSpPr>
-          <p:nvPr>
-            <p:ph type="title"/>
-          </p:nvPr>
-        </p:nvSpPr>
-        <p:spPr>
-          <a:xfrm>
-            <a:off x="1804988" y="1442172"/>
-            <a:ext cx="8582025" cy="2177328"/>
-          </a:xfrm>
-        </p:spPr>
-        <p:txBody>
-          <a:bodyPr vert="horz" lIns="91440" tIns="45720" rIns="91440" bIns="45720" rtlCol="0" anchor="ctr">
-            <a:normAutofit/>
-          </a:bodyPr>
-          <a:lstStyle/>
-          <a:p>
-            <a:pPr algn="ctr"/>
-            <a:r>
-              <a:rPr lang="en-US" sz="7200" dirty="0"/>
-              <a:t>Final Conclusions</a:t>
-            </a:r>
-          </a:p>
-        </p:txBody>
-      </p:sp>
-      <p:sp>
-        <p:nvSpPr>
-          <p:cNvPr id="16" name="Rectangle: Rounded Corners 15">
-            <a:extLst>
-              <a:ext uri="{FF2B5EF4-FFF2-40B4-BE49-F238E27FC236}">
-                <a16:creationId xmlns:a16="http://schemas.microsoft.com/office/drawing/2014/main" id="{46C57131-53A7-4C1A-BEA8-25F06A06AD29}"/>
-              </a:ext>
-              <a:ext uri="{C183D7F6-B498-43B3-948B-1728B52AA6E4}">
-                <adec:decorative xmlns:adec="http://schemas.microsoft.com/office/drawing/2017/decorative" val="1"/>
-              </a:ext>
-            </a:extLst>
-          </p:cNvPr>
-          <p:cNvSpPr>
-            <a:spLocks noGrp="1" noRot="1" noChangeAspect="1" noMove="1" noResize="1" noEditPoints="1" noAdjustHandles="1" noChangeArrowheads="1" noChangeShapeType="1" noTextEdit="1"/>
-          </p:cNvSpPr>
-          <p:nvPr>
-            <p:extLst>
-              <p:ext uri="{386F3935-93C4-4BCD-93E2-E3B085C9AB24}">
-                <p16:designElem xmlns:p16="http://schemas.microsoft.com/office/powerpoint/2015/main" val="1"/>
-              </p:ext>
-            </p:extLst>
-          </p:nvPr>
-        </p:nvSpPr>
-        <p:spPr>
-          <a:xfrm>
-            <a:off x="2487872" y="3912322"/>
-            <a:ext cx="7225780" cy="685800"/>
-          </a:xfrm>
-          <a:prstGeom prst="roundRect">
-            <a:avLst>
-              <a:gd name="adj" fmla="val 0"/>
-            </a:avLst>
-          </a:prstGeom>
-          <a:solidFill>
-            <a:schemeClr val="accent1"/>
-          </a:solidFill>
-          <a:ln>
-            <a:noFill/>
-          </a:ln>
-        </p:spPr>
-        <p:style>
-          <a:lnRef idx="2">
-            <a:schemeClr val="accent1">
-              <a:shade val="50000"/>
-            </a:schemeClr>
-          </a:lnRef>
-          <a:fillRef idx="1">
-            <a:schemeClr val="accent1"/>
-          </a:fillRef>
-          <a:effectRef idx="0">
-            <a:schemeClr val="accent1"/>
-          </a:effectRef>
-          <a:fontRef idx="minor">
-            <a:schemeClr val="lt1"/>
-          </a:fontRef>
-        </p:style>
-        <p:txBody>
-          <a:bodyPr rtlCol="0" anchor="ctr"/>
-          <a:lstStyle/>
-          <a:p>
-            <a:pPr algn="ctr"/>
-            <a:endParaRPr lang="en-US"/>
-          </a:p>
-        </p:txBody>
-      </p:sp>
-    </p:spTree>
-    <p:extLst>
-      <p:ext uri="{BB962C8B-B14F-4D97-AF65-F5344CB8AC3E}">
-        <p14:creationId xmlns:p14="http://schemas.microsoft.com/office/powerpoint/2010/main" val="3197243115"/>
-      </p:ext>
-    </p:extLst>
-  </p:cSld>
-  <p:clrMapOvr>
-    <a:masterClrMapping/>
-  </p:clrMapOvr>
-</p:sld>
-</file>
-
-<file path=ppt/slides/slide2.xml><?xml version="1.0" encoding="utf-8"?>
-<p:sld xmlns:a="http://schemas.openxmlformats.org/drawingml/2006/main" xmlns:r="http://schemas.openxmlformats.org/officeDocument/2006/relationships" xmlns:p="http://schemas.openxmlformats.org/presentationml/2006/main">
-  <p:cSld>
-    <p:bg>
-      <p:bgPr>
-        <a:solidFill>
-          <a:schemeClr val="bg1"/>
-        </a:solidFill>
-        <a:effectLst/>
-      </p:bgPr>
-    </p:bg>
-    <p:spTree>
-      <p:nvGrpSpPr>
-        <p:cNvPr id="1" name=""/>
-        <p:cNvGrpSpPr/>
-        <p:nvPr/>
-      </p:nvGrpSpPr>
-      <p:grpSpPr>
-        <a:xfrm>
-          <a:off x="0" y="0"/>
-          <a:ext cx="0" cy="0"/>
-          <a:chOff x="0" y="0"/>
-          <a:chExt cx="0" cy="0"/>
-        </a:xfrm>
-      </p:grpSpPr>
-      <p:sp useBgFill="1">
-        <p:nvSpPr>
           <p:cNvPr id="8" name="Rectangle 7">
             <a:extLst>
               <a:ext uri="{FF2B5EF4-FFF2-40B4-BE49-F238E27FC236}">
@@ -7405,6 +6504,1538 @@
           <p:cNvPr id="2" name="Title 1">
             <a:extLst>
               <a:ext uri="{FF2B5EF4-FFF2-40B4-BE49-F238E27FC236}">
+                <a16:creationId xmlns:a16="http://schemas.microsoft.com/office/drawing/2014/main" id="{4A5844C9-823A-1243-A18D-3A1DCCB34217}"/>
+              </a:ext>
+            </a:extLst>
+          </p:cNvPr>
+          <p:cNvSpPr>
+            <a:spLocks noGrp="1"/>
+          </p:cNvSpPr>
+          <p:nvPr>
+            <p:ph type="title"/>
+          </p:nvPr>
+        </p:nvSpPr>
+        <p:spPr>
+          <a:xfrm>
+            <a:off x="621792" y="1161288"/>
+            <a:ext cx="3602736" cy="4526280"/>
+          </a:xfrm>
+        </p:spPr>
+        <p:txBody>
+          <a:bodyPr>
+            <a:normAutofit/>
+          </a:bodyPr>
+          <a:lstStyle/>
+          <a:p>
+            <a:r>
+              <a:rPr lang="en-US" dirty="0"/>
+              <a:t>Coding approach</a:t>
+            </a:r>
+          </a:p>
+        </p:txBody>
+      </p:sp>
+      <p:sp>
+        <p:nvSpPr>
+          <p:cNvPr id="14" name="Rectangle 13">
+            <a:extLst>
+              <a:ext uri="{FF2B5EF4-FFF2-40B4-BE49-F238E27FC236}">
+                <a16:creationId xmlns:a16="http://schemas.microsoft.com/office/drawing/2014/main" id="{463EEC44-1BA3-44ED-81FC-A644B04B2A44}"/>
+              </a:ext>
+              <a:ext uri="{C183D7F6-B498-43B3-948B-1728B52AA6E4}">
+                <adec:decorative xmlns:adec="http://schemas.microsoft.com/office/drawing/2017/decorative" val="1"/>
+              </a:ext>
+            </a:extLst>
+          </p:cNvPr>
+          <p:cNvSpPr>
+            <a:spLocks noGrp="1" noRot="1" noChangeAspect="1" noMove="1" noResize="1" noEditPoints="1" noAdjustHandles="1" noChangeArrowheads="1" noChangeShapeType="1" noTextEdit="1"/>
+          </p:cNvSpPr>
+          <p:nvPr>
+            <p:extLst>
+              <p:ext uri="{386F3935-93C4-4BCD-93E2-E3B085C9AB24}">
+                <p16:designElem xmlns:p16="http://schemas.microsoft.com/office/powerpoint/2015/main" val="1"/>
+              </p:ext>
+            </p:extLst>
+          </p:nvPr>
+        </p:nvSpPr>
+        <p:spPr>
+          <a:xfrm>
+            <a:off x="0" y="3102049"/>
+            <a:ext cx="128016" cy="653903"/>
+          </a:xfrm>
+          <a:prstGeom prst="rect">
+            <a:avLst/>
+          </a:prstGeom>
+          <a:solidFill>
+            <a:schemeClr val="accent1"/>
+          </a:solidFill>
+          <a:ln>
+            <a:noFill/>
+          </a:ln>
+        </p:spPr>
+        <p:style>
+          <a:lnRef idx="2">
+            <a:schemeClr val="accent1">
+              <a:shade val="50000"/>
+            </a:schemeClr>
+          </a:lnRef>
+          <a:fillRef idx="1">
+            <a:schemeClr val="accent1"/>
+          </a:fillRef>
+          <a:effectRef idx="0">
+            <a:schemeClr val="accent1"/>
+          </a:effectRef>
+          <a:fontRef idx="minor">
+            <a:schemeClr val="lt1"/>
+          </a:fontRef>
+        </p:style>
+        <p:txBody>
+          <a:bodyPr rtlCol="0" anchor="ctr"/>
+          <a:lstStyle/>
+          <a:p>
+            <a:pPr marL="0" marR="0" lvl="0" indent="0" algn="ctr" defTabSz="914400" rtl="0" eaLnBrk="1" fontAlgn="auto" latinLnBrk="0" hangingPunct="1">
+              <a:lnSpc>
+                <a:spcPct val="100000"/>
+              </a:lnSpc>
+              <a:spcBef>
+                <a:spcPts val="0"/>
+              </a:spcBef>
+              <a:spcAft>
+                <a:spcPts val="0"/>
+              </a:spcAft>
+              <a:buClrTx/>
+              <a:buSzTx/>
+              <a:buFontTx/>
+              <a:buNone/>
+              <a:tabLst/>
+              <a:defRPr/>
+            </a:pPr>
+            <a:endParaRPr kumimoji="0" lang="en-US" sz="1800" b="0" i="0" u="none" strike="noStrike" kern="1200" cap="none" spc="0" normalizeH="0" baseline="0" noProof="0">
+              <a:ln>
+                <a:noFill/>
+              </a:ln>
+              <a:solidFill>
+                <a:prstClr val="white"/>
+              </a:solidFill>
+              <a:effectLst/>
+              <a:uLnTx/>
+              <a:uFillTx/>
+              <a:latin typeface="Calibri" panose="020F0502020204030204"/>
+              <a:ea typeface="+mn-ea"/>
+              <a:cs typeface="+mn-cs"/>
+            </a:endParaRPr>
+          </a:p>
+        </p:txBody>
+      </p:sp>
+      <p:sp>
+        <p:nvSpPr>
+          <p:cNvPr id="3" name="Content Placeholder 2">
+            <a:extLst>
+              <a:ext uri="{FF2B5EF4-FFF2-40B4-BE49-F238E27FC236}">
+                <a16:creationId xmlns:a16="http://schemas.microsoft.com/office/drawing/2014/main" id="{AFE38C5A-EC19-AA4E-9914-6A72705A98A0}"/>
+              </a:ext>
+            </a:extLst>
+          </p:cNvPr>
+          <p:cNvSpPr>
+            <a:spLocks noGrp="1"/>
+          </p:cNvSpPr>
+          <p:nvPr>
+            <p:ph idx="1"/>
+          </p:nvPr>
+        </p:nvSpPr>
+        <p:spPr>
+          <a:xfrm>
+            <a:off x="5434149" y="932688"/>
+            <a:ext cx="5916603" cy="4992624"/>
+          </a:xfrm>
+        </p:spPr>
+        <p:txBody>
+          <a:bodyPr anchor="ctr">
+            <a:normAutofit/>
+          </a:bodyPr>
+          <a:lstStyle/>
+          <a:p>
+            <a:r>
+              <a:rPr lang="en-US" sz="2000" dirty="0"/>
+              <a:t>SQLite Database</a:t>
+            </a:r>
+          </a:p>
+          <a:p>
+            <a:r>
+              <a:rPr lang="en-US" sz="2000" dirty="0" err="1"/>
+              <a:t>Gmaps</a:t>
+            </a:r>
+            <a:endParaRPr lang="en-US" sz="2000" dirty="0"/>
+          </a:p>
+          <a:p>
+            <a:r>
+              <a:rPr lang="en-US" sz="2000" dirty="0"/>
+              <a:t>JavaScript word cloud </a:t>
+            </a:r>
+          </a:p>
+          <a:p>
+            <a:r>
+              <a:rPr lang="en-US" sz="2000" dirty="0"/>
+              <a:t>Flask app </a:t>
+            </a:r>
+          </a:p>
+          <a:p>
+            <a:r>
+              <a:rPr lang="en-US" sz="2000" dirty="0"/>
+              <a:t>Leaflet</a:t>
+            </a:r>
+          </a:p>
+          <a:p>
+            <a:r>
+              <a:rPr lang="en-US" sz="2000"/>
+              <a:t>Plotly</a:t>
+            </a:r>
+            <a:endParaRPr lang="en-US" sz="2000" dirty="0"/>
+          </a:p>
+        </p:txBody>
+      </p:sp>
+    </p:spTree>
+    <p:extLst>
+      <p:ext uri="{BB962C8B-B14F-4D97-AF65-F5344CB8AC3E}">
+        <p14:creationId xmlns:p14="http://schemas.microsoft.com/office/powerpoint/2010/main" val="1903028505"/>
+      </p:ext>
+    </p:extLst>
+  </p:cSld>
+  <p:clrMapOvr>
+    <a:masterClrMapping/>
+  </p:clrMapOvr>
+</p:sld>
+</file>
+
+<file path=ppt/slides/slide11.xml><?xml version="1.0" encoding="utf-8"?>
+<p:sld xmlns:a="http://schemas.openxmlformats.org/drawingml/2006/main" xmlns:r="http://schemas.openxmlformats.org/officeDocument/2006/relationships" xmlns:p="http://schemas.openxmlformats.org/presentationml/2006/main">
+  <p:cSld>
+    <p:bg>
+      <p:bgPr>
+        <a:solidFill>
+          <a:schemeClr val="bg1"/>
+        </a:solidFill>
+        <a:effectLst/>
+      </p:bgPr>
+    </p:bg>
+    <p:spTree>
+      <p:nvGrpSpPr>
+        <p:cNvPr id="1" name=""/>
+        <p:cNvGrpSpPr/>
+        <p:nvPr/>
+      </p:nvGrpSpPr>
+      <p:grpSpPr>
+        <a:xfrm>
+          <a:off x="0" y="0"/>
+          <a:ext cx="0" cy="0"/>
+          <a:chOff x="0" y="0"/>
+          <a:chExt cx="0" cy="0"/>
+        </a:xfrm>
+      </p:grpSpPr>
+      <p:sp useBgFill="1">
+        <p:nvSpPr>
+          <p:cNvPr id="21" name="Rectangle 20">
+            <a:extLst>
+              <a:ext uri="{FF2B5EF4-FFF2-40B4-BE49-F238E27FC236}">
+                <a16:creationId xmlns:a16="http://schemas.microsoft.com/office/drawing/2014/main" id="{0B9EE3F3-89B7-43C3-8651-C4C96830993D}"/>
+              </a:ext>
+              <a:ext uri="{C183D7F6-B498-43B3-948B-1728B52AA6E4}">
+                <adec:decorative xmlns:adec="http://schemas.microsoft.com/office/drawing/2017/decorative" val="1"/>
+              </a:ext>
+            </a:extLst>
+          </p:cNvPr>
+          <p:cNvSpPr>
+            <a:spLocks noGrp="1" noRot="1" noChangeAspect="1" noMove="1" noResize="1" noEditPoints="1" noAdjustHandles="1" noChangeArrowheads="1" noChangeShapeType="1" noTextEdit="1"/>
+          </p:cNvSpPr>
+          <p:nvPr>
+            <p:extLst>
+              <p:ext uri="{386F3935-93C4-4BCD-93E2-E3B085C9AB24}">
+                <p16:designElem xmlns:p16="http://schemas.microsoft.com/office/powerpoint/2015/main" val="1"/>
+              </p:ext>
+            </p:extLst>
+          </p:nvPr>
+        </p:nvSpPr>
+        <p:spPr>
+          <a:xfrm>
+            <a:off x="0" y="0"/>
+            <a:ext cx="12192000" cy="6858000"/>
+          </a:xfrm>
+          <a:prstGeom prst="rect">
+            <a:avLst/>
+          </a:prstGeom>
+          <a:ln>
+            <a:noFill/>
+          </a:ln>
+        </p:spPr>
+        <p:style>
+          <a:lnRef idx="2">
+            <a:schemeClr val="accent1">
+              <a:shade val="50000"/>
+            </a:schemeClr>
+          </a:lnRef>
+          <a:fillRef idx="1">
+            <a:schemeClr val="accent1"/>
+          </a:fillRef>
+          <a:effectRef idx="0">
+            <a:schemeClr val="accent1"/>
+          </a:effectRef>
+          <a:fontRef idx="minor">
+            <a:schemeClr val="lt1"/>
+          </a:fontRef>
+        </p:style>
+        <p:txBody>
+          <a:bodyPr rtlCol="0" anchor="ctr"/>
+          <a:lstStyle/>
+          <a:p>
+            <a:pPr algn="ctr"/>
+            <a:endParaRPr lang="en-US"/>
+          </a:p>
+        </p:txBody>
+      </p:sp>
+      <p:sp>
+        <p:nvSpPr>
+          <p:cNvPr id="2" name="Title 1">
+            <a:extLst>
+              <a:ext uri="{FF2B5EF4-FFF2-40B4-BE49-F238E27FC236}">
+                <a16:creationId xmlns:a16="http://schemas.microsoft.com/office/drawing/2014/main" id="{6CD7E464-D8AA-B140-9A1F-1DA8E7871E93}"/>
+              </a:ext>
+            </a:extLst>
+          </p:cNvPr>
+          <p:cNvSpPr>
+            <a:spLocks noGrp="1"/>
+          </p:cNvSpPr>
+          <p:nvPr>
+            <p:ph type="title"/>
+          </p:nvPr>
+        </p:nvSpPr>
+        <p:spPr>
+          <a:xfrm>
+            <a:off x="411480" y="991443"/>
+            <a:ext cx="4443154" cy="1087819"/>
+          </a:xfrm>
+        </p:spPr>
+        <p:txBody>
+          <a:bodyPr anchor="b">
+            <a:normAutofit/>
+          </a:bodyPr>
+          <a:lstStyle/>
+          <a:p>
+            <a:r>
+              <a:rPr lang="en-US" sz="3400"/>
+              <a:t>Issues we ran into</a:t>
+            </a:r>
+          </a:p>
+        </p:txBody>
+      </p:sp>
+      <p:sp>
+        <p:nvSpPr>
+          <p:cNvPr id="23" name="Rectangle 22">
+            <a:extLst>
+              <a:ext uri="{FF2B5EF4-FFF2-40B4-BE49-F238E27FC236}">
+                <a16:creationId xmlns:a16="http://schemas.microsoft.com/office/drawing/2014/main" id="{33AE4636-AEEC-45D6-84D4-7AC2DA48ECF8}"/>
+              </a:ext>
+              <a:ext uri="{C183D7F6-B498-43B3-948B-1728B52AA6E4}">
+                <adec:decorative xmlns:adec="http://schemas.microsoft.com/office/drawing/2017/decorative" val="1"/>
+              </a:ext>
+            </a:extLst>
+          </p:cNvPr>
+          <p:cNvSpPr>
+            <a:spLocks noGrp="1" noRot="1" noChangeAspect="1" noMove="1" noResize="1" noEditPoints="1" noAdjustHandles="1" noChangeArrowheads="1" noChangeShapeType="1" noTextEdit="1"/>
+          </p:cNvSpPr>
+          <p:nvPr>
+            <p:extLst>
+              <p:ext uri="{386F3935-93C4-4BCD-93E2-E3B085C9AB24}">
+                <p16:designElem xmlns:p16="http://schemas.microsoft.com/office/powerpoint/2015/main" val="1"/>
+              </p:ext>
+            </p:extLst>
+          </p:nvPr>
+        </p:nvSpPr>
+        <p:spPr>
+          <a:xfrm rot="5400000">
+            <a:off x="649223" y="387939"/>
+            <a:ext cx="73152" cy="548640"/>
+          </a:xfrm>
+          <a:prstGeom prst="rect">
+            <a:avLst/>
+          </a:prstGeom>
+          <a:solidFill>
+            <a:schemeClr val="accent1"/>
+          </a:solidFill>
+          <a:ln>
+            <a:noFill/>
+          </a:ln>
+        </p:spPr>
+        <p:style>
+          <a:lnRef idx="2">
+            <a:schemeClr val="accent1">
+              <a:shade val="50000"/>
+            </a:schemeClr>
+          </a:lnRef>
+          <a:fillRef idx="1">
+            <a:schemeClr val="accent1"/>
+          </a:fillRef>
+          <a:effectRef idx="0">
+            <a:schemeClr val="accent1"/>
+          </a:effectRef>
+          <a:fontRef idx="minor">
+            <a:schemeClr val="lt1"/>
+          </a:fontRef>
+        </p:style>
+        <p:txBody>
+          <a:bodyPr rtlCol="0" anchor="ctr"/>
+          <a:lstStyle/>
+          <a:p>
+            <a:pPr marL="0" marR="0" lvl="0" indent="0" algn="ctr" defTabSz="914400" rtl="0" eaLnBrk="1" fontAlgn="auto" latinLnBrk="0" hangingPunct="1">
+              <a:lnSpc>
+                <a:spcPct val="100000"/>
+              </a:lnSpc>
+              <a:spcBef>
+                <a:spcPts val="0"/>
+              </a:spcBef>
+              <a:spcAft>
+                <a:spcPts val="0"/>
+              </a:spcAft>
+              <a:buClrTx/>
+              <a:buSzTx/>
+              <a:buFontTx/>
+              <a:buNone/>
+              <a:tabLst/>
+              <a:defRPr/>
+            </a:pPr>
+            <a:endParaRPr kumimoji="0" lang="en-US" sz="1800" b="0" i="0" u="none" strike="noStrike" kern="1200" cap="none" spc="0" normalizeH="0" baseline="0" noProof="0">
+              <a:ln>
+                <a:noFill/>
+              </a:ln>
+              <a:solidFill>
+                <a:prstClr val="white"/>
+              </a:solidFill>
+              <a:effectLst/>
+              <a:uLnTx/>
+              <a:uFillTx/>
+              <a:latin typeface="Calibri" panose="020F0502020204030204"/>
+              <a:ea typeface="+mn-ea"/>
+              <a:cs typeface="+mn-cs"/>
+            </a:endParaRPr>
+          </a:p>
+        </p:txBody>
+      </p:sp>
+      <p:sp>
+        <p:nvSpPr>
+          <p:cNvPr id="25" name="Rectangle 24">
+            <a:extLst>
+              <a:ext uri="{FF2B5EF4-FFF2-40B4-BE49-F238E27FC236}">
+                <a16:creationId xmlns:a16="http://schemas.microsoft.com/office/drawing/2014/main" id="{8D9CE0F4-2EB2-4F1F-8AAC-DB3571D9FE10}"/>
+              </a:ext>
+              <a:ext uri="{C183D7F6-B498-43B3-948B-1728B52AA6E4}">
+                <adec:decorative xmlns:adec="http://schemas.microsoft.com/office/drawing/2017/decorative" val="1"/>
+              </a:ext>
+            </a:extLst>
+          </p:cNvPr>
+          <p:cNvSpPr>
+            <a:spLocks noGrp="1" noRot="1" noChangeAspect="1" noMove="1" noResize="1" noEditPoints="1" noAdjustHandles="1" noChangeArrowheads="1" noChangeShapeType="1" noTextEdit="1"/>
+          </p:cNvSpPr>
+          <p:nvPr>
+            <p:extLst>
+              <p:ext uri="{386F3935-93C4-4BCD-93E2-E3B085C9AB24}">
+                <p16:designElem xmlns:p16="http://schemas.microsoft.com/office/powerpoint/2015/main" val="1"/>
+              </p:ext>
+            </p:extLst>
+          </p:nvPr>
+        </p:nvSpPr>
+        <p:spPr>
+          <a:xfrm>
+            <a:off x="411480" y="2285541"/>
+            <a:ext cx="4389120" cy="18288"/>
+          </a:xfrm>
+          <a:prstGeom prst="rect">
+            <a:avLst/>
+          </a:prstGeom>
+          <a:solidFill>
+            <a:schemeClr val="tx2">
+              <a:lumMod val="25000"/>
+              <a:lumOff val="75000"/>
+            </a:schemeClr>
+          </a:solidFill>
+          <a:ln w="3175">
+            <a:noFill/>
+          </a:ln>
+          <a:effectLst/>
+        </p:spPr>
+        <p:style>
+          <a:lnRef idx="2">
+            <a:schemeClr val="accent1">
+              <a:shade val="50000"/>
+            </a:schemeClr>
+          </a:lnRef>
+          <a:fillRef idx="1">
+            <a:schemeClr val="accent1"/>
+          </a:fillRef>
+          <a:effectRef idx="0">
+            <a:schemeClr val="accent1"/>
+          </a:effectRef>
+          <a:fontRef idx="minor">
+            <a:schemeClr val="lt1"/>
+          </a:fontRef>
+        </p:style>
+        <p:txBody>
+          <a:bodyPr rtlCol="0" anchor="ctr"/>
+          <a:lstStyle/>
+          <a:p>
+            <a:pPr marL="0" marR="0" lvl="0" indent="0" algn="ctr" defTabSz="914400" rtl="0" eaLnBrk="1" fontAlgn="auto" latinLnBrk="0" hangingPunct="1">
+              <a:lnSpc>
+                <a:spcPct val="100000"/>
+              </a:lnSpc>
+              <a:spcBef>
+                <a:spcPts val="0"/>
+              </a:spcBef>
+              <a:spcAft>
+                <a:spcPts val="0"/>
+              </a:spcAft>
+              <a:buClrTx/>
+              <a:buSzTx/>
+              <a:buFontTx/>
+              <a:buNone/>
+              <a:tabLst/>
+              <a:defRPr/>
+            </a:pPr>
+            <a:endParaRPr kumimoji="0" lang="en-US" sz="1800" b="0" i="0" u="none" strike="noStrike" kern="1200" cap="none" spc="0" normalizeH="0" baseline="0" noProof="0">
+              <a:ln>
+                <a:noFill/>
+              </a:ln>
+              <a:solidFill>
+                <a:prstClr val="white"/>
+              </a:solidFill>
+              <a:effectLst/>
+              <a:uLnTx/>
+              <a:uFillTx/>
+              <a:latin typeface="Calibri" panose="020F0502020204030204"/>
+              <a:ea typeface="+mn-ea"/>
+              <a:cs typeface="+mn-cs"/>
+            </a:endParaRPr>
+          </a:p>
+        </p:txBody>
+      </p:sp>
+      <p:sp>
+        <p:nvSpPr>
+          <p:cNvPr id="3" name="Content Placeholder 2">
+            <a:extLst>
+              <a:ext uri="{FF2B5EF4-FFF2-40B4-BE49-F238E27FC236}">
+                <a16:creationId xmlns:a16="http://schemas.microsoft.com/office/drawing/2014/main" id="{C2AC20D3-1AFB-844B-8B1B-6B9C26B27666}"/>
+              </a:ext>
+            </a:extLst>
+          </p:cNvPr>
+          <p:cNvSpPr>
+            <a:spLocks noGrp="1"/>
+          </p:cNvSpPr>
+          <p:nvPr>
+            <p:ph idx="1"/>
+          </p:nvPr>
+        </p:nvSpPr>
+        <p:spPr>
+          <a:xfrm>
+            <a:off x="411480" y="2684095"/>
+            <a:ext cx="4443154" cy="3492868"/>
+          </a:xfrm>
+        </p:spPr>
+        <p:txBody>
+          <a:bodyPr>
+            <a:normAutofit/>
+          </a:bodyPr>
+          <a:lstStyle/>
+          <a:p>
+            <a:r>
+              <a:rPr lang="en-US" sz="1700" dirty="0"/>
+              <a:t>Data interpretation with the heatmap</a:t>
+            </a:r>
+          </a:p>
+          <a:p>
+            <a:r>
+              <a:rPr lang="en-US" sz="1700" dirty="0"/>
+              <a:t>Data sources </a:t>
+            </a:r>
+          </a:p>
+          <a:p>
+            <a:r>
+              <a:rPr lang="en-US" sz="1700" dirty="0"/>
+              <a:t>Converting zip codes to latitude and longitude </a:t>
+            </a:r>
+          </a:p>
+          <a:p>
+            <a:endParaRPr lang="en-US" sz="1700" dirty="0"/>
+          </a:p>
+          <a:p>
+            <a:endParaRPr lang="en-US" sz="1700" dirty="0"/>
+          </a:p>
+        </p:txBody>
+      </p:sp>
+      <p:pic>
+        <p:nvPicPr>
+          <p:cNvPr id="18" name="Graphic 17" descr="Statistics">
+            <a:extLst>
+              <a:ext uri="{FF2B5EF4-FFF2-40B4-BE49-F238E27FC236}">
+                <a16:creationId xmlns:a16="http://schemas.microsoft.com/office/drawing/2014/main" id="{DFB68B12-8ED3-4769-AEC6-47412BBD89D7}"/>
+              </a:ext>
+            </a:extLst>
+          </p:cNvPr>
+          <p:cNvPicPr>
+            <a:picLocks noChangeAspect="1"/>
+          </p:cNvPicPr>
+          <p:nvPr/>
+        </p:nvPicPr>
+        <p:blipFill>
+          <a:blip r:embed="rId3">
+            <a:extLst>
+              <a:ext uri="{28A0092B-C50C-407E-A947-70E740481C1C}">
+                <a14:useLocalDpi xmlns:a14="http://schemas.microsoft.com/office/drawing/2010/main" val="0"/>
+              </a:ext>
+              <a:ext uri="{96DAC541-7B7A-43D3-8B79-37D633B846F1}">
+                <asvg:svgBlip xmlns:asvg="http://schemas.microsoft.com/office/drawing/2016/SVG/main" r:embed="rId4"/>
+              </a:ext>
+            </a:extLst>
+          </a:blip>
+          <a:stretch>
+            <a:fillRect/>
+          </a:stretch>
+        </p:blipFill>
+        <p:spPr>
+          <a:xfrm>
+            <a:off x="5830388" y="625683"/>
+            <a:ext cx="5551280" cy="5551280"/>
+          </a:xfrm>
+          <a:prstGeom prst="rect">
+            <a:avLst/>
+          </a:prstGeom>
+        </p:spPr>
+      </p:pic>
+    </p:spTree>
+    <p:extLst>
+      <p:ext uri="{BB962C8B-B14F-4D97-AF65-F5344CB8AC3E}">
+        <p14:creationId xmlns:p14="http://schemas.microsoft.com/office/powerpoint/2010/main" val="1750294061"/>
+      </p:ext>
+    </p:extLst>
+  </p:cSld>
+  <p:clrMapOvr>
+    <a:masterClrMapping/>
+  </p:clrMapOvr>
+</p:sld>
+</file>
+
+<file path=ppt/slides/slide12.xml><?xml version="1.0" encoding="utf-8"?>
+<p:sld xmlns:a="http://schemas.openxmlformats.org/drawingml/2006/main" xmlns:r="http://schemas.openxmlformats.org/officeDocument/2006/relationships" xmlns:p="http://schemas.openxmlformats.org/presentationml/2006/main">
+  <p:cSld>
+    <p:bg>
+      <p:bgPr>
+        <a:solidFill>
+          <a:schemeClr val="bg1"/>
+        </a:solidFill>
+        <a:effectLst/>
+      </p:bgPr>
+    </p:bg>
+    <p:spTree>
+      <p:nvGrpSpPr>
+        <p:cNvPr id="1" name=""/>
+        <p:cNvGrpSpPr/>
+        <p:nvPr/>
+      </p:nvGrpSpPr>
+      <p:grpSpPr>
+        <a:xfrm>
+          <a:off x="0" y="0"/>
+          <a:ext cx="0" cy="0"/>
+          <a:chOff x="0" y="0"/>
+          <a:chExt cx="0" cy="0"/>
+        </a:xfrm>
+      </p:grpSpPr>
+      <p:sp>
+        <p:nvSpPr>
+          <p:cNvPr id="8" name="Rectangle 7">
+            <a:extLst>
+              <a:ext uri="{FF2B5EF4-FFF2-40B4-BE49-F238E27FC236}">
+                <a16:creationId xmlns:a16="http://schemas.microsoft.com/office/drawing/2014/main" id="{8D06CE56-3881-4ADA-8CEF-D18B02C242A3}"/>
+              </a:ext>
+              <a:ext uri="{C183D7F6-B498-43B3-948B-1728B52AA6E4}">
+                <adec:decorative xmlns:adec="http://schemas.microsoft.com/office/drawing/2017/decorative" val="1"/>
+              </a:ext>
+            </a:extLst>
+          </p:cNvPr>
+          <p:cNvSpPr>
+            <a:spLocks noGrp="1" noRot="1" noChangeAspect="1" noMove="1" noResize="1" noEditPoints="1" noAdjustHandles="1" noChangeArrowheads="1" noChangeShapeType="1" noTextEdit="1"/>
+          </p:cNvSpPr>
+          <p:nvPr>
+            <p:extLst>
+              <p:ext uri="{386F3935-93C4-4BCD-93E2-E3B085C9AB24}">
+                <p16:designElem xmlns:p16="http://schemas.microsoft.com/office/powerpoint/2015/main" val="1"/>
+              </p:ext>
+            </p:extLst>
+          </p:nvPr>
+        </p:nvSpPr>
+        <p:spPr>
+          <a:xfrm rot="5400000">
+            <a:off x="857544" y="346791"/>
+            <a:ext cx="146304" cy="704088"/>
+          </a:xfrm>
+          <a:prstGeom prst="rect">
+            <a:avLst/>
+          </a:prstGeom>
+          <a:solidFill>
+            <a:schemeClr val="accent1"/>
+          </a:solidFill>
+          <a:ln>
+            <a:noFill/>
+          </a:ln>
+        </p:spPr>
+        <p:style>
+          <a:lnRef idx="2">
+            <a:schemeClr val="accent1">
+              <a:shade val="50000"/>
+            </a:schemeClr>
+          </a:lnRef>
+          <a:fillRef idx="1">
+            <a:schemeClr val="accent1"/>
+          </a:fillRef>
+          <a:effectRef idx="0">
+            <a:schemeClr val="accent1"/>
+          </a:effectRef>
+          <a:fontRef idx="minor">
+            <a:schemeClr val="lt1"/>
+          </a:fontRef>
+        </p:style>
+        <p:txBody>
+          <a:bodyPr rtlCol="0" anchor="ctr"/>
+          <a:lstStyle/>
+          <a:p>
+            <a:pPr marL="0" marR="0" lvl="0" indent="0" algn="ctr" defTabSz="914400" rtl="0" eaLnBrk="1" fontAlgn="auto" latinLnBrk="0" hangingPunct="1">
+              <a:lnSpc>
+                <a:spcPct val="100000"/>
+              </a:lnSpc>
+              <a:spcBef>
+                <a:spcPts val="0"/>
+              </a:spcBef>
+              <a:spcAft>
+                <a:spcPts val="0"/>
+              </a:spcAft>
+              <a:buClrTx/>
+              <a:buSzTx/>
+              <a:buFontTx/>
+              <a:buNone/>
+              <a:tabLst/>
+              <a:defRPr/>
+            </a:pPr>
+            <a:endParaRPr kumimoji="0" lang="en-US" sz="1800" b="0" i="0" u="none" strike="noStrike" kern="1200" cap="none" spc="0" normalizeH="0" baseline="0" noProof="0">
+              <a:ln>
+                <a:noFill/>
+              </a:ln>
+              <a:solidFill>
+                <a:prstClr val="white"/>
+              </a:solidFill>
+              <a:effectLst/>
+              <a:uLnTx/>
+              <a:uFillTx/>
+              <a:latin typeface="Calibri" panose="020F0502020204030204"/>
+              <a:ea typeface="+mn-ea"/>
+              <a:cs typeface="+mn-cs"/>
+            </a:endParaRPr>
+          </a:p>
+        </p:txBody>
+      </p:sp>
+      <p:sp>
+        <p:nvSpPr>
+          <p:cNvPr id="10" name="Rectangle 9">
+            <a:extLst>
+              <a:ext uri="{FF2B5EF4-FFF2-40B4-BE49-F238E27FC236}">
+                <a16:creationId xmlns:a16="http://schemas.microsoft.com/office/drawing/2014/main" id="{79F3C543-62EC-4433-9C93-A2CD8764E9B4}"/>
+              </a:ext>
+              <a:ext uri="{C183D7F6-B498-43B3-948B-1728B52AA6E4}">
+                <adec:decorative xmlns:adec="http://schemas.microsoft.com/office/drawing/2017/decorative" val="1"/>
+              </a:ext>
+            </a:extLst>
+          </p:cNvPr>
+          <p:cNvSpPr>
+            <a:spLocks noGrp="1" noRot="1" noChangeAspect="1" noMove="1" noResize="1" noEditPoints="1" noAdjustHandles="1" noChangeArrowheads="1" noChangeShapeType="1" noTextEdit="1"/>
+          </p:cNvSpPr>
+          <p:nvPr>
+            <p:extLst>
+              <p:ext uri="{386F3935-93C4-4BCD-93E2-E3B085C9AB24}">
+                <p16:designElem xmlns:p16="http://schemas.microsoft.com/office/powerpoint/2015/main" val="1"/>
+              </p:ext>
+            </p:extLst>
+          </p:nvPr>
+        </p:nvSpPr>
+        <p:spPr>
+          <a:xfrm flipV="1">
+            <a:off x="578652" y="4501201"/>
+            <a:ext cx="11034696" cy="18288"/>
+          </a:xfrm>
+          <a:prstGeom prst="rect">
+            <a:avLst/>
+          </a:prstGeom>
+          <a:solidFill>
+            <a:schemeClr val="tx2">
+              <a:lumMod val="25000"/>
+              <a:lumOff val="75000"/>
+            </a:schemeClr>
+          </a:solidFill>
+          <a:ln w="3175">
+            <a:noFill/>
+          </a:ln>
+          <a:effectLst/>
+        </p:spPr>
+        <p:style>
+          <a:lnRef idx="2">
+            <a:schemeClr val="accent1">
+              <a:shade val="50000"/>
+            </a:schemeClr>
+          </a:lnRef>
+          <a:fillRef idx="1">
+            <a:schemeClr val="accent1"/>
+          </a:fillRef>
+          <a:effectRef idx="0">
+            <a:schemeClr val="accent1"/>
+          </a:effectRef>
+          <a:fontRef idx="minor">
+            <a:schemeClr val="lt1"/>
+          </a:fontRef>
+        </p:style>
+        <p:txBody>
+          <a:bodyPr rtlCol="0" anchor="ctr"/>
+          <a:lstStyle/>
+          <a:p>
+            <a:pPr marL="0" marR="0" lvl="0" indent="0" algn="ctr" defTabSz="914400" rtl="0" eaLnBrk="1" fontAlgn="auto" latinLnBrk="0" hangingPunct="1">
+              <a:lnSpc>
+                <a:spcPct val="100000"/>
+              </a:lnSpc>
+              <a:spcBef>
+                <a:spcPts val="0"/>
+              </a:spcBef>
+              <a:spcAft>
+                <a:spcPts val="0"/>
+              </a:spcAft>
+              <a:buClrTx/>
+              <a:buSzTx/>
+              <a:buFontTx/>
+              <a:buNone/>
+              <a:tabLst/>
+              <a:defRPr/>
+            </a:pPr>
+            <a:endParaRPr kumimoji="0" lang="en-US" sz="1800" b="0" i="0" u="none" strike="noStrike" kern="1200" cap="none" spc="0" normalizeH="0" baseline="0" noProof="0">
+              <a:ln>
+                <a:noFill/>
+              </a:ln>
+              <a:solidFill>
+                <a:prstClr val="white"/>
+              </a:solidFill>
+              <a:effectLst/>
+              <a:uLnTx/>
+              <a:uFillTx/>
+              <a:latin typeface="Calibri" panose="020F0502020204030204"/>
+              <a:ea typeface="+mn-ea"/>
+              <a:cs typeface="+mn-cs"/>
+            </a:endParaRPr>
+          </a:p>
+        </p:txBody>
+      </p:sp>
+      <p:sp useBgFill="1">
+        <p:nvSpPr>
+          <p:cNvPr id="12" name="Rectangle 11">
+            <a:extLst>
+              <a:ext uri="{FF2B5EF4-FFF2-40B4-BE49-F238E27FC236}">
+                <a16:creationId xmlns:a16="http://schemas.microsoft.com/office/drawing/2014/main" id="{1ACA2EA0-FFD3-42EC-9406-B595015ED96E}"/>
+              </a:ext>
+              <a:ext uri="{C183D7F6-B498-43B3-948B-1728B52AA6E4}">
+                <adec:decorative xmlns:adec="http://schemas.microsoft.com/office/drawing/2017/decorative" val="1"/>
+              </a:ext>
+            </a:extLst>
+          </p:cNvPr>
+          <p:cNvSpPr>
+            <a:spLocks noGrp="1" noRot="1" noChangeAspect="1" noMove="1" noResize="1" noEditPoints="1" noAdjustHandles="1" noChangeArrowheads="1" noChangeShapeType="1" noTextEdit="1"/>
+          </p:cNvSpPr>
+          <p:nvPr>
+            <p:extLst>
+              <p:ext uri="{386F3935-93C4-4BCD-93E2-E3B085C9AB24}">
+                <p16:designElem xmlns:p16="http://schemas.microsoft.com/office/powerpoint/2015/main" val="1"/>
+              </p:ext>
+            </p:extLst>
+          </p:nvPr>
+        </p:nvSpPr>
+        <p:spPr>
+          <a:xfrm>
+            <a:off x="0" y="0"/>
+            <a:ext cx="12192000" cy="6858000"/>
+          </a:xfrm>
+          <a:prstGeom prst="rect">
+            <a:avLst/>
+          </a:prstGeom>
+          <a:ln>
+            <a:noFill/>
+          </a:ln>
+        </p:spPr>
+        <p:style>
+          <a:lnRef idx="2">
+            <a:schemeClr val="accent1">
+              <a:shade val="50000"/>
+            </a:schemeClr>
+          </a:lnRef>
+          <a:fillRef idx="1">
+            <a:schemeClr val="accent1"/>
+          </a:fillRef>
+          <a:effectRef idx="0">
+            <a:schemeClr val="accent1"/>
+          </a:effectRef>
+          <a:fontRef idx="minor">
+            <a:schemeClr val="lt1"/>
+          </a:fontRef>
+        </p:style>
+        <p:txBody>
+          <a:bodyPr rtlCol="0" anchor="ctr"/>
+          <a:lstStyle/>
+          <a:p>
+            <a:pPr algn="ctr"/>
+            <a:endParaRPr lang="en-US"/>
+          </a:p>
+        </p:txBody>
+      </p:sp>
+      <p:sp useBgFill="1">
+        <p:nvSpPr>
+          <p:cNvPr id="14" name="Rectangle 13">
+            <a:extLst>
+              <a:ext uri="{FF2B5EF4-FFF2-40B4-BE49-F238E27FC236}">
+                <a16:creationId xmlns:a16="http://schemas.microsoft.com/office/drawing/2014/main" id="{D5288BCE-665C-472A-8C43-664BCFA31E43}"/>
+              </a:ext>
+              <a:ext uri="{C183D7F6-B498-43B3-948B-1728B52AA6E4}">
+                <adec:decorative xmlns:adec="http://schemas.microsoft.com/office/drawing/2017/decorative" val="1"/>
+              </a:ext>
+            </a:extLst>
+          </p:cNvPr>
+          <p:cNvSpPr>
+            <a:spLocks noGrp="1" noRot="1" noChangeAspect="1" noMove="1" noResize="1" noEditPoints="1" noAdjustHandles="1" noChangeArrowheads="1" noChangeShapeType="1" noTextEdit="1"/>
+          </p:cNvSpPr>
+          <p:nvPr>
+            <p:extLst>
+              <p:ext uri="{386F3935-93C4-4BCD-93E2-E3B085C9AB24}">
+                <p16:designElem xmlns:p16="http://schemas.microsoft.com/office/powerpoint/2015/main" val="1"/>
+              </p:ext>
+            </p:extLst>
+          </p:nvPr>
+        </p:nvSpPr>
+        <p:spPr>
+          <a:xfrm>
+            <a:off x="1528762" y="1247775"/>
+            <a:ext cx="9144000" cy="3007447"/>
+          </a:xfrm>
+          <a:prstGeom prst="rect">
+            <a:avLst/>
+          </a:prstGeom>
+          <a:ln w="12700">
+            <a:solidFill>
+              <a:schemeClr val="tx2">
+                <a:lumMod val="10000"/>
+                <a:lumOff val="90000"/>
+              </a:schemeClr>
+            </a:solidFill>
+          </a:ln>
+          <a:effectLst>
+            <a:outerShdw blurRad="50800" dist="38100" dir="2700000" algn="tl" rotWithShape="0">
+              <a:schemeClr val="bg2">
+                <a:lumMod val="85000"/>
+                <a:alpha val="30000"/>
+              </a:schemeClr>
+            </a:outerShdw>
+          </a:effectLst>
+        </p:spPr>
+        <p:style>
+          <a:lnRef idx="2">
+            <a:schemeClr val="accent1">
+              <a:shade val="50000"/>
+            </a:schemeClr>
+          </a:lnRef>
+          <a:fillRef idx="1">
+            <a:schemeClr val="accent1"/>
+          </a:fillRef>
+          <a:effectRef idx="0">
+            <a:schemeClr val="accent1"/>
+          </a:effectRef>
+          <a:fontRef idx="minor">
+            <a:schemeClr val="lt1"/>
+          </a:fontRef>
+        </p:style>
+        <p:txBody>
+          <a:bodyPr rtlCol="0" anchor="ctr"/>
+          <a:lstStyle/>
+          <a:p>
+            <a:pPr marL="0" marR="0" lvl="0" indent="0" algn="ctr" defTabSz="914400" rtl="0" eaLnBrk="1" fontAlgn="auto" latinLnBrk="0" hangingPunct="1">
+              <a:lnSpc>
+                <a:spcPct val="100000"/>
+              </a:lnSpc>
+              <a:spcBef>
+                <a:spcPts val="0"/>
+              </a:spcBef>
+              <a:spcAft>
+                <a:spcPts val="0"/>
+              </a:spcAft>
+              <a:buClrTx/>
+              <a:buSzTx/>
+              <a:buFontTx/>
+              <a:buNone/>
+              <a:tabLst/>
+              <a:defRPr/>
+            </a:pPr>
+            <a:endParaRPr kumimoji="0" lang="en-US" sz="1800" b="0" i="0" u="none" strike="noStrike" kern="1200" cap="none" spc="0" normalizeH="0" baseline="0" noProof="0">
+              <a:ln>
+                <a:noFill/>
+              </a:ln>
+              <a:solidFill>
+                <a:prstClr val="white"/>
+              </a:solidFill>
+              <a:effectLst/>
+              <a:uLnTx/>
+              <a:uFillTx/>
+              <a:latin typeface="Calibri" panose="020F0502020204030204"/>
+              <a:ea typeface="+mn-ea"/>
+              <a:cs typeface="+mn-cs"/>
+            </a:endParaRPr>
+          </a:p>
+        </p:txBody>
+      </p:sp>
+      <p:sp>
+        <p:nvSpPr>
+          <p:cNvPr id="2" name="Title 1">
+            <a:extLst>
+              <a:ext uri="{FF2B5EF4-FFF2-40B4-BE49-F238E27FC236}">
+                <a16:creationId xmlns:a16="http://schemas.microsoft.com/office/drawing/2014/main" id="{9261304E-6204-8E44-A343-DCFEABC60BBA}"/>
+              </a:ext>
+            </a:extLst>
+          </p:cNvPr>
+          <p:cNvSpPr>
+            <a:spLocks noGrp="1"/>
+          </p:cNvSpPr>
+          <p:nvPr>
+            <p:ph type="title"/>
+          </p:nvPr>
+        </p:nvSpPr>
+        <p:spPr>
+          <a:xfrm>
+            <a:off x="1804988" y="1442172"/>
+            <a:ext cx="8582025" cy="2177328"/>
+          </a:xfrm>
+        </p:spPr>
+        <p:txBody>
+          <a:bodyPr vert="horz" lIns="91440" tIns="45720" rIns="91440" bIns="45720" rtlCol="0" anchor="ctr">
+            <a:normAutofit/>
+          </a:bodyPr>
+          <a:lstStyle/>
+          <a:p>
+            <a:pPr algn="ctr"/>
+            <a:r>
+              <a:rPr lang="en-US" sz="7200" dirty="0"/>
+              <a:t>Final Conclusions</a:t>
+            </a:r>
+          </a:p>
+        </p:txBody>
+      </p:sp>
+      <p:sp>
+        <p:nvSpPr>
+          <p:cNvPr id="16" name="Rectangle: Rounded Corners 15">
+            <a:extLst>
+              <a:ext uri="{FF2B5EF4-FFF2-40B4-BE49-F238E27FC236}">
+                <a16:creationId xmlns:a16="http://schemas.microsoft.com/office/drawing/2014/main" id="{46C57131-53A7-4C1A-BEA8-25F06A06AD29}"/>
+              </a:ext>
+              <a:ext uri="{C183D7F6-B498-43B3-948B-1728B52AA6E4}">
+                <adec:decorative xmlns:adec="http://schemas.microsoft.com/office/drawing/2017/decorative" val="1"/>
+              </a:ext>
+            </a:extLst>
+          </p:cNvPr>
+          <p:cNvSpPr>
+            <a:spLocks noGrp="1" noRot="1" noChangeAspect="1" noMove="1" noResize="1" noEditPoints="1" noAdjustHandles="1" noChangeArrowheads="1" noChangeShapeType="1" noTextEdit="1"/>
+          </p:cNvSpPr>
+          <p:nvPr>
+            <p:extLst>
+              <p:ext uri="{386F3935-93C4-4BCD-93E2-E3B085C9AB24}">
+                <p16:designElem xmlns:p16="http://schemas.microsoft.com/office/powerpoint/2015/main" val="1"/>
+              </p:ext>
+            </p:extLst>
+          </p:nvPr>
+        </p:nvSpPr>
+        <p:spPr>
+          <a:xfrm>
+            <a:off x="2487872" y="3912322"/>
+            <a:ext cx="7225780" cy="685800"/>
+          </a:xfrm>
+          <a:prstGeom prst="roundRect">
+            <a:avLst>
+              <a:gd name="adj" fmla="val 0"/>
+            </a:avLst>
+          </a:prstGeom>
+          <a:solidFill>
+            <a:schemeClr val="accent1"/>
+          </a:solidFill>
+          <a:ln>
+            <a:noFill/>
+          </a:ln>
+        </p:spPr>
+        <p:style>
+          <a:lnRef idx="2">
+            <a:schemeClr val="accent1">
+              <a:shade val="50000"/>
+            </a:schemeClr>
+          </a:lnRef>
+          <a:fillRef idx="1">
+            <a:schemeClr val="accent1"/>
+          </a:fillRef>
+          <a:effectRef idx="0">
+            <a:schemeClr val="accent1"/>
+          </a:effectRef>
+          <a:fontRef idx="minor">
+            <a:schemeClr val="lt1"/>
+          </a:fontRef>
+        </p:style>
+        <p:txBody>
+          <a:bodyPr rtlCol="0" anchor="ctr"/>
+          <a:lstStyle/>
+          <a:p>
+            <a:pPr algn="ctr"/>
+            <a:endParaRPr lang="en-US"/>
+          </a:p>
+        </p:txBody>
+      </p:sp>
+    </p:spTree>
+    <p:extLst>
+      <p:ext uri="{BB962C8B-B14F-4D97-AF65-F5344CB8AC3E}">
+        <p14:creationId xmlns:p14="http://schemas.microsoft.com/office/powerpoint/2010/main" val="3197243115"/>
+      </p:ext>
+    </p:extLst>
+  </p:cSld>
+  <p:clrMapOvr>
+    <a:masterClrMapping/>
+  </p:clrMapOvr>
+</p:sld>
+</file>
+
+<file path=ppt/slides/slide2.xml><?xml version="1.0" encoding="utf-8"?>
+<p:sld xmlns:a="http://schemas.openxmlformats.org/drawingml/2006/main" xmlns:r="http://schemas.openxmlformats.org/officeDocument/2006/relationships" xmlns:p="http://schemas.openxmlformats.org/presentationml/2006/main">
+  <p:cSld>
+    <p:bg>
+      <p:bgPr>
+        <a:solidFill>
+          <a:schemeClr val="bg1"/>
+        </a:solidFill>
+        <a:effectLst/>
+      </p:bgPr>
+    </p:bg>
+    <p:spTree>
+      <p:nvGrpSpPr>
+        <p:cNvPr id="1" name=""/>
+        <p:cNvGrpSpPr/>
+        <p:nvPr/>
+      </p:nvGrpSpPr>
+      <p:grpSpPr>
+        <a:xfrm>
+          <a:off x="0" y="0"/>
+          <a:ext cx="0" cy="0"/>
+          <a:chOff x="0" y="0"/>
+          <a:chExt cx="0" cy="0"/>
+        </a:xfrm>
+      </p:grpSpPr>
+      <p:sp useBgFill="1">
+        <p:nvSpPr>
+          <p:cNvPr id="8" name="Rectangle 7">
+            <a:extLst>
+              <a:ext uri="{FF2B5EF4-FFF2-40B4-BE49-F238E27FC236}">
+                <a16:creationId xmlns:a16="http://schemas.microsoft.com/office/drawing/2014/main" id="{1C799903-48D5-4A31-A1A2-541072D9771E}"/>
+              </a:ext>
+              <a:ext uri="{C183D7F6-B498-43B3-948B-1728B52AA6E4}">
+                <adec:decorative xmlns:adec="http://schemas.microsoft.com/office/drawing/2017/decorative" val="1"/>
+              </a:ext>
+            </a:extLst>
+          </p:cNvPr>
+          <p:cNvSpPr>
+            <a:spLocks noGrp="1" noRot="1" noChangeAspect="1" noMove="1" noResize="1" noEditPoints="1" noAdjustHandles="1" noChangeArrowheads="1" noChangeShapeType="1" noTextEdit="1"/>
+          </p:cNvSpPr>
+          <p:nvPr>
+            <p:extLst>
+              <p:ext uri="{386F3935-93C4-4BCD-93E2-E3B085C9AB24}">
+                <p16:designElem xmlns:p16="http://schemas.microsoft.com/office/powerpoint/2015/main" val="1"/>
+              </p:ext>
+            </p:extLst>
+          </p:nvPr>
+        </p:nvSpPr>
+        <p:spPr>
+          <a:xfrm>
+            <a:off x="0" y="0"/>
+            <a:ext cx="12192002" cy="6858000"/>
+          </a:xfrm>
+          <a:prstGeom prst="rect">
+            <a:avLst/>
+          </a:prstGeom>
+          <a:ln>
+            <a:noFill/>
+          </a:ln>
+        </p:spPr>
+        <p:style>
+          <a:lnRef idx="2">
+            <a:schemeClr val="accent1">
+              <a:shade val="50000"/>
+            </a:schemeClr>
+          </a:lnRef>
+          <a:fillRef idx="1">
+            <a:schemeClr val="accent1"/>
+          </a:fillRef>
+          <a:effectRef idx="0">
+            <a:schemeClr val="accent1"/>
+          </a:effectRef>
+          <a:fontRef idx="minor">
+            <a:schemeClr val="lt1"/>
+          </a:fontRef>
+        </p:style>
+        <p:txBody>
+          <a:bodyPr rtlCol="0" anchor="ctr"/>
+          <a:lstStyle/>
+          <a:p>
+            <a:pPr algn="ctr"/>
+            <a:endParaRPr lang="en-US"/>
+          </a:p>
+        </p:txBody>
+      </p:sp>
+      <p:sp useBgFill="1">
+        <p:nvSpPr>
+          <p:cNvPr id="10" name="Freeform: Shape 9">
+            <a:extLst>
+              <a:ext uri="{FF2B5EF4-FFF2-40B4-BE49-F238E27FC236}">
+                <a16:creationId xmlns:a16="http://schemas.microsoft.com/office/drawing/2014/main" id="{8EFFF109-FC58-4FD3-BE05-9775A1310F55}"/>
+              </a:ext>
+              <a:ext uri="{C183D7F6-B498-43B3-948B-1728B52AA6E4}">
+                <adec:decorative xmlns:adec="http://schemas.microsoft.com/office/drawing/2017/decorative" val="1"/>
+              </a:ext>
+            </a:extLst>
+          </p:cNvPr>
+          <p:cNvSpPr>
+            <a:spLocks noGrp="1" noRot="1" noChangeAspect="1" noMove="1" noResize="1" noEditPoints="1" noAdjustHandles="1" noChangeArrowheads="1" noChangeShapeType="1" noTextEdit="1"/>
+          </p:cNvSpPr>
+          <p:nvPr>
+            <p:extLst>
+              <p:ext uri="{386F3935-93C4-4BCD-93E2-E3B085C9AB24}">
+                <p16:designElem xmlns:p16="http://schemas.microsoft.com/office/powerpoint/2015/main" val="1"/>
+              </p:ext>
+            </p:extLst>
+          </p:nvPr>
+        </p:nvSpPr>
+        <p:spPr>
+          <a:xfrm>
+            <a:off x="-1" y="0"/>
+            <a:ext cx="4818889" cy="6858000"/>
+          </a:xfrm>
+          <a:custGeom>
+            <a:avLst/>
+            <a:gdLst>
+              <a:gd name="connsiteX0" fmla="*/ 0 w 4818889"/>
+              <a:gd name="connsiteY0" fmla="*/ 0 h 6858000"/>
+              <a:gd name="connsiteX1" fmla="*/ 3605911 w 4818889"/>
+              <a:gd name="connsiteY1" fmla="*/ 0 h 6858000"/>
+              <a:gd name="connsiteX2" fmla="*/ 3668894 w 4818889"/>
+              <a:gd name="connsiteY2" fmla="*/ 69271 h 6858000"/>
+              <a:gd name="connsiteX3" fmla="*/ 4818889 w 4818889"/>
+              <a:gd name="connsiteY3" fmla="*/ 3429000 h 6858000"/>
+              <a:gd name="connsiteX4" fmla="*/ 3668894 w 4818889"/>
+              <a:gd name="connsiteY4" fmla="*/ 6788730 h 6858000"/>
+              <a:gd name="connsiteX5" fmla="*/ 3605911 w 4818889"/>
+              <a:gd name="connsiteY5" fmla="*/ 6858000 h 6858000"/>
+              <a:gd name="connsiteX6" fmla="*/ 0 w 4818889"/>
+              <a:gd name="connsiteY6" fmla="*/ 6858000 h 6858000"/>
+            </a:gdLst>
+            <a:ahLst/>
+            <a:cxnLst>
+              <a:cxn ang="0">
+                <a:pos x="connsiteX0" y="connsiteY0"/>
+              </a:cxn>
+              <a:cxn ang="0">
+                <a:pos x="connsiteX1" y="connsiteY1"/>
+              </a:cxn>
+              <a:cxn ang="0">
+                <a:pos x="connsiteX2" y="connsiteY2"/>
+              </a:cxn>
+              <a:cxn ang="0">
+                <a:pos x="connsiteX3" y="connsiteY3"/>
+              </a:cxn>
+              <a:cxn ang="0">
+                <a:pos x="connsiteX4" y="connsiteY4"/>
+              </a:cxn>
+              <a:cxn ang="0">
+                <a:pos x="connsiteX5" y="connsiteY5"/>
+              </a:cxn>
+              <a:cxn ang="0">
+                <a:pos x="connsiteX6" y="connsiteY6"/>
+              </a:cxn>
+            </a:cxnLst>
+            <a:rect l="l" t="t" r="r" b="b"/>
+            <a:pathLst>
+              <a:path w="4818889" h="6858000">
+                <a:moveTo>
+                  <a:pt x="0" y="0"/>
+                </a:moveTo>
+                <a:lnTo>
+                  <a:pt x="3605911" y="0"/>
+                </a:lnTo>
+                <a:lnTo>
+                  <a:pt x="3668894" y="69271"/>
+                </a:lnTo>
+                <a:cubicBezTo>
+                  <a:pt x="4379420" y="929100"/>
+                  <a:pt x="4818889" y="2116944"/>
+                  <a:pt x="4818889" y="3429000"/>
+                </a:cubicBezTo>
+                <a:cubicBezTo>
+                  <a:pt x="4818889" y="4741056"/>
+                  <a:pt x="4379420" y="5928900"/>
+                  <a:pt x="3668894" y="6788730"/>
+                </a:cubicBezTo>
+                <a:lnTo>
+                  <a:pt x="3605911" y="6858000"/>
+                </a:lnTo>
+                <a:lnTo>
+                  <a:pt x="0" y="6858000"/>
+                </a:lnTo>
+                <a:close/>
+              </a:path>
+            </a:pathLst>
+          </a:custGeom>
+          <a:ln w="9525">
+            <a:solidFill>
+              <a:schemeClr val="tx2">
+                <a:lumMod val="10000"/>
+                <a:lumOff val="90000"/>
+              </a:schemeClr>
+            </a:solidFill>
+          </a:ln>
+          <a:effectLst>
+            <a:outerShdw blurRad="50800" dist="38100" algn="l" rotWithShape="0">
+              <a:schemeClr val="bg1">
+                <a:lumMod val="85000"/>
+                <a:alpha val="30000"/>
+              </a:schemeClr>
+            </a:outerShdw>
+          </a:effectLst>
+        </p:spPr>
+        <p:style>
+          <a:lnRef idx="2">
+            <a:schemeClr val="accent1">
+              <a:shade val="50000"/>
+            </a:schemeClr>
+          </a:lnRef>
+          <a:fillRef idx="1">
+            <a:schemeClr val="accent1"/>
+          </a:fillRef>
+          <a:effectRef idx="0">
+            <a:schemeClr val="accent1"/>
+          </a:effectRef>
+          <a:fontRef idx="minor">
+            <a:schemeClr val="lt1"/>
+          </a:fontRef>
+        </p:style>
+        <p:txBody>
+          <a:bodyPr wrap="square" rtlCol="0" anchor="ctr">
+            <a:noAutofit/>
+          </a:bodyPr>
+          <a:lstStyle/>
+          <a:p>
+            <a:pPr marL="0" marR="0" lvl="0" indent="0" algn="ctr" defTabSz="914400" rtl="0" eaLnBrk="1" fontAlgn="auto" latinLnBrk="0" hangingPunct="1">
+              <a:lnSpc>
+                <a:spcPct val="100000"/>
+              </a:lnSpc>
+              <a:spcBef>
+                <a:spcPts val="0"/>
+              </a:spcBef>
+              <a:spcAft>
+                <a:spcPts val="0"/>
+              </a:spcAft>
+              <a:buClrTx/>
+              <a:buSzTx/>
+              <a:buFontTx/>
+              <a:buNone/>
+              <a:tabLst/>
+              <a:defRPr/>
+            </a:pPr>
+            <a:endParaRPr kumimoji="0" lang="en-US" sz="1800" b="0" i="0" u="none" strike="noStrike" kern="1200" cap="none" spc="0" normalizeH="0" baseline="0" noProof="0">
+              <a:ln>
+                <a:noFill/>
+              </a:ln>
+              <a:solidFill>
+                <a:prstClr val="white"/>
+              </a:solidFill>
+              <a:effectLst/>
+              <a:uLnTx/>
+              <a:uFillTx/>
+              <a:latin typeface="Calibri" panose="020F0502020204030204"/>
+              <a:ea typeface="+mn-ea"/>
+              <a:cs typeface="+mn-cs"/>
+            </a:endParaRPr>
+          </a:p>
+        </p:txBody>
+      </p:sp>
+      <p:sp useBgFill="1">
+        <p:nvSpPr>
+          <p:cNvPr id="12" name="Freeform: Shape 11">
+            <a:extLst>
+              <a:ext uri="{FF2B5EF4-FFF2-40B4-BE49-F238E27FC236}">
+                <a16:creationId xmlns:a16="http://schemas.microsoft.com/office/drawing/2014/main" id="{E1B96AD6-92A9-4273-A62B-96A1C3E0BA95}"/>
+              </a:ext>
+              <a:ext uri="{C183D7F6-B498-43B3-948B-1728B52AA6E4}">
+                <adec:decorative xmlns:adec="http://schemas.microsoft.com/office/drawing/2017/decorative" val="1"/>
+              </a:ext>
+            </a:extLst>
+          </p:cNvPr>
+          <p:cNvSpPr>
+            <a:spLocks noGrp="1" noRot="1" noChangeAspect="1" noMove="1" noResize="1" noEditPoints="1" noAdjustHandles="1" noChangeArrowheads="1" noChangeShapeType="1" noTextEdit="1"/>
+          </p:cNvSpPr>
+          <p:nvPr>
+            <p:extLst>
+              <p:ext uri="{386F3935-93C4-4BCD-93E2-E3B085C9AB24}">
+                <p16:designElem xmlns:p16="http://schemas.microsoft.com/office/powerpoint/2015/main" val="1"/>
+              </p:ext>
+            </p:extLst>
+          </p:nvPr>
+        </p:nvSpPr>
+        <p:spPr>
+          <a:xfrm>
+            <a:off x="1" y="0"/>
+            <a:ext cx="4811477" cy="6858000"/>
+          </a:xfrm>
+          <a:custGeom>
+            <a:avLst/>
+            <a:gdLst>
+              <a:gd name="connsiteX0" fmla="*/ 0 w 4811477"/>
+              <a:gd name="connsiteY0" fmla="*/ 0 h 6858000"/>
+              <a:gd name="connsiteX1" fmla="*/ 3598499 w 4811477"/>
+              <a:gd name="connsiteY1" fmla="*/ 0 h 6858000"/>
+              <a:gd name="connsiteX2" fmla="*/ 3661482 w 4811477"/>
+              <a:gd name="connsiteY2" fmla="*/ 69271 h 6858000"/>
+              <a:gd name="connsiteX3" fmla="*/ 4811477 w 4811477"/>
+              <a:gd name="connsiteY3" fmla="*/ 3429000 h 6858000"/>
+              <a:gd name="connsiteX4" fmla="*/ 3661482 w 4811477"/>
+              <a:gd name="connsiteY4" fmla="*/ 6788730 h 6858000"/>
+              <a:gd name="connsiteX5" fmla="*/ 3598499 w 4811477"/>
+              <a:gd name="connsiteY5" fmla="*/ 6858000 h 6858000"/>
+              <a:gd name="connsiteX6" fmla="*/ 0 w 4811477"/>
+              <a:gd name="connsiteY6" fmla="*/ 6858000 h 6858000"/>
+            </a:gdLst>
+            <a:ahLst/>
+            <a:cxnLst>
+              <a:cxn ang="0">
+                <a:pos x="connsiteX0" y="connsiteY0"/>
+              </a:cxn>
+              <a:cxn ang="0">
+                <a:pos x="connsiteX1" y="connsiteY1"/>
+              </a:cxn>
+              <a:cxn ang="0">
+                <a:pos x="connsiteX2" y="connsiteY2"/>
+              </a:cxn>
+              <a:cxn ang="0">
+                <a:pos x="connsiteX3" y="connsiteY3"/>
+              </a:cxn>
+              <a:cxn ang="0">
+                <a:pos x="connsiteX4" y="connsiteY4"/>
+              </a:cxn>
+              <a:cxn ang="0">
+                <a:pos x="connsiteX5" y="connsiteY5"/>
+              </a:cxn>
+              <a:cxn ang="0">
+                <a:pos x="connsiteX6" y="connsiteY6"/>
+              </a:cxn>
+            </a:cxnLst>
+            <a:rect l="l" t="t" r="r" b="b"/>
+            <a:pathLst>
+              <a:path w="4811477" h="6858000">
+                <a:moveTo>
+                  <a:pt x="0" y="0"/>
+                </a:moveTo>
+                <a:lnTo>
+                  <a:pt x="3598499" y="0"/>
+                </a:lnTo>
+                <a:lnTo>
+                  <a:pt x="3661482" y="69271"/>
+                </a:lnTo>
+                <a:cubicBezTo>
+                  <a:pt x="4372008" y="929100"/>
+                  <a:pt x="4811477" y="2116944"/>
+                  <a:pt x="4811477" y="3429000"/>
+                </a:cubicBezTo>
+                <a:cubicBezTo>
+                  <a:pt x="4811477" y="4741056"/>
+                  <a:pt x="4372008" y="5928900"/>
+                  <a:pt x="3661482" y="6788730"/>
+                </a:cubicBezTo>
+                <a:lnTo>
+                  <a:pt x="3598499" y="6858000"/>
+                </a:lnTo>
+                <a:lnTo>
+                  <a:pt x="0" y="6858000"/>
+                </a:lnTo>
+                <a:close/>
+              </a:path>
+            </a:pathLst>
+          </a:custGeom>
+          <a:ln w="9525">
+            <a:noFill/>
+          </a:ln>
+          <a:effectLst/>
+        </p:spPr>
+        <p:style>
+          <a:lnRef idx="2">
+            <a:schemeClr val="accent1">
+              <a:shade val="50000"/>
+            </a:schemeClr>
+          </a:lnRef>
+          <a:fillRef idx="1">
+            <a:schemeClr val="accent1"/>
+          </a:fillRef>
+          <a:effectRef idx="0">
+            <a:schemeClr val="accent1"/>
+          </a:effectRef>
+          <a:fontRef idx="minor">
+            <a:schemeClr val="lt1"/>
+          </a:fontRef>
+        </p:style>
+        <p:txBody>
+          <a:bodyPr wrap="square" rtlCol="0" anchor="ctr">
+            <a:noAutofit/>
+          </a:bodyPr>
+          <a:lstStyle/>
+          <a:p>
+            <a:pPr marL="0" marR="0" lvl="0" indent="0" algn="ctr" defTabSz="914400" rtl="0" eaLnBrk="1" fontAlgn="auto" latinLnBrk="0" hangingPunct="1">
+              <a:lnSpc>
+                <a:spcPct val="100000"/>
+              </a:lnSpc>
+              <a:spcBef>
+                <a:spcPts val="0"/>
+              </a:spcBef>
+              <a:spcAft>
+                <a:spcPts val="0"/>
+              </a:spcAft>
+              <a:buClrTx/>
+              <a:buSzTx/>
+              <a:buFontTx/>
+              <a:buNone/>
+              <a:tabLst/>
+              <a:defRPr/>
+            </a:pPr>
+            <a:endParaRPr kumimoji="0" lang="en-US" sz="1800" b="0" i="0" u="none" strike="noStrike" kern="1200" cap="none" spc="0" normalizeH="0" baseline="0" noProof="0">
+              <a:ln>
+                <a:noFill/>
+              </a:ln>
+              <a:solidFill>
+                <a:prstClr val="white"/>
+              </a:solidFill>
+              <a:effectLst/>
+              <a:uLnTx/>
+              <a:uFillTx/>
+              <a:latin typeface="Calibri" panose="020F0502020204030204"/>
+              <a:ea typeface="+mn-ea"/>
+              <a:cs typeface="+mn-cs"/>
+            </a:endParaRPr>
+          </a:p>
+        </p:txBody>
+      </p:sp>
+      <p:sp>
+        <p:nvSpPr>
+          <p:cNvPr id="2" name="Title 1">
+            <a:extLst>
+              <a:ext uri="{FF2B5EF4-FFF2-40B4-BE49-F238E27FC236}">
                 <a16:creationId xmlns:a16="http://schemas.microsoft.com/office/drawing/2014/main" id="{04488E47-991C-A044-B941-83F14EB84872}"/>
               </a:ext>
             </a:extLst>
@@ -8613,6 +9244,225 @@
 </file>
 
 <file path=ppt/slides/slide6.xml><?xml version="1.0" encoding="utf-8"?>
+<p:sld xmlns:a="http://schemas.openxmlformats.org/drawingml/2006/main" xmlns:r="http://schemas.openxmlformats.org/officeDocument/2006/relationships" xmlns:p="http://schemas.openxmlformats.org/presentationml/2006/main">
+  <p:cSld>
+    <p:bg>
+      <p:bgPr>
+        <a:solidFill>
+          <a:schemeClr val="bg1"/>
+        </a:solidFill>
+        <a:effectLst/>
+      </p:bgPr>
+    </p:bg>
+    <p:spTree>
+      <p:nvGrpSpPr>
+        <p:cNvPr id="1" name=""/>
+        <p:cNvGrpSpPr/>
+        <p:nvPr/>
+      </p:nvGrpSpPr>
+      <p:grpSpPr>
+        <a:xfrm>
+          <a:off x="0" y="0"/>
+          <a:ext cx="0" cy="0"/>
+          <a:chOff x="0" y="0"/>
+          <a:chExt cx="0" cy="0"/>
+        </a:xfrm>
+      </p:grpSpPr>
+      <p:sp useBgFill="1">
+        <p:nvSpPr>
+          <p:cNvPr id="7" name="Rectangle 6">
+            <a:extLst>
+              <a:ext uri="{FF2B5EF4-FFF2-40B4-BE49-F238E27FC236}">
+                <a16:creationId xmlns:a16="http://schemas.microsoft.com/office/drawing/2014/main" id="{69E6EFEE-6516-482C-B143-F97F9BF89D0E}"/>
+              </a:ext>
+              <a:ext uri="{C183D7F6-B498-43B3-948B-1728B52AA6E4}">
+                <adec:decorative xmlns:adec="http://schemas.microsoft.com/office/drawing/2017/decorative" val="1"/>
+              </a:ext>
+            </a:extLst>
+          </p:cNvPr>
+          <p:cNvSpPr>
+            <a:spLocks noGrp="1" noRot="1" noChangeAspect="1" noMove="1" noResize="1" noEditPoints="1" noAdjustHandles="1" noChangeArrowheads="1" noChangeShapeType="1" noTextEdit="1"/>
+          </p:cNvSpPr>
+          <p:nvPr>
+            <p:extLst>
+              <p:ext uri="{386F3935-93C4-4BCD-93E2-E3B085C9AB24}">
+                <p16:designElem xmlns:p16="http://schemas.microsoft.com/office/powerpoint/2015/main" val="1"/>
+              </p:ext>
+            </p:extLst>
+          </p:nvPr>
+        </p:nvSpPr>
+        <p:spPr>
+          <a:xfrm>
+            <a:off x="0" y="0"/>
+            <a:ext cx="12192000" cy="6858000"/>
+          </a:xfrm>
+          <a:prstGeom prst="rect">
+            <a:avLst/>
+          </a:prstGeom>
+          <a:ln>
+            <a:noFill/>
+          </a:ln>
+        </p:spPr>
+        <p:style>
+          <a:lnRef idx="2">
+            <a:schemeClr val="accent1">
+              <a:shade val="50000"/>
+            </a:schemeClr>
+          </a:lnRef>
+          <a:fillRef idx="1">
+            <a:schemeClr val="accent1"/>
+          </a:fillRef>
+          <a:effectRef idx="0">
+            <a:schemeClr val="accent1"/>
+          </a:effectRef>
+          <a:fontRef idx="minor">
+            <a:schemeClr val="lt1"/>
+          </a:fontRef>
+        </p:style>
+        <p:txBody>
+          <a:bodyPr rtlCol="0" anchor="ctr"/>
+          <a:lstStyle/>
+          <a:p>
+            <a:pPr algn="ctr"/>
+            <a:endParaRPr lang="en-US"/>
+          </a:p>
+        </p:txBody>
+      </p:sp>
+      <p:sp>
+        <p:nvSpPr>
+          <p:cNvPr id="9" name="Rectangle 8">
+            <a:extLst>
+              <a:ext uri="{FF2B5EF4-FFF2-40B4-BE49-F238E27FC236}">
+                <a16:creationId xmlns:a16="http://schemas.microsoft.com/office/drawing/2014/main" id="{3DF0D2C0-CD0C-470C-8851-D8B2CC417CB9}"/>
+              </a:ext>
+              <a:ext uri="{C183D7F6-B498-43B3-948B-1728B52AA6E4}">
+                <adec:decorative xmlns:adec="http://schemas.microsoft.com/office/drawing/2017/decorative" val="1"/>
+              </a:ext>
+            </a:extLst>
+          </p:cNvPr>
+          <p:cNvSpPr>
+            <a:spLocks noGrp="1" noRot="1" noChangeAspect="1" noMove="1" noResize="1" noEditPoints="1" noAdjustHandles="1" noChangeArrowheads="1" noChangeShapeType="1" noTextEdit="1"/>
+          </p:cNvSpPr>
+          <p:nvPr>
+            <p:extLst>
+              <p:ext uri="{386F3935-93C4-4BCD-93E2-E3B085C9AB24}">
+                <p16:designElem xmlns:p16="http://schemas.microsoft.com/office/powerpoint/2015/main" val="1"/>
+              </p:ext>
+            </p:extLst>
+          </p:nvPr>
+        </p:nvSpPr>
+        <p:spPr>
+          <a:xfrm rot="16200000">
+            <a:off x="-2748766" y="3248002"/>
+            <a:ext cx="5688917" cy="191386"/>
+          </a:xfrm>
+          <a:prstGeom prst="rect">
+            <a:avLst/>
+          </a:prstGeom>
+          <a:solidFill>
+            <a:schemeClr val="accent1"/>
+          </a:solidFill>
+          <a:ln>
+            <a:noFill/>
+          </a:ln>
+        </p:spPr>
+        <p:style>
+          <a:lnRef idx="2">
+            <a:schemeClr val="accent1">
+              <a:shade val="50000"/>
+            </a:schemeClr>
+          </a:lnRef>
+          <a:fillRef idx="1">
+            <a:schemeClr val="accent1"/>
+          </a:fillRef>
+          <a:effectRef idx="0">
+            <a:schemeClr val="accent1"/>
+          </a:effectRef>
+          <a:fontRef idx="minor">
+            <a:schemeClr val="lt1"/>
+          </a:fontRef>
+        </p:style>
+        <p:txBody>
+          <a:bodyPr rtlCol="0" anchor="ctr"/>
+          <a:lstStyle/>
+          <a:p>
+            <a:pPr marL="0" marR="0" lvl="0" indent="0" algn="ctr" defTabSz="914400" rtl="0" eaLnBrk="1" fontAlgn="auto" latinLnBrk="0" hangingPunct="1">
+              <a:lnSpc>
+                <a:spcPct val="100000"/>
+              </a:lnSpc>
+              <a:spcBef>
+                <a:spcPts val="0"/>
+              </a:spcBef>
+              <a:spcAft>
+                <a:spcPts val="0"/>
+              </a:spcAft>
+              <a:buClrTx/>
+              <a:buSzTx/>
+              <a:buFontTx/>
+              <a:buNone/>
+              <a:tabLst/>
+              <a:defRPr/>
+            </a:pPr>
+            <a:endParaRPr kumimoji="0" lang="en-US" sz="1800" b="0" i="0" u="none" strike="noStrike" kern="1200" cap="none" spc="0" normalizeH="0" baseline="0" noProof="0">
+              <a:ln>
+                <a:noFill/>
+              </a:ln>
+              <a:solidFill>
+                <a:prstClr val="white"/>
+              </a:solidFill>
+              <a:effectLst/>
+              <a:uLnTx/>
+              <a:uFillTx/>
+              <a:latin typeface="Calibri" panose="020F0502020204030204"/>
+              <a:ea typeface="+mn-ea"/>
+              <a:cs typeface="+mn-cs"/>
+            </a:endParaRPr>
+          </a:p>
+        </p:txBody>
+      </p:sp>
+      <p:pic>
+        <p:nvPicPr>
+          <p:cNvPr id="2" name="Picture 1">
+            <a:extLst>
+              <a:ext uri="{FF2B5EF4-FFF2-40B4-BE49-F238E27FC236}">
+                <a16:creationId xmlns:a16="http://schemas.microsoft.com/office/drawing/2014/main" id="{9BA45211-ECAA-E547-A729-17A6E93FBE18}"/>
+              </a:ext>
+            </a:extLst>
+          </p:cNvPr>
+          <p:cNvPicPr>
+            <a:picLocks noChangeAspect="1"/>
+          </p:cNvPicPr>
+          <p:nvPr/>
+        </p:nvPicPr>
+        <p:blipFill rotWithShape="1">
+          <a:blip r:embed="rId2"/>
+          <a:srcRect r="1" b="288"/>
+          <a:stretch/>
+        </p:blipFill>
+        <p:spPr>
+          <a:xfrm>
+            <a:off x="583656" y="499236"/>
+            <a:ext cx="11024687" cy="5688918"/>
+          </a:xfrm>
+          <a:prstGeom prst="rect">
+            <a:avLst/>
+          </a:prstGeom>
+        </p:spPr>
+      </p:pic>
+    </p:spTree>
+    <p:extLst>
+      <p:ext uri="{BB962C8B-B14F-4D97-AF65-F5344CB8AC3E}">
+        <p14:creationId xmlns:p14="http://schemas.microsoft.com/office/powerpoint/2010/main" val="450483697"/>
+      </p:ext>
+    </p:extLst>
+  </p:cSld>
+  <p:clrMapOvr>
+    <a:masterClrMapping/>
+  </p:clrMapOvr>
+</p:sld>
+</file>
+
+<file path=ppt/slides/slide7.xml><?xml version="1.0" encoding="utf-8"?>
 <p:sld xmlns:a="http://schemas.openxmlformats.org/drawingml/2006/main" xmlns:r="http://schemas.openxmlformats.org/officeDocument/2006/relationships" xmlns:p="http://schemas.openxmlformats.org/presentationml/2006/main">
   <p:cSld>
     <p:bg>
@@ -9552,7 +10402,7 @@
 </p:sld>
 </file>
 
-<file path=ppt/slides/slide7.xml><?xml version="1.0" encoding="utf-8"?>
+<file path=ppt/slides/slide8.xml><?xml version="1.0" encoding="utf-8"?>
 <p:sld xmlns:a="http://schemas.openxmlformats.org/drawingml/2006/main" xmlns:r="http://schemas.openxmlformats.org/officeDocument/2006/relationships" xmlns:p="http://schemas.openxmlformats.org/presentationml/2006/main">
   <p:cSld>
     <p:bg>
@@ -10431,7 +11281,7 @@
 </p:sld>
 </file>
 
-<file path=ppt/slides/slide8.xml><?xml version="1.0" encoding="utf-8"?>
+<file path=ppt/slides/slide9.xml><?xml version="1.0" encoding="utf-8"?>
 <p:sld xmlns:a="http://schemas.openxmlformats.org/drawingml/2006/main" xmlns:r="http://schemas.openxmlformats.org/officeDocument/2006/relationships" xmlns:p="http://schemas.openxmlformats.org/presentationml/2006/main">
   <p:cSld>
     <p:spTree>
@@ -10561,636 +11411,6 @@
     <p:extLst>
       <p:ext uri="{BB962C8B-B14F-4D97-AF65-F5344CB8AC3E}">
         <p14:creationId xmlns:p14="http://schemas.microsoft.com/office/powerpoint/2010/main" val="319120901"/>
-      </p:ext>
-    </p:extLst>
-  </p:cSld>
-  <p:clrMapOvr>
-    <a:masterClrMapping/>
-  </p:clrMapOvr>
-</p:sld>
-</file>
-
-<file path=ppt/slides/slide9.xml><?xml version="1.0" encoding="utf-8"?>
-<p:sld xmlns:a="http://schemas.openxmlformats.org/drawingml/2006/main" xmlns:r="http://schemas.openxmlformats.org/officeDocument/2006/relationships" xmlns:p="http://schemas.openxmlformats.org/presentationml/2006/main">
-  <p:cSld>
-    <p:bg>
-      <p:bgPr>
-        <a:solidFill>
-          <a:schemeClr val="bg1"/>
-        </a:solidFill>
-        <a:effectLst/>
-      </p:bgPr>
-    </p:bg>
-    <p:spTree>
-      <p:nvGrpSpPr>
-        <p:cNvPr id="1" name=""/>
-        <p:cNvGrpSpPr/>
-        <p:nvPr/>
-      </p:nvGrpSpPr>
-      <p:grpSpPr>
-        <a:xfrm>
-          <a:off x="0" y="0"/>
-          <a:ext cx="0" cy="0"/>
-          <a:chOff x="0" y="0"/>
-          <a:chExt cx="0" cy="0"/>
-        </a:xfrm>
-      </p:grpSpPr>
-      <p:sp useBgFill="1">
-        <p:nvSpPr>
-          <p:cNvPr id="8" name="Rectangle 7">
-            <a:extLst>
-              <a:ext uri="{FF2B5EF4-FFF2-40B4-BE49-F238E27FC236}">
-                <a16:creationId xmlns:a16="http://schemas.microsoft.com/office/drawing/2014/main" id="{1C799903-48D5-4A31-A1A2-541072D9771E}"/>
-              </a:ext>
-              <a:ext uri="{C183D7F6-B498-43B3-948B-1728B52AA6E4}">
-                <adec:decorative xmlns:adec="http://schemas.microsoft.com/office/drawing/2017/decorative" val="1"/>
-              </a:ext>
-            </a:extLst>
-          </p:cNvPr>
-          <p:cNvSpPr>
-            <a:spLocks noGrp="1" noRot="1" noChangeAspect="1" noMove="1" noResize="1" noEditPoints="1" noAdjustHandles="1" noChangeArrowheads="1" noChangeShapeType="1" noTextEdit="1"/>
-          </p:cNvSpPr>
-          <p:nvPr>
-            <p:extLst>
-              <p:ext uri="{386F3935-93C4-4BCD-93E2-E3B085C9AB24}">
-                <p16:designElem xmlns:p16="http://schemas.microsoft.com/office/powerpoint/2015/main" val="1"/>
-              </p:ext>
-            </p:extLst>
-          </p:nvPr>
-        </p:nvSpPr>
-        <p:spPr>
-          <a:xfrm>
-            <a:off x="0" y="0"/>
-            <a:ext cx="12192002" cy="6858000"/>
-          </a:xfrm>
-          <a:prstGeom prst="rect">
-            <a:avLst/>
-          </a:prstGeom>
-          <a:ln>
-            <a:noFill/>
-          </a:ln>
-        </p:spPr>
-        <p:style>
-          <a:lnRef idx="2">
-            <a:schemeClr val="accent1">
-              <a:shade val="50000"/>
-            </a:schemeClr>
-          </a:lnRef>
-          <a:fillRef idx="1">
-            <a:schemeClr val="accent1"/>
-          </a:fillRef>
-          <a:effectRef idx="0">
-            <a:schemeClr val="accent1"/>
-          </a:effectRef>
-          <a:fontRef idx="minor">
-            <a:schemeClr val="lt1"/>
-          </a:fontRef>
-        </p:style>
-        <p:txBody>
-          <a:bodyPr rtlCol="0" anchor="ctr"/>
-          <a:lstStyle/>
-          <a:p>
-            <a:pPr algn="ctr"/>
-            <a:endParaRPr lang="en-US"/>
-          </a:p>
-        </p:txBody>
-      </p:sp>
-      <p:sp useBgFill="1">
-        <p:nvSpPr>
-          <p:cNvPr id="10" name="Freeform: Shape 9">
-            <a:extLst>
-              <a:ext uri="{FF2B5EF4-FFF2-40B4-BE49-F238E27FC236}">
-                <a16:creationId xmlns:a16="http://schemas.microsoft.com/office/drawing/2014/main" id="{8EFFF109-FC58-4FD3-BE05-9775A1310F55}"/>
-              </a:ext>
-              <a:ext uri="{C183D7F6-B498-43B3-948B-1728B52AA6E4}">
-                <adec:decorative xmlns:adec="http://schemas.microsoft.com/office/drawing/2017/decorative" val="1"/>
-              </a:ext>
-            </a:extLst>
-          </p:cNvPr>
-          <p:cNvSpPr>
-            <a:spLocks noGrp="1" noRot="1" noChangeAspect="1" noMove="1" noResize="1" noEditPoints="1" noAdjustHandles="1" noChangeArrowheads="1" noChangeShapeType="1" noTextEdit="1"/>
-          </p:cNvSpPr>
-          <p:nvPr>
-            <p:extLst>
-              <p:ext uri="{386F3935-93C4-4BCD-93E2-E3B085C9AB24}">
-                <p16:designElem xmlns:p16="http://schemas.microsoft.com/office/powerpoint/2015/main" val="1"/>
-              </p:ext>
-            </p:extLst>
-          </p:nvPr>
-        </p:nvSpPr>
-        <p:spPr>
-          <a:xfrm>
-            <a:off x="-1" y="0"/>
-            <a:ext cx="4818889" cy="6858000"/>
-          </a:xfrm>
-          <a:custGeom>
-            <a:avLst/>
-            <a:gdLst>
-              <a:gd name="connsiteX0" fmla="*/ 0 w 4818889"/>
-              <a:gd name="connsiteY0" fmla="*/ 0 h 6858000"/>
-              <a:gd name="connsiteX1" fmla="*/ 3605911 w 4818889"/>
-              <a:gd name="connsiteY1" fmla="*/ 0 h 6858000"/>
-              <a:gd name="connsiteX2" fmla="*/ 3668894 w 4818889"/>
-              <a:gd name="connsiteY2" fmla="*/ 69271 h 6858000"/>
-              <a:gd name="connsiteX3" fmla="*/ 4818889 w 4818889"/>
-              <a:gd name="connsiteY3" fmla="*/ 3429000 h 6858000"/>
-              <a:gd name="connsiteX4" fmla="*/ 3668894 w 4818889"/>
-              <a:gd name="connsiteY4" fmla="*/ 6788730 h 6858000"/>
-              <a:gd name="connsiteX5" fmla="*/ 3605911 w 4818889"/>
-              <a:gd name="connsiteY5" fmla="*/ 6858000 h 6858000"/>
-              <a:gd name="connsiteX6" fmla="*/ 0 w 4818889"/>
-              <a:gd name="connsiteY6" fmla="*/ 6858000 h 6858000"/>
-            </a:gdLst>
-            <a:ahLst/>
-            <a:cxnLst>
-              <a:cxn ang="0">
-                <a:pos x="connsiteX0" y="connsiteY0"/>
-              </a:cxn>
-              <a:cxn ang="0">
-                <a:pos x="connsiteX1" y="connsiteY1"/>
-              </a:cxn>
-              <a:cxn ang="0">
-                <a:pos x="connsiteX2" y="connsiteY2"/>
-              </a:cxn>
-              <a:cxn ang="0">
-                <a:pos x="connsiteX3" y="connsiteY3"/>
-              </a:cxn>
-              <a:cxn ang="0">
-                <a:pos x="connsiteX4" y="connsiteY4"/>
-              </a:cxn>
-              <a:cxn ang="0">
-                <a:pos x="connsiteX5" y="connsiteY5"/>
-              </a:cxn>
-              <a:cxn ang="0">
-                <a:pos x="connsiteX6" y="connsiteY6"/>
-              </a:cxn>
-            </a:cxnLst>
-            <a:rect l="l" t="t" r="r" b="b"/>
-            <a:pathLst>
-              <a:path w="4818889" h="6858000">
-                <a:moveTo>
-                  <a:pt x="0" y="0"/>
-                </a:moveTo>
-                <a:lnTo>
-                  <a:pt x="3605911" y="0"/>
-                </a:lnTo>
-                <a:lnTo>
-                  <a:pt x="3668894" y="69271"/>
-                </a:lnTo>
-                <a:cubicBezTo>
-                  <a:pt x="4379420" y="929100"/>
-                  <a:pt x="4818889" y="2116944"/>
-                  <a:pt x="4818889" y="3429000"/>
-                </a:cubicBezTo>
-                <a:cubicBezTo>
-                  <a:pt x="4818889" y="4741056"/>
-                  <a:pt x="4379420" y="5928900"/>
-                  <a:pt x="3668894" y="6788730"/>
-                </a:cubicBezTo>
-                <a:lnTo>
-                  <a:pt x="3605911" y="6858000"/>
-                </a:lnTo>
-                <a:lnTo>
-                  <a:pt x="0" y="6858000"/>
-                </a:lnTo>
-                <a:close/>
-              </a:path>
-            </a:pathLst>
-          </a:custGeom>
-          <a:ln w="9525">
-            <a:solidFill>
-              <a:schemeClr val="tx2">
-                <a:lumMod val="10000"/>
-                <a:lumOff val="90000"/>
-              </a:schemeClr>
-            </a:solidFill>
-          </a:ln>
-          <a:effectLst>
-            <a:outerShdw blurRad="50800" dist="38100" algn="l" rotWithShape="0">
-              <a:schemeClr val="bg1">
-                <a:lumMod val="85000"/>
-                <a:alpha val="30000"/>
-              </a:schemeClr>
-            </a:outerShdw>
-          </a:effectLst>
-        </p:spPr>
-        <p:style>
-          <a:lnRef idx="2">
-            <a:schemeClr val="accent1">
-              <a:shade val="50000"/>
-            </a:schemeClr>
-          </a:lnRef>
-          <a:fillRef idx="1">
-            <a:schemeClr val="accent1"/>
-          </a:fillRef>
-          <a:effectRef idx="0">
-            <a:schemeClr val="accent1"/>
-          </a:effectRef>
-          <a:fontRef idx="minor">
-            <a:schemeClr val="lt1"/>
-          </a:fontRef>
-        </p:style>
-        <p:txBody>
-          <a:bodyPr wrap="square" rtlCol="0" anchor="ctr">
-            <a:noAutofit/>
-          </a:bodyPr>
-          <a:lstStyle/>
-          <a:p>
-            <a:pPr marL="0" marR="0" lvl="0" indent="0" algn="ctr" defTabSz="914400" rtl="0" eaLnBrk="1" fontAlgn="auto" latinLnBrk="0" hangingPunct="1">
-              <a:lnSpc>
-                <a:spcPct val="100000"/>
-              </a:lnSpc>
-              <a:spcBef>
-                <a:spcPts val="0"/>
-              </a:spcBef>
-              <a:spcAft>
-                <a:spcPts val="0"/>
-              </a:spcAft>
-              <a:buClrTx/>
-              <a:buSzTx/>
-              <a:buFontTx/>
-              <a:buNone/>
-              <a:tabLst/>
-              <a:defRPr/>
-            </a:pPr>
-            <a:endParaRPr kumimoji="0" lang="en-US" sz="1800" b="0" i="0" u="none" strike="noStrike" kern="1200" cap="none" spc="0" normalizeH="0" baseline="0" noProof="0">
-              <a:ln>
-                <a:noFill/>
-              </a:ln>
-              <a:solidFill>
-                <a:prstClr val="white"/>
-              </a:solidFill>
-              <a:effectLst/>
-              <a:uLnTx/>
-              <a:uFillTx/>
-              <a:latin typeface="Calibri" panose="020F0502020204030204"/>
-              <a:ea typeface="+mn-ea"/>
-              <a:cs typeface="+mn-cs"/>
-            </a:endParaRPr>
-          </a:p>
-        </p:txBody>
-      </p:sp>
-      <p:sp useBgFill="1">
-        <p:nvSpPr>
-          <p:cNvPr id="12" name="Freeform: Shape 11">
-            <a:extLst>
-              <a:ext uri="{FF2B5EF4-FFF2-40B4-BE49-F238E27FC236}">
-                <a16:creationId xmlns:a16="http://schemas.microsoft.com/office/drawing/2014/main" id="{E1B96AD6-92A9-4273-A62B-96A1C3E0BA95}"/>
-              </a:ext>
-              <a:ext uri="{C183D7F6-B498-43B3-948B-1728B52AA6E4}">
-                <adec:decorative xmlns:adec="http://schemas.microsoft.com/office/drawing/2017/decorative" val="1"/>
-              </a:ext>
-            </a:extLst>
-          </p:cNvPr>
-          <p:cNvSpPr>
-            <a:spLocks noGrp="1" noRot="1" noChangeAspect="1" noMove="1" noResize="1" noEditPoints="1" noAdjustHandles="1" noChangeArrowheads="1" noChangeShapeType="1" noTextEdit="1"/>
-          </p:cNvSpPr>
-          <p:nvPr>
-            <p:extLst>
-              <p:ext uri="{386F3935-93C4-4BCD-93E2-E3B085C9AB24}">
-                <p16:designElem xmlns:p16="http://schemas.microsoft.com/office/powerpoint/2015/main" val="1"/>
-              </p:ext>
-            </p:extLst>
-          </p:nvPr>
-        </p:nvSpPr>
-        <p:spPr>
-          <a:xfrm>
-            <a:off x="1" y="0"/>
-            <a:ext cx="4811477" cy="6858000"/>
-          </a:xfrm>
-          <a:custGeom>
-            <a:avLst/>
-            <a:gdLst>
-              <a:gd name="connsiteX0" fmla="*/ 0 w 4811477"/>
-              <a:gd name="connsiteY0" fmla="*/ 0 h 6858000"/>
-              <a:gd name="connsiteX1" fmla="*/ 3598499 w 4811477"/>
-              <a:gd name="connsiteY1" fmla="*/ 0 h 6858000"/>
-              <a:gd name="connsiteX2" fmla="*/ 3661482 w 4811477"/>
-              <a:gd name="connsiteY2" fmla="*/ 69271 h 6858000"/>
-              <a:gd name="connsiteX3" fmla="*/ 4811477 w 4811477"/>
-              <a:gd name="connsiteY3" fmla="*/ 3429000 h 6858000"/>
-              <a:gd name="connsiteX4" fmla="*/ 3661482 w 4811477"/>
-              <a:gd name="connsiteY4" fmla="*/ 6788730 h 6858000"/>
-              <a:gd name="connsiteX5" fmla="*/ 3598499 w 4811477"/>
-              <a:gd name="connsiteY5" fmla="*/ 6858000 h 6858000"/>
-              <a:gd name="connsiteX6" fmla="*/ 0 w 4811477"/>
-              <a:gd name="connsiteY6" fmla="*/ 6858000 h 6858000"/>
-            </a:gdLst>
-            <a:ahLst/>
-            <a:cxnLst>
-              <a:cxn ang="0">
-                <a:pos x="connsiteX0" y="connsiteY0"/>
-              </a:cxn>
-              <a:cxn ang="0">
-                <a:pos x="connsiteX1" y="connsiteY1"/>
-              </a:cxn>
-              <a:cxn ang="0">
-                <a:pos x="connsiteX2" y="connsiteY2"/>
-              </a:cxn>
-              <a:cxn ang="0">
-                <a:pos x="connsiteX3" y="connsiteY3"/>
-              </a:cxn>
-              <a:cxn ang="0">
-                <a:pos x="connsiteX4" y="connsiteY4"/>
-              </a:cxn>
-              <a:cxn ang="0">
-                <a:pos x="connsiteX5" y="connsiteY5"/>
-              </a:cxn>
-              <a:cxn ang="0">
-                <a:pos x="connsiteX6" y="connsiteY6"/>
-              </a:cxn>
-            </a:cxnLst>
-            <a:rect l="l" t="t" r="r" b="b"/>
-            <a:pathLst>
-              <a:path w="4811477" h="6858000">
-                <a:moveTo>
-                  <a:pt x="0" y="0"/>
-                </a:moveTo>
-                <a:lnTo>
-                  <a:pt x="3598499" y="0"/>
-                </a:lnTo>
-                <a:lnTo>
-                  <a:pt x="3661482" y="69271"/>
-                </a:lnTo>
-                <a:cubicBezTo>
-                  <a:pt x="4372008" y="929100"/>
-                  <a:pt x="4811477" y="2116944"/>
-                  <a:pt x="4811477" y="3429000"/>
-                </a:cubicBezTo>
-                <a:cubicBezTo>
-                  <a:pt x="4811477" y="4741056"/>
-                  <a:pt x="4372008" y="5928900"/>
-                  <a:pt x="3661482" y="6788730"/>
-                </a:cubicBezTo>
-                <a:lnTo>
-                  <a:pt x="3598499" y="6858000"/>
-                </a:lnTo>
-                <a:lnTo>
-                  <a:pt x="0" y="6858000"/>
-                </a:lnTo>
-                <a:close/>
-              </a:path>
-            </a:pathLst>
-          </a:custGeom>
-          <a:ln w="9525">
-            <a:noFill/>
-          </a:ln>
-          <a:effectLst/>
-        </p:spPr>
-        <p:style>
-          <a:lnRef idx="2">
-            <a:schemeClr val="accent1">
-              <a:shade val="50000"/>
-            </a:schemeClr>
-          </a:lnRef>
-          <a:fillRef idx="1">
-            <a:schemeClr val="accent1"/>
-          </a:fillRef>
-          <a:effectRef idx="0">
-            <a:schemeClr val="accent1"/>
-          </a:effectRef>
-          <a:fontRef idx="minor">
-            <a:schemeClr val="lt1"/>
-          </a:fontRef>
-        </p:style>
-        <p:txBody>
-          <a:bodyPr wrap="square" rtlCol="0" anchor="ctr">
-            <a:noAutofit/>
-          </a:bodyPr>
-          <a:lstStyle/>
-          <a:p>
-            <a:pPr marL="0" marR="0" lvl="0" indent="0" algn="ctr" defTabSz="914400" rtl="0" eaLnBrk="1" fontAlgn="auto" latinLnBrk="0" hangingPunct="1">
-              <a:lnSpc>
-                <a:spcPct val="100000"/>
-              </a:lnSpc>
-              <a:spcBef>
-                <a:spcPts val="0"/>
-              </a:spcBef>
-              <a:spcAft>
-                <a:spcPts val="0"/>
-              </a:spcAft>
-              <a:buClrTx/>
-              <a:buSzTx/>
-              <a:buFontTx/>
-              <a:buNone/>
-              <a:tabLst/>
-              <a:defRPr/>
-            </a:pPr>
-            <a:endParaRPr kumimoji="0" lang="en-US" sz="1800" b="0" i="0" u="none" strike="noStrike" kern="1200" cap="none" spc="0" normalizeH="0" baseline="0" noProof="0">
-              <a:ln>
-                <a:noFill/>
-              </a:ln>
-              <a:solidFill>
-                <a:prstClr val="white"/>
-              </a:solidFill>
-              <a:effectLst/>
-              <a:uLnTx/>
-              <a:uFillTx/>
-              <a:latin typeface="Calibri" panose="020F0502020204030204"/>
-              <a:ea typeface="+mn-ea"/>
-              <a:cs typeface="+mn-cs"/>
-            </a:endParaRPr>
-          </a:p>
-        </p:txBody>
-      </p:sp>
-      <p:sp>
-        <p:nvSpPr>
-          <p:cNvPr id="2" name="Title 1">
-            <a:extLst>
-              <a:ext uri="{FF2B5EF4-FFF2-40B4-BE49-F238E27FC236}">
-                <a16:creationId xmlns:a16="http://schemas.microsoft.com/office/drawing/2014/main" id="{4A5844C9-823A-1243-A18D-3A1DCCB34217}"/>
-              </a:ext>
-            </a:extLst>
-          </p:cNvPr>
-          <p:cNvSpPr>
-            <a:spLocks noGrp="1"/>
-          </p:cNvSpPr>
-          <p:nvPr>
-            <p:ph type="title"/>
-          </p:nvPr>
-        </p:nvSpPr>
-        <p:spPr>
-          <a:xfrm>
-            <a:off x="621792" y="1161288"/>
-            <a:ext cx="3602736" cy="4526280"/>
-          </a:xfrm>
-        </p:spPr>
-        <p:txBody>
-          <a:bodyPr>
-            <a:normAutofit/>
-          </a:bodyPr>
-          <a:lstStyle/>
-          <a:p>
-            <a:r>
-              <a:rPr lang="en-US" dirty="0"/>
-              <a:t>Coding approach</a:t>
-            </a:r>
-          </a:p>
-        </p:txBody>
-      </p:sp>
-      <p:sp>
-        <p:nvSpPr>
-          <p:cNvPr id="14" name="Rectangle 13">
-            <a:extLst>
-              <a:ext uri="{FF2B5EF4-FFF2-40B4-BE49-F238E27FC236}">
-                <a16:creationId xmlns:a16="http://schemas.microsoft.com/office/drawing/2014/main" id="{463EEC44-1BA3-44ED-81FC-A644B04B2A44}"/>
-              </a:ext>
-              <a:ext uri="{C183D7F6-B498-43B3-948B-1728B52AA6E4}">
-                <adec:decorative xmlns:adec="http://schemas.microsoft.com/office/drawing/2017/decorative" val="1"/>
-              </a:ext>
-            </a:extLst>
-          </p:cNvPr>
-          <p:cNvSpPr>
-            <a:spLocks noGrp="1" noRot="1" noChangeAspect="1" noMove="1" noResize="1" noEditPoints="1" noAdjustHandles="1" noChangeArrowheads="1" noChangeShapeType="1" noTextEdit="1"/>
-          </p:cNvSpPr>
-          <p:nvPr>
-            <p:extLst>
-              <p:ext uri="{386F3935-93C4-4BCD-93E2-E3B085C9AB24}">
-                <p16:designElem xmlns:p16="http://schemas.microsoft.com/office/powerpoint/2015/main" val="1"/>
-              </p:ext>
-            </p:extLst>
-          </p:nvPr>
-        </p:nvSpPr>
-        <p:spPr>
-          <a:xfrm>
-            <a:off x="0" y="3102049"/>
-            <a:ext cx="128016" cy="653903"/>
-          </a:xfrm>
-          <a:prstGeom prst="rect">
-            <a:avLst/>
-          </a:prstGeom>
-          <a:solidFill>
-            <a:schemeClr val="accent1"/>
-          </a:solidFill>
-          <a:ln>
-            <a:noFill/>
-          </a:ln>
-        </p:spPr>
-        <p:style>
-          <a:lnRef idx="2">
-            <a:schemeClr val="accent1">
-              <a:shade val="50000"/>
-            </a:schemeClr>
-          </a:lnRef>
-          <a:fillRef idx="1">
-            <a:schemeClr val="accent1"/>
-          </a:fillRef>
-          <a:effectRef idx="0">
-            <a:schemeClr val="accent1"/>
-          </a:effectRef>
-          <a:fontRef idx="minor">
-            <a:schemeClr val="lt1"/>
-          </a:fontRef>
-        </p:style>
-        <p:txBody>
-          <a:bodyPr rtlCol="0" anchor="ctr"/>
-          <a:lstStyle/>
-          <a:p>
-            <a:pPr marL="0" marR="0" lvl="0" indent="0" algn="ctr" defTabSz="914400" rtl="0" eaLnBrk="1" fontAlgn="auto" latinLnBrk="0" hangingPunct="1">
-              <a:lnSpc>
-                <a:spcPct val="100000"/>
-              </a:lnSpc>
-              <a:spcBef>
-                <a:spcPts val="0"/>
-              </a:spcBef>
-              <a:spcAft>
-                <a:spcPts val="0"/>
-              </a:spcAft>
-              <a:buClrTx/>
-              <a:buSzTx/>
-              <a:buFontTx/>
-              <a:buNone/>
-              <a:tabLst/>
-              <a:defRPr/>
-            </a:pPr>
-            <a:endParaRPr kumimoji="0" lang="en-US" sz="1800" b="0" i="0" u="none" strike="noStrike" kern="1200" cap="none" spc="0" normalizeH="0" baseline="0" noProof="0">
-              <a:ln>
-                <a:noFill/>
-              </a:ln>
-              <a:solidFill>
-                <a:prstClr val="white"/>
-              </a:solidFill>
-              <a:effectLst/>
-              <a:uLnTx/>
-              <a:uFillTx/>
-              <a:latin typeface="Calibri" panose="020F0502020204030204"/>
-              <a:ea typeface="+mn-ea"/>
-              <a:cs typeface="+mn-cs"/>
-            </a:endParaRPr>
-          </a:p>
-        </p:txBody>
-      </p:sp>
-      <p:sp>
-        <p:nvSpPr>
-          <p:cNvPr id="3" name="Content Placeholder 2">
-            <a:extLst>
-              <a:ext uri="{FF2B5EF4-FFF2-40B4-BE49-F238E27FC236}">
-                <a16:creationId xmlns:a16="http://schemas.microsoft.com/office/drawing/2014/main" id="{AFE38C5A-EC19-AA4E-9914-6A72705A98A0}"/>
-              </a:ext>
-            </a:extLst>
-          </p:cNvPr>
-          <p:cNvSpPr>
-            <a:spLocks noGrp="1"/>
-          </p:cNvSpPr>
-          <p:nvPr>
-            <p:ph idx="1"/>
-          </p:nvPr>
-        </p:nvSpPr>
-        <p:spPr>
-          <a:xfrm>
-            <a:off x="5434149" y="932688"/>
-            <a:ext cx="5916603" cy="4992624"/>
-          </a:xfrm>
-        </p:spPr>
-        <p:txBody>
-          <a:bodyPr anchor="ctr">
-            <a:normAutofit/>
-          </a:bodyPr>
-          <a:lstStyle/>
-          <a:p>
-            <a:r>
-              <a:rPr lang="en-US" sz="2000" dirty="0"/>
-              <a:t>SQLite Database</a:t>
-            </a:r>
-          </a:p>
-          <a:p>
-            <a:r>
-              <a:rPr lang="en-US" sz="2000" dirty="0" err="1"/>
-              <a:t>Gmaps</a:t>
-            </a:r>
-            <a:endParaRPr lang="en-US" sz="2000" dirty="0"/>
-          </a:p>
-          <a:p>
-            <a:r>
-              <a:rPr lang="en-US" sz="2000" dirty="0"/>
-              <a:t>JavaScript word cloud </a:t>
-            </a:r>
-          </a:p>
-          <a:p>
-            <a:r>
-              <a:rPr lang="en-US" sz="2000" dirty="0"/>
-              <a:t>Flask app </a:t>
-            </a:r>
-          </a:p>
-          <a:p>
-            <a:r>
-              <a:rPr lang="en-US" sz="2000" dirty="0"/>
-              <a:t>Leaflet</a:t>
-            </a:r>
-          </a:p>
-          <a:p>
-            <a:r>
-              <a:rPr lang="en-US" sz="2000"/>
-              <a:t>Plotly</a:t>
-            </a:r>
-            <a:endParaRPr lang="en-US" sz="2000" dirty="0"/>
-          </a:p>
-        </p:txBody>
-      </p:sp>
-    </p:spTree>
-    <p:extLst>
-      <p:ext uri="{BB962C8B-B14F-4D97-AF65-F5344CB8AC3E}">
-        <p14:creationId xmlns:p14="http://schemas.microsoft.com/office/powerpoint/2010/main" val="1903028505"/>
       </p:ext>
     </p:extLst>
   </p:cSld>

</xml_diff>